<commit_message>
added wireframes for home and view all
</commit_message>
<xml_diff>
--- a/Presentation/Vet Managment.pptx
+++ b/Presentation/Vet Managment.pptx
@@ -9,7 +9,9 @@
     <p:sldId id="259" r:id="rId3"/>
     <p:sldId id="260" r:id="rId4"/>
     <p:sldId id="257" r:id="rId5"/>
-    <p:sldId id="258" r:id="rId6"/>
+    <p:sldId id="263" r:id="rId6"/>
+    <p:sldId id="262" r:id="rId7"/>
+    <p:sldId id="261" r:id="rId8"/>
   </p:sldIdLst>
   <p:sldSz cx="12192000" cy="6858000"/>
   <p:notesSz cx="6858000" cy="9144000"/>
@@ -114,7 +116,7 @@
 <file path=ppt/revisionInfo.xml><?xml version="1.0" encoding="utf-8"?>
 <p1510:revInfo xmlns:a="http://schemas.openxmlformats.org/drawingml/2006/main" xmlns:r="http://schemas.openxmlformats.org/officeDocument/2006/relationships" xmlns:p1510="http://schemas.microsoft.com/office/powerpoint/2015/10/main">
   <p1510:revLst>
-    <p1510:client id="{A7FEC831-BDE6-4C4C-9C14-DA98583E0717}" v="35" dt="2021-12-10T15:07:53.669"/>
+    <p1510:client id="{A7FEC831-BDE6-4C4C-9C14-DA98583E0717}" v="230" dt="2021-12-10T16:37:03.865"/>
   </p1510:revLst>
 </p1510:revInfo>
 </file>
@@ -123,8 +125,8 @@
 <pc:chgInfo xmlns:a="http://schemas.openxmlformats.org/drawingml/2006/main" xmlns:r="http://schemas.openxmlformats.org/officeDocument/2006/relationships" xmlns:ac="http://schemas.microsoft.com/office/drawing/2013/main/command" xmlns:pc="http://schemas.microsoft.com/office/powerpoint/2013/main/command">
   <pc:docChgLst>
     <pc:chgData name="Peter Mordaunt" userId="bb5abcbb151840ed" providerId="LiveId" clId="{A7FEC831-BDE6-4C4C-9C14-DA98583E0717}"/>
-    <pc:docChg chg="undo custSel modSld modMainMaster">
-      <pc:chgData name="Peter Mordaunt" userId="bb5abcbb151840ed" providerId="LiveId" clId="{A7FEC831-BDE6-4C4C-9C14-DA98583E0717}" dt="2021-12-10T15:08:06.953" v="374" actId="1076"/>
+    <pc:docChg chg="undo custSel addSld delSld modSld modMainMaster">
+      <pc:chgData name="Peter Mordaunt" userId="bb5abcbb151840ed" providerId="LiveId" clId="{A7FEC831-BDE6-4C4C-9C14-DA98583E0717}" dt="2021-12-10T16:37:03.865" v="838" actId="164"/>
       <pc:docMkLst>
         <pc:docMk/>
       </pc:docMkLst>
@@ -358,8 +360,8 @@
           </ac:picMkLst>
         </pc:picChg>
       </pc:sldChg>
-      <pc:sldChg chg="addSp delSp modSp mod modTransition setBg addAnim delAnim delDesignElem">
-        <pc:chgData name="Peter Mordaunt" userId="bb5abcbb151840ed" providerId="LiveId" clId="{A7FEC831-BDE6-4C4C-9C14-DA98583E0717}" dt="2021-12-10T15:08:06.953" v="374" actId="1076"/>
+      <pc:sldChg chg="addSp delSp modSp del mod modTransition setBg addAnim delAnim delDesignElem">
+        <pc:chgData name="Peter Mordaunt" userId="bb5abcbb151840ed" providerId="LiveId" clId="{A7FEC831-BDE6-4C4C-9C14-DA98583E0717}" dt="2021-12-10T16:32:15.985" v="620" actId="2696"/>
         <pc:sldMkLst>
           <pc:docMk/>
           <pc:sldMk cId="1856906440" sldId="258"/>
@@ -386,6 +388,14 @@
             <pc:docMk/>
             <pc:sldMk cId="1856906440" sldId="258"/>
             <ac:spMk id="7" creationId="{D5C88E56-843B-6849-BE48-605CDEE4000B}"/>
+          </ac:spMkLst>
+        </pc:spChg>
+        <pc:spChg chg="add del mod">
+          <ac:chgData name="Peter Mordaunt" userId="bb5abcbb151840ed" providerId="LiveId" clId="{A7FEC831-BDE6-4C4C-9C14-DA98583E0717}" dt="2021-12-10T16:31:58.172" v="619"/>
+          <ac:spMkLst>
+            <pc:docMk/>
+            <pc:sldMk cId="1856906440" sldId="258"/>
+            <ac:spMk id="10" creationId="{58575D86-08F9-5542-8769-9F3FD990986B}"/>
           </ac:spMkLst>
         </pc:spChg>
         <pc:spChg chg="add">
@@ -532,8 +542,8 @@
             <ac:picMk id="5" creationId="{B863EF58-8C42-544E-9066-FD9F7615EA1F}"/>
           </ac:picMkLst>
         </pc:picChg>
-        <pc:picChg chg="add mod">
-          <ac:chgData name="Peter Mordaunt" userId="bb5abcbb151840ed" providerId="LiveId" clId="{A7FEC831-BDE6-4C4C-9C14-DA98583E0717}" dt="2021-12-10T15:08:06.953" v="374" actId="1076"/>
+        <pc:picChg chg="add del mod">
+          <ac:chgData name="Peter Mordaunt" userId="bb5abcbb151840ed" providerId="LiveId" clId="{A7FEC831-BDE6-4C4C-9C14-DA98583E0717}" dt="2021-12-10T16:31:57.807" v="617" actId="21"/>
           <ac:picMkLst>
             <pc:docMk/>
             <pc:sldMk cId="1856906440" sldId="258"/>
@@ -690,6 +700,122 @@
             <ac:spMk id="3" creationId="{E16A36ED-3D65-2E48-B5A5-3143517D6D06}"/>
           </ac:spMkLst>
         </pc:spChg>
+      </pc:sldChg>
+      <pc:sldChg chg="addSp modSp new mod">
+        <pc:chgData name="Peter Mordaunt" userId="bb5abcbb151840ed" providerId="LiveId" clId="{A7FEC831-BDE6-4C4C-9C14-DA98583E0717}" dt="2021-12-10T15:43:27.195" v="480" actId="20577"/>
+        <pc:sldMkLst>
+          <pc:docMk/>
+          <pc:sldMk cId="792151724" sldId="261"/>
+        </pc:sldMkLst>
+        <pc:spChg chg="mod">
+          <ac:chgData name="Peter Mordaunt" userId="bb5abcbb151840ed" providerId="LiveId" clId="{A7FEC831-BDE6-4C4C-9C14-DA98583E0717}" dt="2021-12-10T15:42:32.931" v="392" actId="20577"/>
+          <ac:spMkLst>
+            <pc:docMk/>
+            <pc:sldMk cId="792151724" sldId="261"/>
+            <ac:spMk id="2" creationId="{5654D0C1-A048-A24F-810D-C6A91D612E50}"/>
+          </ac:spMkLst>
+        </pc:spChg>
+        <pc:spChg chg="add mod">
+          <ac:chgData name="Peter Mordaunt" userId="bb5abcbb151840ed" providerId="LiveId" clId="{A7FEC831-BDE6-4C4C-9C14-DA98583E0717}" dt="2021-12-10T15:43:27.195" v="480" actId="20577"/>
+          <ac:spMkLst>
+            <pc:docMk/>
+            <pc:sldMk cId="792151724" sldId="261"/>
+            <ac:spMk id="3" creationId="{08CDB14F-2060-964E-90EE-B634BC32D7A8}"/>
+          </ac:spMkLst>
+        </pc:spChg>
+      </pc:sldChg>
+      <pc:sldChg chg="new del">
+        <pc:chgData name="Peter Mordaunt" userId="bb5abcbb151840ed" providerId="LiveId" clId="{A7FEC831-BDE6-4C4C-9C14-DA98583E0717}" dt="2021-12-10T15:42:24.059" v="376" actId="680"/>
+        <pc:sldMkLst>
+          <pc:docMk/>
+          <pc:sldMk cId="2152722808" sldId="261"/>
+        </pc:sldMkLst>
+      </pc:sldChg>
+      <pc:sldChg chg="addSp delSp modSp new mod setBg">
+        <pc:chgData name="Peter Mordaunt" userId="bb5abcbb151840ed" providerId="LiveId" clId="{A7FEC831-BDE6-4C4C-9C14-DA98583E0717}" dt="2021-12-10T16:37:03.865" v="838" actId="164"/>
+        <pc:sldMkLst>
+          <pc:docMk/>
+          <pc:sldMk cId="1762480478" sldId="262"/>
+        </pc:sldMkLst>
+        <pc:spChg chg="add mod topLvl">
+          <ac:chgData name="Peter Mordaunt" userId="bb5abcbb151840ed" providerId="LiveId" clId="{A7FEC831-BDE6-4C4C-9C14-DA98583E0717}" dt="2021-12-10T16:37:03.865" v="838" actId="164"/>
+          <ac:spMkLst>
+            <pc:docMk/>
+            <pc:sldMk cId="1762480478" sldId="262"/>
+            <ac:spMk id="6" creationId="{49916AD9-BEE6-8347-BDDD-359E9D503429}"/>
+          </ac:spMkLst>
+        </pc:spChg>
+        <pc:spChg chg="add mod">
+          <ac:chgData name="Peter Mordaunt" userId="bb5abcbb151840ed" providerId="LiveId" clId="{A7FEC831-BDE6-4C4C-9C14-DA98583E0717}" dt="2021-12-10T16:31:25.894" v="615" actId="20577"/>
+          <ac:spMkLst>
+            <pc:docMk/>
+            <pc:sldMk cId="1762480478" sldId="262"/>
+            <ac:spMk id="7" creationId="{2A696870-896C-2D40-A31B-D07E640CEB0C}"/>
+          </ac:spMkLst>
+        </pc:spChg>
+        <pc:grpChg chg="add del mod">
+          <ac:chgData name="Peter Mordaunt" userId="bb5abcbb151840ed" providerId="LiveId" clId="{A7FEC831-BDE6-4C4C-9C14-DA98583E0717}" dt="2021-12-10T16:36:24.042" v="831" actId="165"/>
+          <ac:grpSpMkLst>
+            <pc:docMk/>
+            <pc:sldMk cId="1762480478" sldId="262"/>
+            <ac:grpSpMk id="8" creationId="{E0193C1E-10EC-A64B-8C04-80DFB06B650C}"/>
+          </ac:grpSpMkLst>
+        </pc:grpChg>
+        <pc:grpChg chg="add mod">
+          <ac:chgData name="Peter Mordaunt" userId="bb5abcbb151840ed" providerId="LiveId" clId="{A7FEC831-BDE6-4C4C-9C14-DA98583E0717}" dt="2021-12-10T16:37:03.865" v="838" actId="164"/>
+          <ac:grpSpMkLst>
+            <pc:docMk/>
+            <pc:sldMk cId="1762480478" sldId="262"/>
+            <ac:grpSpMk id="11" creationId="{019FF516-93BD-FE4C-ADB8-9236401EFF19}"/>
+          </ac:grpSpMkLst>
+        </pc:grpChg>
+        <pc:picChg chg="add del mod">
+          <ac:chgData name="Peter Mordaunt" userId="bb5abcbb151840ed" providerId="LiveId" clId="{A7FEC831-BDE6-4C4C-9C14-DA98583E0717}" dt="2021-12-10T16:28:45.164" v="487" actId="478"/>
+          <ac:picMkLst>
+            <pc:docMk/>
+            <pc:sldMk cId="1762480478" sldId="262"/>
+            <ac:picMk id="3" creationId="{D7D2BF7D-DC09-184D-81FC-8FAFBE95F842}"/>
+          </ac:picMkLst>
+        </pc:picChg>
+        <pc:picChg chg="add del mod topLvl">
+          <ac:chgData name="Peter Mordaunt" userId="bb5abcbb151840ed" providerId="LiveId" clId="{A7FEC831-BDE6-4C4C-9C14-DA98583E0717}" dt="2021-12-10T16:36:27.122" v="832" actId="478"/>
+          <ac:picMkLst>
+            <pc:docMk/>
+            <pc:sldMk cId="1762480478" sldId="262"/>
+            <ac:picMk id="5" creationId="{2D55A173-CE06-1F45-A323-9505376150DD}"/>
+          </ac:picMkLst>
+        </pc:picChg>
+        <pc:picChg chg="add mod">
+          <ac:chgData name="Peter Mordaunt" userId="bb5abcbb151840ed" providerId="LiveId" clId="{A7FEC831-BDE6-4C4C-9C14-DA98583E0717}" dt="2021-12-10T16:37:03.865" v="838" actId="164"/>
+          <ac:picMkLst>
+            <pc:docMk/>
+            <pc:sldMk cId="1762480478" sldId="262"/>
+            <ac:picMk id="10" creationId="{48EEAFBF-BD6E-A047-B7FD-93010769BB79}"/>
+          </ac:picMkLst>
+        </pc:picChg>
+      </pc:sldChg>
+      <pc:sldChg chg="addSp modSp new mod">
+        <pc:chgData name="Peter Mordaunt" userId="bb5abcbb151840ed" providerId="LiveId" clId="{A7FEC831-BDE6-4C4C-9C14-DA98583E0717}" dt="2021-12-10T16:32:59.684" v="643" actId="14100"/>
+        <pc:sldMkLst>
+          <pc:docMk/>
+          <pc:sldMk cId="283867155" sldId="263"/>
+        </pc:sldMkLst>
+        <pc:spChg chg="add mod">
+          <ac:chgData name="Peter Mordaunt" userId="bb5abcbb151840ed" providerId="LiveId" clId="{A7FEC831-BDE6-4C4C-9C14-DA98583E0717}" dt="2021-12-10T16:32:55.092" v="642" actId="1076"/>
+          <ac:spMkLst>
+            <pc:docMk/>
+            <pc:sldMk cId="283867155" sldId="263"/>
+            <ac:spMk id="3" creationId="{08BA3C60-A759-DA4A-81DE-4AF593265CD0}"/>
+          </ac:spMkLst>
+        </pc:spChg>
+        <pc:picChg chg="add mod">
+          <ac:chgData name="Peter Mordaunt" userId="bb5abcbb151840ed" providerId="LiveId" clId="{A7FEC831-BDE6-4C4C-9C14-DA98583E0717}" dt="2021-12-10T16:32:59.684" v="643" actId="14100"/>
+          <ac:picMkLst>
+            <pc:docMk/>
+            <pc:sldMk cId="283867155" sldId="263"/>
+            <ac:picMk id="2" creationId="{73F2A193-D58D-004E-A6E4-ABBDB26D6ECA}"/>
+          </ac:picMkLst>
+        </pc:picChg>
       </pc:sldChg>
       <pc:sldMasterChg chg="setBg modSldLayout">
         <pc:chgData name="Peter Mordaunt" userId="bb5abcbb151840ed" providerId="LiveId" clId="{A7FEC831-BDE6-4C4C-9C14-DA98583E0717}" dt="2021-12-10T15:04:31.560" v="332"/>
@@ -9585,11 +9711,128 @@
 <file path=ppt/slides/slide5.xml><?xml version="1.0" encoding="utf-8"?>
 <p:sld xmlns:a="http://schemas.openxmlformats.org/drawingml/2006/main" xmlns:r="http://schemas.openxmlformats.org/officeDocument/2006/relationships" xmlns:p="http://schemas.openxmlformats.org/presentationml/2006/main">
   <p:cSld>
+    <p:spTree>
+      <p:nvGrpSpPr>
+        <p:cNvPr id="1" name=""/>
+        <p:cNvGrpSpPr/>
+        <p:nvPr/>
+      </p:nvGrpSpPr>
+      <p:grpSpPr>
+        <a:xfrm>
+          <a:off x="0" y="0"/>
+          <a:ext cx="0" cy="0"/>
+          <a:chOff x="0" y="0"/>
+          <a:chExt cx="0" cy="0"/>
+        </a:xfrm>
+      </p:grpSpPr>
+      <p:pic>
+        <p:nvPicPr>
+          <p:cNvPr id="2" name="Picture 1" descr="Graphical user interface&#10;&#10;Description automatically generated">
+            <a:extLst>
+              <a:ext uri="{FF2B5EF4-FFF2-40B4-BE49-F238E27FC236}">
+                <a16:creationId xmlns:a16="http://schemas.microsoft.com/office/drawing/2014/main" id="{73F2A193-D58D-004E-A6E4-ABBDB26D6ECA}"/>
+              </a:ext>
+            </a:extLst>
+          </p:cNvPr>
+          <p:cNvPicPr>
+            <a:picLocks noChangeAspect="1"/>
+          </p:cNvPicPr>
+          <p:nvPr/>
+        </p:nvPicPr>
+        <p:blipFill>
+          <a:blip r:embed="rId2"/>
+          <a:stretch>
+            <a:fillRect/>
+          </a:stretch>
+        </p:blipFill>
+        <p:spPr>
+          <a:xfrm>
+            <a:off x="1089589" y="682525"/>
+            <a:ext cx="9397436" cy="5755928"/>
+          </a:xfrm>
+          <a:prstGeom prst="rect">
+            <a:avLst/>
+          </a:prstGeom>
+          <a:ln>
+            <a:noFill/>
+          </a:ln>
+          <a:effectLst>
+            <a:outerShdw blurRad="76200" dist="63500" dir="5040000" algn="tl" rotWithShape="0">
+              <a:srgbClr val="000000">
+                <a:alpha val="41000"/>
+              </a:srgbClr>
+            </a:outerShdw>
+          </a:effectLst>
+        </p:spPr>
+      </p:pic>
+      <p:sp>
+        <p:nvSpPr>
+          <p:cNvPr id="3" name="TextBox 2">
+            <a:extLst>
+              <a:ext uri="{FF2B5EF4-FFF2-40B4-BE49-F238E27FC236}">
+                <a16:creationId xmlns:a16="http://schemas.microsoft.com/office/drawing/2014/main" id="{08BA3C60-A759-DA4A-81DE-4AF593265CD0}"/>
+              </a:ext>
+            </a:extLst>
+          </p:cNvPr>
+          <p:cNvSpPr txBox="1"/>
+          <p:nvPr/>
+        </p:nvSpPr>
+        <p:spPr>
+          <a:xfrm>
+            <a:off x="10787062" y="800100"/>
+            <a:ext cx="1125629" cy="923330"/>
+          </a:xfrm>
+          <a:prstGeom prst="rect">
+            <a:avLst/>
+          </a:prstGeom>
+          <a:noFill/>
+        </p:spPr>
+        <p:txBody>
+          <a:bodyPr wrap="none" rtlCol="0">
+            <a:spAutoFit/>
+          </a:bodyPr>
+          <a:lstStyle/>
+          <a:p>
+            <a:r>
+              <a:rPr lang="en-US" dirty="0"/>
+              <a:t>DB</a:t>
+            </a:r>
+          </a:p>
+          <a:p>
+            <a:r>
+              <a:rPr lang="en-US" dirty="0"/>
+              <a:t>Table</a:t>
+            </a:r>
+          </a:p>
+          <a:p>
+            <a:r>
+              <a:rPr lang="en-US" dirty="0"/>
+              <a:t>Diagrams</a:t>
+            </a:r>
+          </a:p>
+        </p:txBody>
+      </p:sp>
+    </p:spTree>
+    <p:extLst>
+      <p:ext uri="{BB962C8B-B14F-4D97-AF65-F5344CB8AC3E}">
+        <p14:creationId xmlns:p14="http://schemas.microsoft.com/office/powerpoint/2010/main" val="283867155"/>
+      </p:ext>
+    </p:extLst>
+  </p:cSld>
+  <p:clrMapOvr>
+    <a:masterClrMapping/>
+  </p:clrMapOvr>
+</p:sld>
+</file>
+
+<file path=ppt/slides/slide6.xml><?xml version="1.0" encoding="utf-8"?>
+<p:sld xmlns:a="http://schemas.openxmlformats.org/drawingml/2006/main" xmlns:r="http://schemas.openxmlformats.org/officeDocument/2006/relationships" xmlns:p="http://schemas.openxmlformats.org/presentationml/2006/main">
+  <p:cSld>
     <p:bg>
       <p:bgPr>
-        <a:gradFill rotWithShape="1">
+        <a:gradFill flip="none" rotWithShape="1">
           <a:gsLst>
-            <a:gs pos="0">
+            <a:gs pos="75000">
               <a:schemeClr val="bg2">
                 <a:tint val="96000"/>
                 <a:shade val="100000"/>
@@ -9598,7 +9841,7 @@
                 <a:lumMod val="128000"/>
               </a:schemeClr>
             </a:gs>
-            <a:gs pos="50000">
+            <a:gs pos="25000">
               <a:schemeClr val="bg2">
                 <a:shade val="100000"/>
                 <a:hueMod val="100000"/>
@@ -9606,7 +9849,7 @@
                 <a:lumMod val="130000"/>
               </a:schemeClr>
             </a:gs>
-            <a:gs pos="100000">
+            <a:gs pos="0">
               <a:schemeClr val="bg2">
                 <a:shade val="78000"/>
                 <a:hueMod val="44000"/>
@@ -9616,6 +9859,7 @@
             </a:gs>
           </a:gsLst>
           <a:lin ang="2520000" scaled="0"/>
+          <a:tileRect/>
         </a:gradFill>
         <a:effectLst/>
       </p:bgPr>
@@ -9634,622 +9878,284 @@
           <a:chExt cx="0" cy="0"/>
         </a:xfrm>
       </p:grpSpPr>
-      <p:pic>
-        <p:nvPicPr>
-          <p:cNvPr id="11" name="Picture 13">
+      <p:sp>
+        <p:nvSpPr>
+          <p:cNvPr id="7" name="TextBox 6">
             <a:extLst>
               <a:ext uri="{FF2B5EF4-FFF2-40B4-BE49-F238E27FC236}">
-                <a16:creationId xmlns:a16="http://schemas.microsoft.com/office/drawing/2014/main" id="{5321D838-2C7E-4177-9DD3-DAC78324A2B2}"/>
-              </a:ext>
-              <a:ext uri="{C183D7F6-B498-43B3-948B-1728B52AA6E4}">
-                <adec:decorative xmlns:adec="http://schemas.microsoft.com/office/drawing/2017/decorative" val="1"/>
+                <a16:creationId xmlns:a16="http://schemas.microsoft.com/office/drawing/2014/main" id="{2A696870-896C-2D40-A31B-D07E640CEB0C}"/>
               </a:ext>
             </a:extLst>
           </p:cNvPr>
-          <p:cNvPicPr>
-            <a:picLocks noGrp="1" noRot="1" noChangeAspect="1" noMove="1" noResize="1" noEditPoints="1" noAdjustHandles="1" noChangeArrowheads="1" noChangeShapeType="1" noCrop="1"/>
-          </p:cNvPicPr>
-          <p:nvPr>
-            <p:extLst>
-              <p:ext uri="{386F3935-93C4-4BCD-93E2-E3B085C9AB24}">
-                <p16:designElem xmlns:p16="http://schemas.microsoft.com/office/powerpoint/2015/main" val="1"/>
-              </p:ext>
-            </p:extLst>
-          </p:nvPr>
-        </p:nvPicPr>
-        <p:blipFill>
-          <a:blip r:embed="rId2">
-            <a:alphaModFix amt="10000"/>
-            <a:extLst>
-              <a:ext uri="{28A0092B-C50C-407E-A947-70E740481C1C}">
-                <a14:useLocalDpi xmlns:a14="http://schemas.microsoft.com/office/drawing/2010/main" val="0"/>
-              </a:ext>
-            </a:extLst>
-          </a:blip>
-          <a:stretch>
-            <a:fillRect/>
-          </a:stretch>
-        </p:blipFill>
-        <p:spPr>
-          <a:xfrm>
-            <a:off x="0" y="0"/>
-            <a:ext cx="12192000" cy="6858000"/>
+          <p:cNvSpPr txBox="1"/>
+          <p:nvPr/>
+        </p:nvSpPr>
+        <p:spPr>
+          <a:xfrm>
+            <a:off x="10815638" y="842963"/>
+            <a:ext cx="1128712" cy="646331"/>
           </a:xfrm>
           <a:prstGeom prst="rect">
             <a:avLst/>
           </a:prstGeom>
-        </p:spPr>
-      </p:pic>
-      <p:pic>
-        <p:nvPicPr>
-          <p:cNvPr id="12" name="Picture 15">
+          <a:noFill/>
+        </p:spPr>
+        <p:txBody>
+          <a:bodyPr wrap="square" rtlCol="0">
+            <a:spAutoFit/>
+          </a:bodyPr>
+          <a:lstStyle/>
+          <a:p>
+            <a:r>
+              <a:rPr lang="en-US" dirty="0"/>
+              <a:t>Site</a:t>
+            </a:r>
+          </a:p>
+          <a:p>
+            <a:r>
+              <a:rPr lang="en-US" dirty="0"/>
+              <a:t>Map</a:t>
+            </a:r>
+          </a:p>
+        </p:txBody>
+      </p:sp>
+      <p:grpSp>
+        <p:nvGrpSpPr>
+          <p:cNvPr id="11" name="Group 10">
             <a:extLst>
               <a:ext uri="{FF2B5EF4-FFF2-40B4-BE49-F238E27FC236}">
-                <a16:creationId xmlns:a16="http://schemas.microsoft.com/office/drawing/2014/main" id="{0146E45C-1450-4186-B501-74F221F897A8}"/>
-              </a:ext>
-              <a:ext uri="{C183D7F6-B498-43B3-948B-1728B52AA6E4}">
-                <adec:decorative xmlns:adec="http://schemas.microsoft.com/office/drawing/2017/decorative" val="1"/>
+                <a16:creationId xmlns:a16="http://schemas.microsoft.com/office/drawing/2014/main" id="{019FF516-93BD-FE4C-ADB8-9236401EFF19}"/>
               </a:ext>
             </a:extLst>
           </p:cNvPr>
-          <p:cNvPicPr>
-            <a:picLocks noGrp="1" noRot="1" noChangeAspect="1" noMove="1" noResize="1" noEditPoints="1" noAdjustHandles="1" noChangeArrowheads="1" noChangeShapeType="1" noCrop="1"/>
-          </p:cNvPicPr>
-          <p:nvPr>
-            <p:extLst>
-              <p:ext uri="{386F3935-93C4-4BCD-93E2-E3B085C9AB24}">
-                <p16:designElem xmlns:p16="http://schemas.microsoft.com/office/powerpoint/2015/main" val="1"/>
-              </p:ext>
-            </p:extLst>
-          </p:nvPr>
-        </p:nvPicPr>
-        <p:blipFill>
-          <a:blip r:embed="rId3">
-            <a:extLst>
-              <a:ext uri="{28A0092B-C50C-407E-A947-70E740481C1C}">
-                <a14:useLocalDpi xmlns:a14="http://schemas.microsoft.com/office/drawing/2010/main" val="0"/>
-              </a:ext>
-            </a:extLst>
-          </a:blip>
-          <a:stretch>
-            <a:fillRect/>
-          </a:stretch>
-        </p:blipFill>
-        <p:spPr>
-          <a:xfrm>
-            <a:off x="1" y="4242851"/>
-            <a:ext cx="8968084" cy="275942"/>
-          </a:xfrm>
-          <a:prstGeom prst="rect">
-            <a:avLst/>
-          </a:prstGeom>
-        </p:spPr>
-      </p:pic>
-      <p:pic>
-        <p:nvPicPr>
-          <p:cNvPr id="13" name="Picture 17">
-            <a:extLst>
-              <a:ext uri="{FF2B5EF4-FFF2-40B4-BE49-F238E27FC236}">
-                <a16:creationId xmlns:a16="http://schemas.microsoft.com/office/drawing/2014/main" id="{EEDDA48B-BC04-4915-ADA3-A1A9522EB0D1}"/>
-              </a:ext>
-              <a:ext uri="{C183D7F6-B498-43B3-948B-1728B52AA6E4}">
-                <adec:decorative xmlns:adec="http://schemas.microsoft.com/office/drawing/2017/decorative" val="1"/>
-              </a:ext>
-            </a:extLst>
-          </p:cNvPr>
-          <p:cNvPicPr>
-            <a:picLocks noGrp="1" noRot="1" noChangeAspect="1" noMove="1" noResize="1" noEditPoints="1" noAdjustHandles="1" noChangeArrowheads="1" noChangeShapeType="1" noCrop="1"/>
-          </p:cNvPicPr>
-          <p:nvPr>
-            <p:extLst>
-              <p:ext uri="{386F3935-93C4-4BCD-93E2-E3B085C9AB24}">
-                <p16:designElem xmlns:p16="http://schemas.microsoft.com/office/powerpoint/2015/main" val="1"/>
-              </p:ext>
-            </p:extLst>
-          </p:nvPr>
-        </p:nvPicPr>
-        <p:blipFill>
-          <a:blip r:embed="rId4">
-            <a:extLst>
-              <a:ext uri="{28A0092B-C50C-407E-A947-70E740481C1C}">
-                <a14:useLocalDpi xmlns:a14="http://schemas.microsoft.com/office/drawing/2010/main" val="0"/>
-              </a:ext>
-            </a:extLst>
-          </a:blip>
-          <a:stretch>
-            <a:fillRect/>
-          </a:stretch>
-        </p:blipFill>
-        <p:spPr>
-          <a:xfrm>
-            <a:off x="9111716" y="4243845"/>
-            <a:ext cx="3077108" cy="276940"/>
-          </a:xfrm>
-          <a:prstGeom prst="rect">
-            <a:avLst/>
-          </a:prstGeom>
-        </p:spPr>
-      </p:pic>
-      <p:sp>
-        <p:nvSpPr>
-          <p:cNvPr id="15" name="Rectangle 19">
-            <a:extLst>
-              <a:ext uri="{FF2B5EF4-FFF2-40B4-BE49-F238E27FC236}">
-                <a16:creationId xmlns:a16="http://schemas.microsoft.com/office/drawing/2014/main" id="{78C9D07A-5A22-4E55-B18A-47CF07E5080D}"/>
-              </a:ext>
-              <a:ext uri="{C183D7F6-B498-43B3-948B-1728B52AA6E4}">
-                <adec:decorative xmlns:adec="http://schemas.microsoft.com/office/drawing/2017/decorative" val="1"/>
-              </a:ext>
-            </a:extLst>
-          </p:cNvPr>
-          <p:cNvSpPr>
-            <a:spLocks noGrp="1" noRot="1" noChangeAspect="1" noMove="1" noResize="1" noEditPoints="1" noAdjustHandles="1" noChangeArrowheads="1" noChangeShapeType="1" noTextEdit="1"/>
-          </p:cNvSpPr>
-          <p:nvPr>
-            <p:extLst>
-              <p:ext uri="{386F3935-93C4-4BCD-93E2-E3B085C9AB24}">
-                <p16:designElem xmlns:p16="http://schemas.microsoft.com/office/powerpoint/2015/main" val="1"/>
-              </p:ext>
-            </p:extLst>
-          </p:nvPr>
-        </p:nvSpPr>
-        <p:spPr>
-          <a:xfrm>
-            <a:off x="0" y="2590078"/>
-            <a:ext cx="8968085" cy="1660332"/>
-          </a:xfrm>
-          <a:prstGeom prst="rect">
-            <a:avLst/>
-          </a:prstGeom>
-          <a:solidFill>
-            <a:schemeClr val="bg1">
-              <a:lumMod val="85000"/>
-              <a:lumOff val="15000"/>
-            </a:schemeClr>
-          </a:solidFill>
-          <a:ln>
-            <a:noFill/>
-          </a:ln>
-        </p:spPr>
-        <p:style>
-          <a:lnRef idx="2">
-            <a:schemeClr val="accent1">
-              <a:shade val="50000"/>
-            </a:schemeClr>
-          </a:lnRef>
-          <a:fillRef idx="1">
-            <a:schemeClr val="accent1"/>
-          </a:fillRef>
-          <a:effectRef idx="0">
-            <a:schemeClr val="accent1"/>
-          </a:effectRef>
-          <a:fontRef idx="minor">
-            <a:schemeClr val="lt1"/>
-          </a:fontRef>
-        </p:style>
-      </p:sp>
-      <p:sp>
-        <p:nvSpPr>
-          <p:cNvPr id="17" name="Rectangle 21">
-            <a:extLst>
-              <a:ext uri="{FF2B5EF4-FFF2-40B4-BE49-F238E27FC236}">
-                <a16:creationId xmlns:a16="http://schemas.microsoft.com/office/drawing/2014/main" id="{3D71E629-0739-4A59-972B-A9E9A4500E31}"/>
-              </a:ext>
-              <a:ext uri="{C183D7F6-B498-43B3-948B-1728B52AA6E4}">
-                <adec:decorative xmlns:adec="http://schemas.microsoft.com/office/drawing/2017/decorative" val="1"/>
-              </a:ext>
-            </a:extLst>
-          </p:cNvPr>
-          <p:cNvSpPr>
-            <a:spLocks noGrp="1" noRot="1" noChangeAspect="1" noMove="1" noResize="1" noEditPoints="1" noAdjustHandles="1" noChangeArrowheads="1" noChangeShapeType="1" noTextEdit="1"/>
-          </p:cNvSpPr>
-          <p:nvPr>
-            <p:extLst>
-              <p:ext uri="{386F3935-93C4-4BCD-93E2-E3B085C9AB24}">
-                <p16:designElem xmlns:p16="http://schemas.microsoft.com/office/powerpoint/2015/main" val="1"/>
-              </p:ext>
-            </p:extLst>
-          </p:nvPr>
-        </p:nvSpPr>
-        <p:spPr>
-          <a:xfrm>
-            <a:off x="9111715" y="2590078"/>
-            <a:ext cx="3077109" cy="1660332"/>
-          </a:xfrm>
-          <a:prstGeom prst="rect">
-            <a:avLst/>
-          </a:prstGeom>
-          <a:solidFill>
-            <a:schemeClr val="accent1"/>
-          </a:solidFill>
-          <a:ln>
-            <a:noFill/>
-          </a:ln>
-        </p:spPr>
-        <p:style>
-          <a:lnRef idx="2">
-            <a:schemeClr val="accent1">
-              <a:shade val="50000"/>
-            </a:schemeClr>
-          </a:lnRef>
-          <a:fillRef idx="1">
-            <a:schemeClr val="accent1"/>
-          </a:fillRef>
-          <a:effectRef idx="0">
-            <a:schemeClr val="accent1"/>
-          </a:effectRef>
-          <a:fontRef idx="minor">
-            <a:schemeClr val="lt1"/>
-          </a:fontRef>
-        </p:style>
-      </p:sp>
-      <p:sp useBgFill="1">
-        <p:nvSpPr>
-          <p:cNvPr id="19" name="Rectangle 23">
-            <a:extLst>
-              <a:ext uri="{FF2B5EF4-FFF2-40B4-BE49-F238E27FC236}">
-                <a16:creationId xmlns:a16="http://schemas.microsoft.com/office/drawing/2014/main" id="{2F84762E-7FCC-4EAF-B9E7-CE7214491E0D}"/>
-              </a:ext>
-              <a:ext uri="{C183D7F6-B498-43B3-948B-1728B52AA6E4}">
-                <adec:decorative xmlns:adec="http://schemas.microsoft.com/office/drawing/2017/decorative" val="1"/>
-              </a:ext>
-            </a:extLst>
-          </p:cNvPr>
-          <p:cNvSpPr>
-            <a:spLocks noGrp="1" noRot="1" noChangeAspect="1" noMove="1" noResize="1" noEditPoints="1" noAdjustHandles="1" noChangeArrowheads="1" noChangeShapeType="1" noTextEdit="1"/>
-          </p:cNvSpPr>
-          <p:nvPr>
-            <p:extLst>
-              <p:ext uri="{386F3935-93C4-4BCD-93E2-E3B085C9AB24}">
-                <p16:designElem xmlns:p16="http://schemas.microsoft.com/office/powerpoint/2015/main" val="1"/>
-              </p:ext>
-            </p:extLst>
-          </p:nvPr>
-        </p:nvSpPr>
-        <p:spPr>
-          <a:xfrm>
-            <a:off x="0" y="0"/>
-            <a:ext cx="12188824" cy="6858000"/>
-          </a:xfrm>
-          <a:prstGeom prst="rect">
-            <a:avLst/>
-          </a:prstGeom>
-          <a:ln>
-            <a:noFill/>
-          </a:ln>
-        </p:spPr>
-        <p:style>
-          <a:lnRef idx="2">
-            <a:schemeClr val="accent1">
-              <a:shade val="50000"/>
-            </a:schemeClr>
-          </a:lnRef>
-          <a:fillRef idx="1">
-            <a:schemeClr val="accent1"/>
-          </a:fillRef>
-          <a:effectRef idx="0">
-            <a:schemeClr val="accent1"/>
-          </a:effectRef>
-          <a:fontRef idx="minor">
-            <a:schemeClr val="lt1"/>
-          </a:fontRef>
-        </p:style>
-        <p:txBody>
-          <a:bodyPr rtlCol="0" anchor="ctr"/>
-          <a:lstStyle/>
-          <a:p>
-            <a:pPr algn="ctr"/>
-            <a:endParaRPr lang="en-US"/>
-          </a:p>
-        </p:txBody>
-      </p:sp>
-      <p:pic>
-        <p:nvPicPr>
-          <p:cNvPr id="21" name="Picture 25">
-            <a:extLst>
-              <a:ext uri="{FF2B5EF4-FFF2-40B4-BE49-F238E27FC236}">
-                <a16:creationId xmlns:a16="http://schemas.microsoft.com/office/drawing/2014/main" id="{927A1389-2A5D-4886-AD82-F213767E673F}"/>
-              </a:ext>
-              <a:ext uri="{C183D7F6-B498-43B3-948B-1728B52AA6E4}">
-                <adec:decorative xmlns:adec="http://schemas.microsoft.com/office/drawing/2017/decorative" val="1"/>
-              </a:ext>
-            </a:extLst>
-          </p:cNvPr>
-          <p:cNvPicPr>
-            <a:picLocks noGrp="1" noRot="1" noChangeAspect="1" noMove="1" noResize="1" noEditPoints="1" noAdjustHandles="1" noChangeArrowheads="1" noChangeShapeType="1" noCrop="1"/>
-          </p:cNvPicPr>
-          <p:nvPr>
-            <p:extLst>
-              <p:ext uri="{386F3935-93C4-4BCD-93E2-E3B085C9AB24}">
-                <p16:designElem xmlns:p16="http://schemas.microsoft.com/office/powerpoint/2015/main" val="1"/>
-              </p:ext>
-            </p:extLst>
-          </p:nvPr>
-        </p:nvPicPr>
-        <p:blipFill>
-          <a:blip r:embed="rId2">
-            <a:alphaModFix amt="10000"/>
-            <a:extLst>
-              <a:ext uri="{28A0092B-C50C-407E-A947-70E740481C1C}">
-                <a14:useLocalDpi xmlns:a14="http://schemas.microsoft.com/office/drawing/2010/main" val="0"/>
-              </a:ext>
-            </a:extLst>
-          </a:blip>
-          <a:stretch>
-            <a:fillRect/>
-          </a:stretch>
-        </p:blipFill>
-        <p:spPr>
-          <a:xfrm>
-            <a:off x="0" y="-8207"/>
-            <a:ext cx="12192000" cy="6858000"/>
-          </a:xfrm>
-          <a:prstGeom prst="rect">
-            <a:avLst/>
-          </a:prstGeom>
-        </p:spPr>
-      </p:pic>
-      <p:sp>
-        <p:nvSpPr>
-          <p:cNvPr id="23" name="Rectangle 27">
-            <a:extLst>
-              <a:ext uri="{FF2B5EF4-FFF2-40B4-BE49-F238E27FC236}">
-                <a16:creationId xmlns:a16="http://schemas.microsoft.com/office/drawing/2014/main" id="{A1038667-0C3F-4764-A24D-DA9D9B474851}"/>
-              </a:ext>
-              <a:ext uri="{C183D7F6-B498-43B3-948B-1728B52AA6E4}">
-                <adec:decorative xmlns:adec="http://schemas.microsoft.com/office/drawing/2017/decorative" val="1"/>
-              </a:ext>
-            </a:extLst>
-          </p:cNvPr>
-          <p:cNvSpPr>
-            <a:spLocks noGrp="1" noRot="1" noChangeAspect="1" noMove="1" noResize="1" noEditPoints="1" noAdjustHandles="1" noChangeArrowheads="1" noChangeShapeType="1" noTextEdit="1"/>
-          </p:cNvSpPr>
-          <p:nvPr>
-            <p:extLst>
-              <p:ext uri="{386F3935-93C4-4BCD-93E2-E3B085C9AB24}">
-                <p16:designElem xmlns:p16="http://schemas.microsoft.com/office/powerpoint/2015/main" val="1"/>
-              </p:ext>
-            </p:extLst>
-          </p:nvPr>
-        </p:nvSpPr>
-        <p:spPr>
-          <a:xfrm>
-            <a:off x="4644527" y="0"/>
-            <a:ext cx="7552944" cy="6858001"/>
-          </a:xfrm>
-          <a:prstGeom prst="rect">
-            <a:avLst/>
-          </a:prstGeom>
-          <a:ln>
-            <a:noFill/>
-          </a:ln>
-        </p:spPr>
-        <p:style>
-          <a:lnRef idx="2">
-            <a:schemeClr val="accent1">
-              <a:shade val="50000"/>
-            </a:schemeClr>
-          </a:lnRef>
-          <a:fillRef idx="1">
-            <a:schemeClr val="accent1"/>
-          </a:fillRef>
-          <a:effectRef idx="0">
-            <a:schemeClr val="accent1"/>
-          </a:effectRef>
-          <a:fontRef idx="minor">
-            <a:schemeClr val="lt1"/>
-          </a:fontRef>
-        </p:style>
-        <p:txBody>
-          <a:bodyPr rtlCol="0" anchor="ctr"/>
-          <a:lstStyle/>
-          <a:p>
-            <a:pPr algn="ctr"/>
-            <a:endParaRPr lang="en-US"/>
-          </a:p>
-        </p:txBody>
-      </p:sp>
-      <p:pic>
-        <p:nvPicPr>
-          <p:cNvPr id="25" name="Picture 29">
-            <a:extLst>
-              <a:ext uri="{FF2B5EF4-FFF2-40B4-BE49-F238E27FC236}">
-                <a16:creationId xmlns:a16="http://schemas.microsoft.com/office/drawing/2014/main" id="{6AC2195B-895A-4535-8ECD-9F5B669C5CA5}"/>
-              </a:ext>
-              <a:ext uri="{C183D7F6-B498-43B3-948B-1728B52AA6E4}">
-                <adec:decorative xmlns:adec="http://schemas.microsoft.com/office/drawing/2017/decorative" val="1"/>
-              </a:ext>
-            </a:extLst>
-          </p:cNvPr>
-          <p:cNvPicPr>
-            <a:picLocks noGrp="1" noRot="1" noChangeAspect="1" noMove="1" noResize="1" noEditPoints="1" noAdjustHandles="1" noChangeArrowheads="1" noChangeShapeType="1" noCrop="1"/>
-          </p:cNvPicPr>
-          <p:nvPr>
-            <p:extLst>
-              <p:ext uri="{386F3935-93C4-4BCD-93E2-E3B085C9AB24}">
-                <p16:designElem xmlns:p16="http://schemas.microsoft.com/office/powerpoint/2015/main" val="1"/>
-              </p:ext>
-            </p:extLst>
-          </p:nvPr>
-        </p:nvPicPr>
-        <p:blipFill>
-          <a:blip r:embed="rId5" cstate="print">
-            <a:extLst>
-              <a:ext uri="{28A0092B-C50C-407E-A947-70E740481C1C}">
-                <a14:useLocalDpi xmlns:a14="http://schemas.microsoft.com/office/drawing/2010/main" val="0"/>
-              </a:ext>
-            </a:extLst>
-          </a:blip>
-          <a:stretch>
-            <a:fillRect/>
-          </a:stretch>
-        </p:blipFill>
-        <p:spPr>
-          <a:xfrm>
-            <a:off x="1" y="5006045"/>
-            <a:ext cx="4965192" cy="144049"/>
-          </a:xfrm>
-          <a:prstGeom prst="rect">
-            <a:avLst/>
-          </a:prstGeom>
-        </p:spPr>
-      </p:pic>
-      <p:sp>
-        <p:nvSpPr>
-          <p:cNvPr id="27" name="Rectangle 31">
-            <a:extLst>
-              <a:ext uri="{FF2B5EF4-FFF2-40B4-BE49-F238E27FC236}">
-                <a16:creationId xmlns:a16="http://schemas.microsoft.com/office/drawing/2014/main" id="{571EEFCA-9235-4BC2-85C3-A4EC6EE57AC4}"/>
-              </a:ext>
-              <a:ext uri="{C183D7F6-B498-43B3-948B-1728B52AA6E4}">
-                <adec:decorative xmlns:adec="http://schemas.microsoft.com/office/drawing/2017/decorative" val="1"/>
-              </a:ext>
-            </a:extLst>
-          </p:cNvPr>
-          <p:cNvSpPr>
-            <a:spLocks noGrp="1" noRot="1" noChangeAspect="1" noMove="1" noResize="1" noEditPoints="1" noAdjustHandles="1" noChangeArrowheads="1" noChangeShapeType="1" noTextEdit="1"/>
-          </p:cNvSpPr>
-          <p:nvPr>
-            <p:extLst>
-              <p:ext uri="{386F3935-93C4-4BCD-93E2-E3B085C9AB24}">
-                <p16:designElem xmlns:p16="http://schemas.microsoft.com/office/powerpoint/2015/main" val="1"/>
-              </p:ext>
-            </p:extLst>
-          </p:nvPr>
-        </p:nvSpPr>
-        <p:spPr>
-          <a:xfrm>
-            <a:off x="-1" y="1838764"/>
-            <a:ext cx="4964567" cy="3180473"/>
-          </a:xfrm>
-          <a:prstGeom prst="rect">
-            <a:avLst/>
-          </a:prstGeom>
-          <a:solidFill>
-            <a:schemeClr val="bg1">
-              <a:lumMod val="85000"/>
-              <a:lumOff val="15000"/>
-            </a:schemeClr>
-          </a:solidFill>
-          <a:ln>
-            <a:noFill/>
-          </a:ln>
-        </p:spPr>
-        <p:style>
-          <a:lnRef idx="2">
-            <a:schemeClr val="accent1">
-              <a:shade val="50000"/>
-            </a:schemeClr>
-          </a:lnRef>
-          <a:fillRef idx="1">
-            <a:schemeClr val="accent1"/>
-          </a:fillRef>
-          <a:effectRef idx="0">
-            <a:schemeClr val="accent1"/>
-          </a:effectRef>
-          <a:fontRef idx="minor">
-            <a:schemeClr val="lt1"/>
-          </a:fontRef>
-        </p:style>
-      </p:sp>
-      <p:sp>
-        <p:nvSpPr>
-          <p:cNvPr id="2" name="Title 1">
-            <a:extLst>
-              <a:ext uri="{FF2B5EF4-FFF2-40B4-BE49-F238E27FC236}">
-                <a16:creationId xmlns:a16="http://schemas.microsoft.com/office/drawing/2014/main" id="{6CD65C7D-04DE-3A42-B505-AF8215E05AA3}"/>
-              </a:ext>
-            </a:extLst>
-          </p:cNvPr>
-          <p:cNvSpPr>
-            <a:spLocks noGrp="1"/>
-          </p:cNvSpPr>
-          <p:nvPr>
-            <p:ph type="title"/>
-          </p:nvPr>
-        </p:nvSpPr>
-        <p:spPr>
-          <a:xfrm>
-            <a:off x="-5472" y="2073665"/>
-            <a:ext cx="2377197" cy="2176745"/>
-          </a:xfrm>
-        </p:spPr>
-        <p:txBody>
-          <a:bodyPr vert="horz" lIns="91440" tIns="45720" rIns="91440" bIns="45720" rtlCol="0" anchor="ctr">
-            <a:normAutofit/>
-          </a:bodyPr>
-          <a:lstStyle/>
-          <a:p>
-            <a:pPr algn="r"/>
-            <a:r>
-              <a:rPr lang="en-US" sz="3200" dirty="0"/>
-              <a:t>Planning – DB Table Diagrams</a:t>
-            </a:r>
-          </a:p>
-        </p:txBody>
-      </p:sp>
-      <p:pic>
-        <p:nvPicPr>
-          <p:cNvPr id="9" name="Picture 8" descr="Graphical user interface&#10;&#10;Description automatically generated">
-            <a:extLst>
-              <a:ext uri="{FF2B5EF4-FFF2-40B4-BE49-F238E27FC236}">
-                <a16:creationId xmlns:a16="http://schemas.microsoft.com/office/drawing/2014/main" id="{43785D1F-FC36-1541-9689-163A800863DB}"/>
-              </a:ext>
-            </a:extLst>
-          </p:cNvPr>
-          <p:cNvPicPr>
-            <a:picLocks noChangeAspect="1"/>
-          </p:cNvPicPr>
+          <p:cNvGrpSpPr/>
           <p:nvPr/>
-        </p:nvPicPr>
-        <p:blipFill>
-          <a:blip r:embed="rId6"/>
-          <a:stretch>
-            <a:fillRect/>
-          </a:stretch>
-        </p:blipFill>
-        <p:spPr>
-          <a:xfrm>
-            <a:off x="2661214" y="682525"/>
-            <a:ext cx="8968084" cy="5492950"/>
-          </a:xfrm>
-          <a:prstGeom prst="rect">
-            <a:avLst/>
-          </a:prstGeom>
-          <a:ln>
-            <a:noFill/>
-          </a:ln>
-          <a:effectLst>
-            <a:outerShdw blurRad="76200" dist="63500" dir="5040000" algn="tl" rotWithShape="0">
-              <a:srgbClr val="000000">
-                <a:alpha val="41000"/>
-              </a:srgbClr>
-            </a:outerShdw>
-          </a:effectLst>
-        </p:spPr>
-      </p:pic>
+        </p:nvGrpSpPr>
+        <p:grpSpPr>
+          <a:xfrm>
+            <a:off x="1262226" y="314325"/>
+            <a:ext cx="9819580" cy="6229350"/>
+            <a:chOff x="1262226" y="314325"/>
+            <a:chExt cx="9819580" cy="6229350"/>
+          </a:xfrm>
+        </p:grpSpPr>
+        <p:sp>
+          <p:nvSpPr>
+            <p:cNvPr id="6" name="Rounded Rectangle 5">
+              <a:extLst>
+                <a:ext uri="{FF2B5EF4-FFF2-40B4-BE49-F238E27FC236}">
+                  <a16:creationId xmlns:a16="http://schemas.microsoft.com/office/drawing/2014/main" id="{49916AD9-BEE6-8347-BDDD-359E9D503429}"/>
+                </a:ext>
+              </a:extLst>
+            </p:cNvPr>
+            <p:cNvSpPr/>
+            <p:nvPr/>
+          </p:nvSpPr>
+          <p:spPr>
+            <a:xfrm>
+              <a:off x="1262226" y="2307431"/>
+              <a:ext cx="309399" cy="4100513"/>
+            </a:xfrm>
+            <a:prstGeom prst="roundRect">
+              <a:avLst/>
+            </a:prstGeom>
+            <a:gradFill>
+              <a:gsLst>
+                <a:gs pos="0">
+                  <a:schemeClr val="accent3"/>
+                </a:gs>
+                <a:gs pos="34000">
+                  <a:schemeClr val="accent1"/>
+                </a:gs>
+                <a:gs pos="96000">
+                  <a:schemeClr val="accent6">
+                    <a:lumMod val="75000"/>
+                  </a:schemeClr>
+                </a:gs>
+              </a:gsLst>
+              <a:lin ang="2520000" scaled="0"/>
+            </a:gradFill>
+          </p:spPr>
+          <p:style>
+            <a:lnRef idx="2">
+              <a:schemeClr val="accent1">
+                <a:shade val="50000"/>
+              </a:schemeClr>
+            </a:lnRef>
+            <a:fillRef idx="1">
+              <a:schemeClr val="accent1"/>
+            </a:fillRef>
+            <a:effectRef idx="0">
+              <a:schemeClr val="accent1"/>
+            </a:effectRef>
+            <a:fontRef idx="minor">
+              <a:schemeClr val="lt1"/>
+            </a:fontRef>
+          </p:style>
+          <p:txBody>
+            <a:bodyPr rtlCol="0" anchor="ctr"/>
+            <a:lstStyle/>
+            <a:p>
+              <a:pPr algn="ctr"/>
+              <a:endParaRPr lang="en-US"/>
+            </a:p>
+          </p:txBody>
+        </p:sp>
+        <p:pic>
+          <p:nvPicPr>
+            <p:cNvPr id="10" name="Picture 9" descr="Diagram&#10;&#10;Description automatically generated">
+              <a:extLst>
+                <a:ext uri="{FF2B5EF4-FFF2-40B4-BE49-F238E27FC236}">
+                  <a16:creationId xmlns:a16="http://schemas.microsoft.com/office/drawing/2014/main" id="{48EEAFBF-BD6E-A047-B7FD-93010769BB79}"/>
+                </a:ext>
+              </a:extLst>
+            </p:cNvPr>
+            <p:cNvPicPr>
+              <a:picLocks noChangeAspect="1"/>
+            </p:cNvPicPr>
+            <p:nvPr/>
+          </p:nvPicPr>
+          <p:blipFill>
+            <a:blip r:embed="rId2"/>
+            <a:stretch>
+              <a:fillRect/>
+            </a:stretch>
+          </p:blipFill>
+          <p:spPr>
+            <a:xfrm>
+              <a:off x="1262226" y="314325"/>
+              <a:ext cx="9819580" cy="6229350"/>
+            </a:xfrm>
+            <a:prstGeom prst="rect">
+              <a:avLst/>
+            </a:prstGeom>
+          </p:spPr>
+        </p:pic>
+      </p:grpSp>
     </p:spTree>
     <p:extLst>
       <p:ext uri="{BB962C8B-B14F-4D97-AF65-F5344CB8AC3E}">
-        <p14:creationId xmlns:p14="http://schemas.microsoft.com/office/powerpoint/2010/main" val="1856906440"/>
+        <p14:creationId xmlns:p14="http://schemas.microsoft.com/office/powerpoint/2010/main" val="1762480478"/>
       </p:ext>
     </p:extLst>
   </p:cSld>
   <p:clrMapOvr>
     <a:masterClrMapping/>
   </p:clrMapOvr>
-  <mc:AlternateContent xmlns:mc="http://schemas.openxmlformats.org/markup-compatibility/2006">
-    <mc:Choice xmlns:p14="http://schemas.microsoft.com/office/powerpoint/2010/main" Requires="p14">
-      <p:transition spd="slow" p14:dur="1500">
-        <p14:window/>
-      </p:transition>
-    </mc:Choice>
-    <mc:Fallback>
-      <p:transition spd="slow">
-        <p:fade/>
-      </p:transition>
-    </mc:Fallback>
-  </mc:AlternateContent>
+</p:sld>
+</file>
+
+<file path=ppt/slides/slide7.xml><?xml version="1.0" encoding="utf-8"?>
+<p:sld xmlns:a="http://schemas.openxmlformats.org/drawingml/2006/main" xmlns:r="http://schemas.openxmlformats.org/officeDocument/2006/relationships" xmlns:p="http://schemas.openxmlformats.org/presentationml/2006/main">
+  <p:cSld>
+    <p:spTree>
+      <p:nvGrpSpPr>
+        <p:cNvPr id="1" name=""/>
+        <p:cNvGrpSpPr/>
+        <p:nvPr/>
+      </p:nvGrpSpPr>
+      <p:grpSpPr>
+        <a:xfrm>
+          <a:off x="0" y="0"/>
+          <a:ext cx="0" cy="0"/>
+          <a:chOff x="0" y="0"/>
+          <a:chExt cx="0" cy="0"/>
+        </a:xfrm>
+      </p:grpSpPr>
+      <p:sp>
+        <p:nvSpPr>
+          <p:cNvPr id="2" name="Title 1">
+            <a:extLst>
+              <a:ext uri="{FF2B5EF4-FFF2-40B4-BE49-F238E27FC236}">
+                <a16:creationId xmlns:a16="http://schemas.microsoft.com/office/drawing/2014/main" id="{5654D0C1-A048-A24F-810D-C6A91D612E50}"/>
+              </a:ext>
+            </a:extLst>
+          </p:cNvPr>
+          <p:cNvSpPr>
+            <a:spLocks noGrp="1"/>
+          </p:cNvSpPr>
+          <p:nvPr>
+            <p:ph type="title"/>
+          </p:nvPr>
+        </p:nvSpPr>
+        <p:spPr/>
+        <p:txBody>
+          <a:bodyPr/>
+          <a:lstStyle/>
+          <a:p>
+            <a:r>
+              <a:rPr lang="en-US" dirty="0"/>
+              <a:t>Extension Ideas</a:t>
+            </a:r>
+          </a:p>
+        </p:txBody>
+      </p:sp>
+      <p:sp>
+        <p:nvSpPr>
+          <p:cNvPr id="3" name="TextBox 2">
+            <a:extLst>
+              <a:ext uri="{FF2B5EF4-FFF2-40B4-BE49-F238E27FC236}">
+                <a16:creationId xmlns:a16="http://schemas.microsoft.com/office/drawing/2014/main" id="{08CDB14F-2060-964E-90EE-B634BC32D7A8}"/>
+              </a:ext>
+            </a:extLst>
+          </p:cNvPr>
+          <p:cNvSpPr txBox="1"/>
+          <p:nvPr/>
+        </p:nvSpPr>
+        <p:spPr>
+          <a:xfrm>
+            <a:off x="833378" y="2210766"/>
+            <a:ext cx="10104698" cy="923330"/>
+          </a:xfrm>
+          <a:prstGeom prst="rect">
+            <a:avLst/>
+          </a:prstGeom>
+          <a:noFill/>
+        </p:spPr>
+        <p:txBody>
+          <a:bodyPr wrap="square" rtlCol="0">
+            <a:spAutoFit/>
+          </a:bodyPr>
+          <a:lstStyle/>
+          <a:p>
+            <a:pPr marL="285750" indent="-285750">
+              <a:buFont typeface="Arial" panose="020B0604020202020204" pitchFamily="34" charset="0"/>
+              <a:buChar char="•"/>
+            </a:pPr>
+            <a:r>
+              <a:rPr lang="en-US" dirty="0"/>
+              <a:t>Add warning message for deleting</a:t>
+            </a:r>
+          </a:p>
+          <a:p>
+            <a:pPr marL="285750" indent="-285750">
+              <a:buFont typeface="Arial" panose="020B0604020202020204" pitchFamily="34" charset="0"/>
+              <a:buChar char="•"/>
+            </a:pPr>
+            <a:r>
+              <a:rPr lang="en-US" dirty="0"/>
+              <a:t>Add confirm message for updates</a:t>
+            </a:r>
+          </a:p>
+          <a:p>
+            <a:pPr marL="285750" indent="-285750">
+              <a:buFont typeface="Arial" panose="020B0604020202020204" pitchFamily="34" charset="0"/>
+              <a:buChar char="•"/>
+            </a:pPr>
+            <a:endParaRPr lang="en-US" dirty="0"/>
+          </a:p>
+        </p:txBody>
+      </p:sp>
+    </p:spTree>
+    <p:extLst>
+      <p:ext uri="{BB962C8B-B14F-4D97-AF65-F5344CB8AC3E}">
+        <p14:creationId xmlns:p14="http://schemas.microsoft.com/office/powerpoint/2010/main" val="792151724"/>
+      </p:ext>
+    </p:extLst>
+  </p:cSld>
+  <p:clrMapOvr>
+    <a:masterClrMapping/>
+  </p:clrMapOvr>
 </p:sld>
 </file>
 

</xml_diff>

<commit_message>
basic grid set up for index.html
</commit_message>
<xml_diff>
--- a/Presentation/Vet Managment.pptx
+++ b/Presentation/Vet Managment.pptx
@@ -111,6 +111,11 @@
       </a:defRPr>
     </a:lvl9pPr>
   </p:defaultTextStyle>
+  <p:extLst>
+    <p:ext uri="{EFAFB233-063F-42B5-8137-9DF3F51BA10A}">
+      <p15:sldGuideLst xmlns:p15="http://schemas.microsoft.com/office/powerpoint/2012/main"/>
+    </p:ext>
+  </p:extLst>
 </p:presentation>
 </file>
 
@@ -127,7 +132,7 @@
   <pc:docChgLst>
     <pc:chgData name="Peter Mordaunt" userId="bb5abcbb151840ed" providerId="LiveId" clId="{A7FEC831-BDE6-4C4C-9C14-DA98583E0717}"/>
     <pc:docChg chg="undo custSel addSld delSld modSld modMainMaster">
-      <pc:chgData name="Peter Mordaunt" userId="bb5abcbb151840ed" providerId="LiveId" clId="{A7FEC831-BDE6-4C4C-9C14-DA98583E0717}" dt="2021-12-11T00:51:37.898" v="1638" actId="20577"/>
+      <pc:chgData name="Peter Mordaunt" userId="bb5abcbb151840ed" providerId="LiveId" clId="{A7FEC831-BDE6-4C4C-9C14-DA98583E0717}" dt="2021-12-11T15:05:17.661" v="1678" actId="20577"/>
       <pc:docMkLst>
         <pc:docMk/>
       </pc:docMkLst>
@@ -711,7 +716,7 @@
         </pc:spChg>
       </pc:sldChg>
       <pc:sldChg chg="addSp modSp new mod">
-        <pc:chgData name="Peter Mordaunt" userId="bb5abcbb151840ed" providerId="LiveId" clId="{A7FEC831-BDE6-4C4C-9C14-DA98583E0717}" dt="2021-12-11T00:51:37.898" v="1638" actId="20577"/>
+        <pc:chgData name="Peter Mordaunt" userId="bb5abcbb151840ed" providerId="LiveId" clId="{A7FEC831-BDE6-4C4C-9C14-DA98583E0717}" dt="2021-12-11T15:05:17.661" v="1678" actId="20577"/>
         <pc:sldMkLst>
           <pc:docMk/>
           <pc:sldMk cId="792151724" sldId="261"/>
@@ -725,7 +730,7 @@
           </ac:spMkLst>
         </pc:spChg>
         <pc:spChg chg="add mod">
-          <ac:chgData name="Peter Mordaunt" userId="bb5abcbb151840ed" providerId="LiveId" clId="{A7FEC831-BDE6-4C4C-9C14-DA98583E0717}" dt="2021-12-11T00:51:37.898" v="1638" actId="20577"/>
+          <ac:chgData name="Peter Mordaunt" userId="bb5abcbb151840ed" providerId="LiveId" clId="{A7FEC831-BDE6-4C4C-9C14-DA98583E0717}" dt="2021-12-11T15:05:17.661" v="1678" actId="20577"/>
           <ac:spMkLst>
             <pc:docMk/>
             <pc:sldMk cId="792151724" sldId="261"/>
@@ -1319,7 +1324,7 @@
           <a:p>
             <a:fld id="{78ABE3C1-DBE1-495D-B57B-2849774B866A}" type="datetimeFigureOut">
               <a:rPr lang="en-US" dirty="0"/>
-              <a:t>12/10/21</a:t>
+              <a:t>12/11/21</a:t>
             </a:fld>
             <a:endParaRPr lang="en-US" dirty="0"/>
           </a:p>
@@ -1728,7 +1733,7 @@
           <a:p>
             <a:fld id="{446C117F-5CCF-4837-BE5F-2B92066CAFAF}" type="datetimeFigureOut">
               <a:rPr lang="en-US" dirty="0"/>
-              <a:t>12/10/21</a:t>
+              <a:t>12/11/21</a:t>
             </a:fld>
             <a:endParaRPr lang="en-US" dirty="0"/>
           </a:p>
@@ -2059,7 +2064,7 @@
           <a:p>
             <a:fld id="{84EB90BD-B6CE-46B7-997F-7313B992CCDC}" type="datetimeFigureOut">
               <a:rPr lang="en-US" dirty="0"/>
-              <a:t>12/10/21</a:t>
+              <a:t>12/11/21</a:t>
             </a:fld>
             <a:endParaRPr lang="en-US" dirty="0"/>
           </a:p>
@@ -2459,7 +2464,7 @@
           <a:p>
             <a:fld id="{CDB9D11F-B188-461D-B23F-39381795C052}" type="datetimeFigureOut">
               <a:rPr lang="en-US" dirty="0"/>
-              <a:t>12/10/21</a:t>
+              <a:t>12/11/21</a:t>
             </a:fld>
             <a:endParaRPr lang="en-US" dirty="0"/>
           </a:p>
@@ -3022,7 +3027,7 @@
           <a:p>
             <a:fld id="{52E6D8D9-55A2-4063-B0F3-121F44549695}" type="datetimeFigureOut">
               <a:rPr lang="en-US" dirty="0"/>
-              <a:t>12/10/21</a:t>
+              <a:t>12/11/21</a:t>
             </a:fld>
             <a:endParaRPr lang="en-US" dirty="0"/>
           </a:p>
@@ -3698,7 +3703,7 @@
           <a:p>
             <a:fld id="{D4B24536-994D-4021-A283-9F449C0DB509}" type="datetimeFigureOut">
               <a:rPr lang="en-US" dirty="0"/>
-              <a:t>12/10/21</a:t>
+              <a:t>12/11/21</a:t>
             </a:fld>
             <a:endParaRPr lang="en-US" dirty="0"/>
           </a:p>
@@ -4606,7 +4611,7 @@
           <a:p>
             <a:fld id="{3CBBBB78-C96F-47B7-AB17-D852CA960AC9}" type="datetimeFigureOut">
               <a:rPr lang="en-US" dirty="0"/>
-              <a:t>12/10/21</a:t>
+              <a:t>12/11/21</a:t>
             </a:fld>
             <a:endParaRPr lang="en-US" dirty="0"/>
           </a:p>
@@ -4914,7 +4919,7 @@
           <a:p>
             <a:fld id="{1FA3F48C-C7C6-4055-9F49-3777875E72AE}" type="datetimeFigureOut">
               <a:rPr lang="en-US" dirty="0"/>
-              <a:t>12/10/21</a:t>
+              <a:t>12/11/21</a:t>
             </a:fld>
             <a:endParaRPr lang="en-US" dirty="0"/>
           </a:p>
@@ -5173,7 +5178,7 @@
           <a:p>
             <a:fld id="{6178E61D-D431-422C-9764-11DAFE33AB63}" type="datetimeFigureOut">
               <a:rPr lang="en-US" dirty="0"/>
-              <a:t>12/10/21</a:t>
+              <a:t>12/11/21</a:t>
             </a:fld>
             <a:endParaRPr lang="en-US" dirty="0"/>
           </a:p>
@@ -5492,7 +5497,7 @@
           <a:p>
             <a:fld id="{12DE42F4-6EEF-4EF7-8ED4-2208F0F89A08}" type="datetimeFigureOut">
               <a:rPr lang="en-US" dirty="0"/>
-              <a:t>12/10/21</a:t>
+              <a:t>12/11/21</a:t>
             </a:fld>
             <a:endParaRPr lang="en-US" dirty="0"/>
           </a:p>
@@ -5876,7 +5881,7 @@
           <a:p>
             <a:fld id="{30578ACC-22D6-47C1-A373-4FD133E34F3C}" type="datetimeFigureOut">
               <a:rPr lang="en-US" dirty="0"/>
-              <a:t>12/10/21</a:t>
+              <a:t>12/11/21</a:t>
             </a:fld>
             <a:endParaRPr lang="en-US" dirty="0"/>
           </a:p>
@@ -6247,7 +6252,7 @@
           <a:p>
             <a:fld id="{4E5A6C69-6797-4E8A-BF37-F2C3751466E9}" type="datetimeFigureOut">
               <a:rPr lang="en-US" dirty="0"/>
-              <a:t>12/10/21</a:t>
+              <a:t>12/11/21</a:t>
             </a:fld>
             <a:endParaRPr lang="en-US" dirty="0"/>
           </a:p>
@@ -6748,7 +6753,7 @@
           <a:p>
             <a:fld id="{D82014A1-A632-4878-A0D3-F52BA7563730}" type="datetimeFigureOut">
               <a:rPr lang="en-US" dirty="0"/>
-              <a:t>12/10/21</a:t>
+              <a:t>12/11/21</a:t>
             </a:fld>
             <a:endParaRPr lang="en-US" dirty="0"/>
           </a:p>
@@ -7000,7 +7005,7 @@
           <a:p>
             <a:fld id="{CE99F462-093F-4566-844B-4C71F2739DA5}" type="datetimeFigureOut">
               <a:rPr lang="en-US" dirty="0"/>
-              <a:t>12/10/21</a:t>
+              <a:t>12/11/21</a:t>
             </a:fld>
             <a:endParaRPr lang="en-US" dirty="0"/>
           </a:p>
@@ -7158,7 +7163,7 @@
           <a:p>
             <a:fld id="{3D24A7AC-904D-4781-85BA-7D10C17ED021}" type="datetimeFigureOut">
               <a:rPr lang="en-US" dirty="0"/>
-              <a:t>12/10/21</a:t>
+              <a:t>12/11/21</a:t>
             </a:fld>
             <a:endParaRPr lang="en-US" dirty="0"/>
           </a:p>
@@ -7543,7 +7548,7 @@
           <a:p>
             <a:fld id="{E331444B-B92B-4E27-8C94-BB93EAF5CB18}" type="datetimeFigureOut">
               <a:rPr lang="en-US" dirty="0"/>
-              <a:t>12/10/21</a:t>
+              <a:t>12/11/21</a:t>
             </a:fld>
             <a:endParaRPr lang="en-US" dirty="0"/>
           </a:p>
@@ -7947,7 +7952,7 @@
           <a:p>
             <a:fld id="{363EFA5E-FA76-400D-B3DC-F0BA90E6D107}" type="datetimeFigureOut">
               <a:rPr lang="en-US" dirty="0"/>
-              <a:t>12/10/21</a:t>
+              <a:t>12/11/21</a:t>
             </a:fld>
             <a:endParaRPr lang="en-US" dirty="0"/>
           </a:p>
@@ -8217,7 +8222,7 @@
           <a:p>
             <a:fld id="{9D6E9DEC-419B-4CC5-A080-3B06BD5A8291}" type="datetimeFigureOut">
               <a:rPr lang="en-US" dirty="0"/>
-              <a:t>12/10/21</a:t>
+              <a:t>12/11/21</a:t>
             </a:fld>
             <a:endParaRPr lang="en-US" dirty="0"/>
           </a:p>
@@ -10426,7 +10431,7 @@
         <p:spPr>
           <a:xfrm>
             <a:off x="833378" y="2210766"/>
-            <a:ext cx="10104698" cy="3970318"/>
+            <a:ext cx="10104698" cy="4247317"/>
           </a:xfrm>
           <a:prstGeom prst="rect">
             <a:avLst/>
@@ -10515,13 +10520,23 @@
             </a:pPr>
             <a:r>
               <a:rPr lang="en-US" dirty="0"/>
-              <a:t>Filter by in clinic – handle check in/out </a:t>
+              <a:t>Add submenu items – add</a:t>
             </a:r>
             <a:r>
               <a:rPr lang="en-US"/>
-              <a:t>(could)</a:t>
+              <a:t>/edit/all</a:t>
             </a:r>
             <a:endParaRPr lang="en-US" dirty="0"/>
+          </a:p>
+          <a:p>
+            <a:pPr marL="285750" indent="-285750">
+              <a:buFont typeface="Arial" panose="020B0604020202020204" pitchFamily="34" charset="0"/>
+              <a:buChar char="•"/>
+            </a:pPr>
+            <a:r>
+              <a:rPr lang="en-US" dirty="0"/>
+              <a:t>Filter by in clinic – handle check in/out (could)</a:t>
+            </a:r>
           </a:p>
           <a:p>
             <a:pPr marL="285750" indent="-285750">

</xml_diff>

<commit_message>
Added CSS file structure, home(index.html) & CSS
</commit_message>
<xml_diff>
--- a/Presentation/Vet Managment.pptx
+++ b/Presentation/Vet Managment.pptx
@@ -122,7 +122,7 @@
 <file path=ppt/revisionInfo.xml><?xml version="1.0" encoding="utf-8"?>
 <p1510:revInfo xmlns:a="http://schemas.openxmlformats.org/drawingml/2006/main" xmlns:r="http://schemas.openxmlformats.org/officeDocument/2006/relationships" xmlns:p1510="http://schemas.microsoft.com/office/powerpoint/2015/10/main">
   <p1510:revLst>
-    <p1510:client id="{A7FEC831-BDE6-4C4C-9C14-DA98583E0717}" v="241" dt="2021-12-11T00:49:47.074"/>
+    <p1510:client id="{A7FEC831-BDE6-4C4C-9C14-DA98583E0717}" v="242" dt="2021-12-11T20:44:50.937"/>
   </p1510:revLst>
 </p1510:revInfo>
 </file>
@@ -132,7 +132,7 @@
   <pc:docChgLst>
     <pc:chgData name="Peter Mordaunt" userId="bb5abcbb151840ed" providerId="LiveId" clId="{A7FEC831-BDE6-4C4C-9C14-DA98583E0717}"/>
     <pc:docChg chg="undo custSel addSld delSld modSld modMainMaster">
-      <pc:chgData name="Peter Mordaunt" userId="bb5abcbb151840ed" providerId="LiveId" clId="{A7FEC831-BDE6-4C4C-9C14-DA98583E0717}" dt="2021-12-11T15:05:17.661" v="1678" actId="20577"/>
+      <pc:chgData name="Peter Mordaunt" userId="bb5abcbb151840ed" providerId="LiveId" clId="{A7FEC831-BDE6-4C4C-9C14-DA98583E0717}" dt="2021-12-11T21:03:11.735" v="1684" actId="1076"/>
       <pc:docMkLst>
         <pc:docMk/>
       </pc:docMkLst>
@@ -832,7 +832,7 @@
         </pc:picChg>
       </pc:sldChg>
       <pc:sldChg chg="addSp delSp modSp new mod">
-        <pc:chgData name="Peter Mordaunt" userId="bb5abcbb151840ed" providerId="LiveId" clId="{A7FEC831-BDE6-4C4C-9C14-DA98583E0717}" dt="2021-12-11T00:34:31.799" v="1108" actId="164"/>
+        <pc:chgData name="Peter Mordaunt" userId="bb5abcbb151840ed" providerId="LiveId" clId="{A7FEC831-BDE6-4C4C-9C14-DA98583E0717}" dt="2021-12-11T21:03:11.735" v="1684" actId="1076"/>
         <pc:sldMkLst>
           <pc:docMk/>
           <pc:sldMk cId="3361190902" sldId="264"/>
@@ -854,7 +854,7 @@
           </ac:grpSpMkLst>
         </pc:grpChg>
         <pc:grpChg chg="add mod">
-          <ac:chgData name="Peter Mordaunt" userId="bb5abcbb151840ed" providerId="LiveId" clId="{A7FEC831-BDE6-4C4C-9C14-DA98583E0717}" dt="2021-12-11T00:34:31.799" v="1108" actId="164"/>
+          <ac:chgData name="Peter Mordaunt" userId="bb5abcbb151840ed" providerId="LiveId" clId="{A7FEC831-BDE6-4C4C-9C14-DA98583E0717}" dt="2021-12-11T21:03:11.735" v="1684" actId="1076"/>
           <ac:grpSpMkLst>
             <pc:docMk/>
             <pc:sldMk cId="3361190902" sldId="264"/>
@@ -10231,7 +10231,7 @@
         </p:nvGrpSpPr>
         <p:grpSpPr>
           <a:xfrm>
-            <a:off x="513101" y="363969"/>
+            <a:off x="8387257" y="4907601"/>
             <a:ext cx="9533725" cy="6130061"/>
             <a:chOff x="513101" y="363969"/>
             <a:chExt cx="9533725" cy="6130061"/>

</xml_diff>

<commit_message>
corrected siteplan, corrected home index.html - added form around buttons plus css
</commit_message>
<xml_diff>
--- a/Presentation/Vet Managment.pptx
+++ b/Presentation/Vet Managment.pptx
@@ -122,7 +122,7 @@
 <file path=ppt/revisionInfo.xml><?xml version="1.0" encoding="utf-8"?>
 <p1510:revInfo xmlns:a="http://schemas.openxmlformats.org/drawingml/2006/main" xmlns:r="http://schemas.openxmlformats.org/officeDocument/2006/relationships" xmlns:p1510="http://schemas.microsoft.com/office/powerpoint/2015/10/main">
   <p1510:revLst>
-    <p1510:client id="{A7FEC831-BDE6-4C4C-9C14-DA98583E0717}" v="242" dt="2021-12-11T20:44:50.937"/>
+    <p1510:client id="{A7FEC831-BDE6-4C4C-9C14-DA98583E0717}" v="249" dt="2021-12-11T23:36:38.299"/>
   </p1510:revLst>
 </p1510:revInfo>
 </file>
@@ -132,7 +132,7 @@
   <pc:docChgLst>
     <pc:chgData name="Peter Mordaunt" userId="bb5abcbb151840ed" providerId="LiveId" clId="{A7FEC831-BDE6-4C4C-9C14-DA98583E0717}"/>
     <pc:docChg chg="undo custSel addSld delSld modSld modMainMaster">
-      <pc:chgData name="Peter Mordaunt" userId="bb5abcbb151840ed" providerId="LiveId" clId="{A7FEC831-BDE6-4C4C-9C14-DA98583E0717}" dt="2021-12-11T21:03:11.735" v="1684" actId="1076"/>
+      <pc:chgData name="Peter Mordaunt" userId="bb5abcbb151840ed" providerId="LiveId" clId="{A7FEC831-BDE6-4C4C-9C14-DA98583E0717}" dt="2021-12-11T23:37:35.309" v="1719" actId="1076"/>
       <pc:docMkLst>
         <pc:docMk/>
       </pc:docMkLst>
@@ -746,27 +746,43 @@
         </pc:sldMkLst>
       </pc:sldChg>
       <pc:sldChg chg="addSp delSp modSp new mod setBg">
-        <pc:chgData name="Peter Mordaunt" userId="bb5abcbb151840ed" providerId="LiveId" clId="{A7FEC831-BDE6-4C4C-9C14-DA98583E0717}" dt="2021-12-10T16:37:03.865" v="838" actId="164"/>
+        <pc:chgData name="Peter Mordaunt" userId="bb5abcbb151840ed" providerId="LiveId" clId="{A7FEC831-BDE6-4C4C-9C14-DA98583E0717}" dt="2021-12-11T23:37:35.309" v="1719" actId="1076"/>
         <pc:sldMkLst>
           <pc:docMk/>
           <pc:sldMk cId="1762480478" sldId="262"/>
         </pc:sldMkLst>
         <pc:spChg chg="add mod topLvl">
-          <ac:chgData name="Peter Mordaunt" userId="bb5abcbb151840ed" providerId="LiveId" clId="{A7FEC831-BDE6-4C4C-9C14-DA98583E0717}" dt="2021-12-10T16:37:03.865" v="838" actId="164"/>
+          <ac:chgData name="Peter Mordaunt" userId="bb5abcbb151840ed" providerId="LiveId" clId="{A7FEC831-BDE6-4C4C-9C14-DA98583E0717}" dt="2021-12-11T23:35:30.856" v="1707" actId="14100"/>
           <ac:spMkLst>
             <pc:docMk/>
             <pc:sldMk cId="1762480478" sldId="262"/>
             <ac:spMk id="6" creationId="{49916AD9-BEE6-8347-BDDD-359E9D503429}"/>
           </ac:spMkLst>
         </pc:spChg>
-        <pc:spChg chg="add mod">
-          <ac:chgData name="Peter Mordaunt" userId="bb5abcbb151840ed" providerId="LiveId" clId="{A7FEC831-BDE6-4C4C-9C14-DA98583E0717}" dt="2021-12-10T16:31:25.894" v="615" actId="20577"/>
+        <pc:spChg chg="add mod topLvl">
+          <ac:chgData name="Peter Mordaunt" userId="bb5abcbb151840ed" providerId="LiveId" clId="{A7FEC831-BDE6-4C4C-9C14-DA98583E0717}" dt="2021-12-11T23:34:28.943" v="1695" actId="165"/>
           <ac:spMkLst>
             <pc:docMk/>
             <pc:sldMk cId="1762480478" sldId="262"/>
             <ac:spMk id="7" creationId="{2A696870-896C-2D40-A31B-D07E640CEB0C}"/>
           </ac:spMkLst>
         </pc:spChg>
+        <pc:spChg chg="add mod">
+          <ac:chgData name="Peter Mordaunt" userId="bb5abcbb151840ed" providerId="LiveId" clId="{A7FEC831-BDE6-4C4C-9C14-DA98583E0717}" dt="2021-12-11T23:37:25.501" v="1718" actId="207"/>
+          <ac:spMkLst>
+            <pc:docMk/>
+            <pc:sldMk cId="1762480478" sldId="262"/>
+            <ac:spMk id="12" creationId="{AA07F3FA-CAA7-FF47-B8A0-04447ADFA204}"/>
+          </ac:spMkLst>
+        </pc:spChg>
+        <pc:grpChg chg="add del mod">
+          <ac:chgData name="Peter Mordaunt" userId="bb5abcbb151840ed" providerId="LiveId" clId="{A7FEC831-BDE6-4C4C-9C14-DA98583E0717}" dt="2021-12-11T23:34:28.943" v="1695" actId="165"/>
+          <ac:grpSpMkLst>
+            <pc:docMk/>
+            <pc:sldMk cId="1762480478" sldId="262"/>
+            <ac:grpSpMk id="4" creationId="{D352E315-6219-C448-BA43-6035AF9E85AC}"/>
+          </ac:grpSpMkLst>
+        </pc:grpChg>
         <pc:grpChg chg="add del mod">
           <ac:chgData name="Peter Mordaunt" userId="bb5abcbb151840ed" providerId="LiveId" clId="{A7FEC831-BDE6-4C4C-9C14-DA98583E0717}" dt="2021-12-10T16:36:24.042" v="831" actId="165"/>
           <ac:grpSpMkLst>
@@ -775,14 +791,22 @@
             <ac:grpSpMk id="8" creationId="{E0193C1E-10EC-A64B-8C04-80DFB06B650C}"/>
           </ac:grpSpMkLst>
         </pc:grpChg>
-        <pc:grpChg chg="add mod">
-          <ac:chgData name="Peter Mordaunt" userId="bb5abcbb151840ed" providerId="LiveId" clId="{A7FEC831-BDE6-4C4C-9C14-DA98583E0717}" dt="2021-12-10T16:37:03.865" v="838" actId="164"/>
+        <pc:grpChg chg="add del mod">
+          <ac:chgData name="Peter Mordaunt" userId="bb5abcbb151840ed" providerId="LiveId" clId="{A7FEC831-BDE6-4C4C-9C14-DA98583E0717}" dt="2021-12-11T23:29:43.266" v="1685" actId="165"/>
           <ac:grpSpMkLst>
             <pc:docMk/>
             <pc:sldMk cId="1762480478" sldId="262"/>
             <ac:grpSpMk id="11" creationId="{019FF516-93BD-FE4C-ADB8-9236401EFF19}"/>
           </ac:grpSpMkLst>
         </pc:grpChg>
+        <pc:picChg chg="add del mod topLvl">
+          <ac:chgData name="Peter Mordaunt" userId="bb5abcbb151840ed" providerId="LiveId" clId="{A7FEC831-BDE6-4C4C-9C14-DA98583E0717}" dt="2021-12-11T23:34:32.474" v="1696" actId="478"/>
+          <ac:picMkLst>
+            <pc:docMk/>
+            <pc:sldMk cId="1762480478" sldId="262"/>
+            <ac:picMk id="3" creationId="{BA5B1A3A-DAA3-5140-916E-632C42089DD9}"/>
+          </ac:picMkLst>
+        </pc:picChg>
         <pc:picChg chg="add del mod">
           <ac:chgData name="Peter Mordaunt" userId="bb5abcbb151840ed" providerId="LiveId" clId="{A7FEC831-BDE6-4C4C-9C14-DA98583E0717}" dt="2021-12-10T16:28:45.164" v="487" actId="478"/>
           <ac:picMkLst>
@@ -800,7 +824,15 @@
           </ac:picMkLst>
         </pc:picChg>
         <pc:picChg chg="add mod">
-          <ac:chgData name="Peter Mordaunt" userId="bb5abcbb151840ed" providerId="LiveId" clId="{A7FEC831-BDE6-4C4C-9C14-DA98583E0717}" dt="2021-12-10T16:37:03.865" v="838" actId="164"/>
+          <ac:chgData name="Peter Mordaunt" userId="bb5abcbb151840ed" providerId="LiveId" clId="{A7FEC831-BDE6-4C4C-9C14-DA98583E0717}" dt="2021-12-11T23:37:35.309" v="1719" actId="1076"/>
+          <ac:picMkLst>
+            <pc:docMk/>
+            <pc:sldMk cId="1762480478" sldId="262"/>
+            <ac:picMk id="8" creationId="{0AE36178-44E3-D647-91B7-FBEC33C81E10}"/>
+          </ac:picMkLst>
+        </pc:picChg>
+        <pc:picChg chg="add del mod topLvl">
+          <ac:chgData name="Peter Mordaunt" userId="bb5abcbb151840ed" providerId="LiveId" clId="{A7FEC831-BDE6-4C4C-9C14-DA98583E0717}" dt="2021-12-11T23:29:46.472" v="1686" actId="478"/>
           <ac:picMkLst>
             <pc:docMk/>
             <pc:sldMk cId="1762480478" sldId="262"/>
@@ -10000,6 +10032,63 @@
       </p:grpSpPr>
       <p:sp>
         <p:nvSpPr>
+          <p:cNvPr id="12" name="Rounded Rectangle 11">
+            <a:extLst>
+              <a:ext uri="{FF2B5EF4-FFF2-40B4-BE49-F238E27FC236}">
+                <a16:creationId xmlns:a16="http://schemas.microsoft.com/office/drawing/2014/main" id="{AA07F3FA-CAA7-FF47-B8A0-04447ADFA204}"/>
+              </a:ext>
+            </a:extLst>
+          </p:cNvPr>
+          <p:cNvSpPr/>
+          <p:nvPr/>
+        </p:nvSpPr>
+        <p:spPr>
+          <a:xfrm>
+            <a:off x="1262226" y="1311593"/>
+            <a:ext cx="309399" cy="646331"/>
+          </a:xfrm>
+          <a:prstGeom prst="roundRect">
+            <a:avLst/>
+          </a:prstGeom>
+          <a:gradFill>
+            <a:gsLst>
+              <a:gs pos="34000">
+                <a:schemeClr val="accent1"/>
+              </a:gs>
+              <a:gs pos="96000">
+                <a:schemeClr val="accent1"/>
+              </a:gs>
+            </a:gsLst>
+            <a:lin ang="2520000" scaled="0"/>
+          </a:gradFill>
+        </p:spPr>
+        <p:style>
+          <a:lnRef idx="2">
+            <a:schemeClr val="accent1">
+              <a:shade val="50000"/>
+            </a:schemeClr>
+          </a:lnRef>
+          <a:fillRef idx="1">
+            <a:schemeClr val="accent1"/>
+          </a:fillRef>
+          <a:effectRef idx="0">
+            <a:schemeClr val="accent1"/>
+          </a:effectRef>
+          <a:fontRef idx="minor">
+            <a:schemeClr val="lt1"/>
+          </a:fontRef>
+        </p:style>
+        <p:txBody>
+          <a:bodyPr rtlCol="0" anchor="ctr"/>
+          <a:lstStyle/>
+          <a:p>
+            <a:pPr algn="ctr"/>
+            <a:endParaRPr lang="en-US"/>
+          </a:p>
+        </p:txBody>
+      </p:sp>
+      <p:sp>
+        <p:nvSpPr>
           <p:cNvPr id="7" name="TextBox 6">
             <a:extLst>
               <a:ext uri="{FF2B5EF4-FFF2-40B4-BE49-F238E27FC236}">
@@ -10039,119 +10128,98 @@
           </a:p>
         </p:txBody>
       </p:sp>
-      <p:grpSp>
-        <p:nvGrpSpPr>
-          <p:cNvPr id="11" name="Group 10">
+      <p:sp>
+        <p:nvSpPr>
+          <p:cNvPr id="6" name="Rounded Rectangle 5">
             <a:extLst>
               <a:ext uri="{FF2B5EF4-FFF2-40B4-BE49-F238E27FC236}">
-                <a16:creationId xmlns:a16="http://schemas.microsoft.com/office/drawing/2014/main" id="{019FF516-93BD-FE4C-ADB8-9236401EFF19}"/>
+                <a16:creationId xmlns:a16="http://schemas.microsoft.com/office/drawing/2014/main" id="{49916AD9-BEE6-8347-BDDD-359E9D503429}"/>
               </a:ext>
             </a:extLst>
           </p:cNvPr>
-          <p:cNvGrpSpPr/>
+          <p:cNvSpPr/>
           <p:nvPr/>
-        </p:nvGrpSpPr>
-        <p:grpSpPr>
-          <a:xfrm>
-            <a:off x="1262226" y="314325"/>
-            <a:ext cx="9819580" cy="6229350"/>
-            <a:chOff x="1262226" y="314325"/>
-            <a:chExt cx="9819580" cy="6229350"/>
-          </a:xfrm>
-        </p:grpSpPr>
-        <p:sp>
-          <p:nvSpPr>
-            <p:cNvPr id="6" name="Rounded Rectangle 5">
-              <a:extLst>
-                <a:ext uri="{FF2B5EF4-FFF2-40B4-BE49-F238E27FC236}">
-                  <a16:creationId xmlns:a16="http://schemas.microsoft.com/office/drawing/2014/main" id="{49916AD9-BEE6-8347-BDDD-359E9D503429}"/>
-                </a:ext>
-              </a:extLst>
-            </p:cNvPr>
-            <p:cNvSpPr/>
-            <p:nvPr/>
-          </p:nvSpPr>
-          <p:spPr>
-            <a:xfrm>
-              <a:off x="1262226" y="2307431"/>
-              <a:ext cx="309399" cy="4100513"/>
-            </a:xfrm>
-            <a:prstGeom prst="roundRect">
-              <a:avLst/>
-            </a:prstGeom>
-            <a:gradFill>
-              <a:gsLst>
-                <a:gs pos="0">
-                  <a:schemeClr val="accent3"/>
-                </a:gs>
-                <a:gs pos="34000">
-                  <a:schemeClr val="accent1"/>
-                </a:gs>
-                <a:gs pos="96000">
-                  <a:schemeClr val="accent6">
-                    <a:lumMod val="75000"/>
-                  </a:schemeClr>
-                </a:gs>
-              </a:gsLst>
-              <a:lin ang="2520000" scaled="0"/>
-            </a:gradFill>
-          </p:spPr>
-          <p:style>
-            <a:lnRef idx="2">
-              <a:schemeClr val="accent1">
-                <a:shade val="50000"/>
-              </a:schemeClr>
-            </a:lnRef>
-            <a:fillRef idx="1">
-              <a:schemeClr val="accent1"/>
-            </a:fillRef>
-            <a:effectRef idx="0">
-              <a:schemeClr val="accent1"/>
-            </a:effectRef>
-            <a:fontRef idx="minor">
-              <a:schemeClr val="lt1"/>
-            </a:fontRef>
-          </p:style>
-          <p:txBody>
-            <a:bodyPr rtlCol="0" anchor="ctr"/>
-            <a:lstStyle/>
-            <a:p>
-              <a:pPr algn="ctr"/>
-              <a:endParaRPr lang="en-US"/>
-            </a:p>
-          </p:txBody>
-        </p:sp>
-        <p:pic>
-          <p:nvPicPr>
-            <p:cNvPr id="10" name="Picture 9" descr="Diagram&#10;&#10;Description automatically generated">
-              <a:extLst>
-                <a:ext uri="{FF2B5EF4-FFF2-40B4-BE49-F238E27FC236}">
-                  <a16:creationId xmlns:a16="http://schemas.microsoft.com/office/drawing/2014/main" id="{48EEAFBF-BD6E-A047-B7FD-93010769BB79}"/>
-                </a:ext>
-              </a:extLst>
-            </p:cNvPr>
-            <p:cNvPicPr>
-              <a:picLocks noChangeAspect="1"/>
-            </p:cNvPicPr>
-            <p:nvPr/>
-          </p:nvPicPr>
-          <p:blipFill>
-            <a:blip r:embed="rId2"/>
-            <a:stretch>
-              <a:fillRect/>
-            </a:stretch>
-          </p:blipFill>
-          <p:spPr>
-            <a:xfrm>
-              <a:off x="1262226" y="314325"/>
-              <a:ext cx="9819580" cy="6229350"/>
-            </a:xfrm>
-            <a:prstGeom prst="rect">
-              <a:avLst/>
-            </a:prstGeom>
-          </p:spPr>
-        </p:pic>
-      </p:grpSp>
+        </p:nvSpPr>
+        <p:spPr>
+          <a:xfrm>
+            <a:off x="1262226" y="2583180"/>
+            <a:ext cx="309399" cy="3824764"/>
+          </a:xfrm>
+          <a:prstGeom prst="roundRect">
+            <a:avLst/>
+          </a:prstGeom>
+          <a:gradFill>
+            <a:gsLst>
+              <a:gs pos="0">
+                <a:schemeClr val="accent3"/>
+              </a:gs>
+              <a:gs pos="34000">
+                <a:schemeClr val="accent1"/>
+              </a:gs>
+              <a:gs pos="96000">
+                <a:schemeClr val="accent6">
+                  <a:lumMod val="75000"/>
+                </a:schemeClr>
+              </a:gs>
+            </a:gsLst>
+            <a:lin ang="2520000" scaled="0"/>
+          </a:gradFill>
+        </p:spPr>
+        <p:style>
+          <a:lnRef idx="2">
+            <a:schemeClr val="accent1">
+              <a:shade val="50000"/>
+            </a:schemeClr>
+          </a:lnRef>
+          <a:fillRef idx="1">
+            <a:schemeClr val="accent1"/>
+          </a:fillRef>
+          <a:effectRef idx="0">
+            <a:schemeClr val="accent1"/>
+          </a:effectRef>
+          <a:fontRef idx="minor">
+            <a:schemeClr val="lt1"/>
+          </a:fontRef>
+        </p:style>
+        <p:txBody>
+          <a:bodyPr rtlCol="0" anchor="ctr"/>
+          <a:lstStyle/>
+          <a:p>
+            <a:pPr algn="ctr"/>
+            <a:endParaRPr lang="en-US"/>
+          </a:p>
+        </p:txBody>
+      </p:sp>
+      <p:pic>
+        <p:nvPicPr>
+          <p:cNvPr id="8" name="Picture 7" descr="Diagram&#10;&#10;Description automatically generated">
+            <a:extLst>
+              <a:ext uri="{FF2B5EF4-FFF2-40B4-BE49-F238E27FC236}">
+                <a16:creationId xmlns:a16="http://schemas.microsoft.com/office/drawing/2014/main" id="{0AE36178-44E3-D647-91B7-FBEC33C81E10}"/>
+              </a:ext>
+            </a:extLst>
+          </p:cNvPr>
+          <p:cNvPicPr>
+            <a:picLocks noChangeAspect="1"/>
+          </p:cNvPicPr>
+          <p:nvPr/>
+        </p:nvPicPr>
+        <p:blipFill>
+          <a:blip r:embed="rId2"/>
+          <a:stretch>
+            <a:fillRect/>
+          </a:stretch>
+        </p:blipFill>
+        <p:spPr>
+          <a:xfrm>
+            <a:off x="1262226" y="175766"/>
+            <a:ext cx="10256412" cy="6506468"/>
+          </a:xfrm>
+          <a:prstGeom prst="rect">
+            <a:avLst/>
+          </a:prstGeom>
+        </p:spPr>
+      </p:pic>
     </p:spTree>
     <p:extLst>
       <p:ext uri="{BB962C8B-B14F-4D97-AF65-F5344CB8AC3E}">

</xml_diff>

<commit_message>
Arranged HTML files for modularisation
</commit_message>
<xml_diff>
--- a/Presentation/Vet Managment.pptx
+++ b/Presentation/Vet Managment.pptx
@@ -132,7 +132,7 @@
   <pc:docChgLst>
     <pc:chgData name="Peter Mordaunt" userId="bb5abcbb151840ed" providerId="LiveId" clId="{A7FEC831-BDE6-4C4C-9C14-DA98583E0717}"/>
     <pc:docChg chg="undo custSel addSld delSld modSld modMainMaster">
-      <pc:chgData name="Peter Mordaunt" userId="bb5abcbb151840ed" providerId="LiveId" clId="{A7FEC831-BDE6-4C4C-9C14-DA98583E0717}" dt="2021-12-11T23:37:35.309" v="1719" actId="1076"/>
+      <pc:chgData name="Peter Mordaunt" userId="bb5abcbb151840ed" providerId="LiveId" clId="{A7FEC831-BDE6-4C4C-9C14-DA98583E0717}" dt="2021-12-12T17:56:15.044" v="1720" actId="1076"/>
       <pc:docMkLst>
         <pc:docMk/>
       </pc:docMkLst>
@@ -864,7 +864,7 @@
         </pc:picChg>
       </pc:sldChg>
       <pc:sldChg chg="addSp delSp modSp new mod">
-        <pc:chgData name="Peter Mordaunt" userId="bb5abcbb151840ed" providerId="LiveId" clId="{A7FEC831-BDE6-4C4C-9C14-DA98583E0717}" dt="2021-12-11T21:03:11.735" v="1684" actId="1076"/>
+        <pc:chgData name="Peter Mordaunt" userId="bb5abcbb151840ed" providerId="LiveId" clId="{A7FEC831-BDE6-4C4C-9C14-DA98583E0717}" dt="2021-12-12T17:56:15.044" v="1720" actId="1076"/>
         <pc:sldMkLst>
           <pc:docMk/>
           <pc:sldMk cId="3361190902" sldId="264"/>
@@ -886,7 +886,7 @@
           </ac:grpSpMkLst>
         </pc:grpChg>
         <pc:grpChg chg="add mod">
-          <ac:chgData name="Peter Mordaunt" userId="bb5abcbb151840ed" providerId="LiveId" clId="{A7FEC831-BDE6-4C4C-9C14-DA98583E0717}" dt="2021-12-11T21:03:11.735" v="1684" actId="1076"/>
+          <ac:chgData name="Peter Mordaunt" userId="bb5abcbb151840ed" providerId="LiveId" clId="{A7FEC831-BDE6-4C4C-9C14-DA98583E0717}" dt="2021-12-12T17:56:15.044" v="1720" actId="1076"/>
           <ac:grpSpMkLst>
             <pc:docMk/>
             <pc:sldMk cId="3361190902" sldId="264"/>
@@ -1356,7 +1356,7 @@
           <a:p>
             <a:fld id="{78ABE3C1-DBE1-495D-B57B-2849774B866A}" type="datetimeFigureOut">
               <a:rPr lang="en-US" dirty="0"/>
-              <a:t>12/11/21</a:t>
+              <a:t>12/12/21</a:t>
             </a:fld>
             <a:endParaRPr lang="en-US" dirty="0"/>
           </a:p>
@@ -1765,7 +1765,7 @@
           <a:p>
             <a:fld id="{446C117F-5CCF-4837-BE5F-2B92066CAFAF}" type="datetimeFigureOut">
               <a:rPr lang="en-US" dirty="0"/>
-              <a:t>12/11/21</a:t>
+              <a:t>12/12/21</a:t>
             </a:fld>
             <a:endParaRPr lang="en-US" dirty="0"/>
           </a:p>
@@ -2096,7 +2096,7 @@
           <a:p>
             <a:fld id="{84EB90BD-B6CE-46B7-997F-7313B992CCDC}" type="datetimeFigureOut">
               <a:rPr lang="en-US" dirty="0"/>
-              <a:t>12/11/21</a:t>
+              <a:t>12/12/21</a:t>
             </a:fld>
             <a:endParaRPr lang="en-US" dirty="0"/>
           </a:p>
@@ -2496,7 +2496,7 @@
           <a:p>
             <a:fld id="{CDB9D11F-B188-461D-B23F-39381795C052}" type="datetimeFigureOut">
               <a:rPr lang="en-US" dirty="0"/>
-              <a:t>12/11/21</a:t>
+              <a:t>12/12/21</a:t>
             </a:fld>
             <a:endParaRPr lang="en-US" dirty="0"/>
           </a:p>
@@ -3059,7 +3059,7 @@
           <a:p>
             <a:fld id="{52E6D8D9-55A2-4063-B0F3-121F44549695}" type="datetimeFigureOut">
               <a:rPr lang="en-US" dirty="0"/>
-              <a:t>12/11/21</a:t>
+              <a:t>12/12/21</a:t>
             </a:fld>
             <a:endParaRPr lang="en-US" dirty="0"/>
           </a:p>
@@ -3735,7 +3735,7 @@
           <a:p>
             <a:fld id="{D4B24536-994D-4021-A283-9F449C0DB509}" type="datetimeFigureOut">
               <a:rPr lang="en-US" dirty="0"/>
-              <a:t>12/11/21</a:t>
+              <a:t>12/12/21</a:t>
             </a:fld>
             <a:endParaRPr lang="en-US" dirty="0"/>
           </a:p>
@@ -4643,7 +4643,7 @@
           <a:p>
             <a:fld id="{3CBBBB78-C96F-47B7-AB17-D852CA960AC9}" type="datetimeFigureOut">
               <a:rPr lang="en-US" dirty="0"/>
-              <a:t>12/11/21</a:t>
+              <a:t>12/12/21</a:t>
             </a:fld>
             <a:endParaRPr lang="en-US" dirty="0"/>
           </a:p>
@@ -4951,7 +4951,7 @@
           <a:p>
             <a:fld id="{1FA3F48C-C7C6-4055-9F49-3777875E72AE}" type="datetimeFigureOut">
               <a:rPr lang="en-US" dirty="0"/>
-              <a:t>12/11/21</a:t>
+              <a:t>12/12/21</a:t>
             </a:fld>
             <a:endParaRPr lang="en-US" dirty="0"/>
           </a:p>
@@ -5210,7 +5210,7 @@
           <a:p>
             <a:fld id="{6178E61D-D431-422C-9764-11DAFE33AB63}" type="datetimeFigureOut">
               <a:rPr lang="en-US" dirty="0"/>
-              <a:t>12/11/21</a:t>
+              <a:t>12/12/21</a:t>
             </a:fld>
             <a:endParaRPr lang="en-US" dirty="0"/>
           </a:p>
@@ -5529,7 +5529,7 @@
           <a:p>
             <a:fld id="{12DE42F4-6EEF-4EF7-8ED4-2208F0F89A08}" type="datetimeFigureOut">
               <a:rPr lang="en-US" dirty="0"/>
-              <a:t>12/11/21</a:t>
+              <a:t>12/12/21</a:t>
             </a:fld>
             <a:endParaRPr lang="en-US" dirty="0"/>
           </a:p>
@@ -5913,7 +5913,7 @@
           <a:p>
             <a:fld id="{30578ACC-22D6-47C1-A373-4FD133E34F3C}" type="datetimeFigureOut">
               <a:rPr lang="en-US" dirty="0"/>
-              <a:t>12/11/21</a:t>
+              <a:t>12/12/21</a:t>
             </a:fld>
             <a:endParaRPr lang="en-US" dirty="0"/>
           </a:p>
@@ -6284,7 +6284,7 @@
           <a:p>
             <a:fld id="{4E5A6C69-6797-4E8A-BF37-F2C3751466E9}" type="datetimeFigureOut">
               <a:rPr lang="en-US" dirty="0"/>
-              <a:t>12/11/21</a:t>
+              <a:t>12/12/21</a:t>
             </a:fld>
             <a:endParaRPr lang="en-US" dirty="0"/>
           </a:p>
@@ -6785,7 +6785,7 @@
           <a:p>
             <a:fld id="{D82014A1-A632-4878-A0D3-F52BA7563730}" type="datetimeFigureOut">
               <a:rPr lang="en-US" dirty="0"/>
-              <a:t>12/11/21</a:t>
+              <a:t>12/12/21</a:t>
             </a:fld>
             <a:endParaRPr lang="en-US" dirty="0"/>
           </a:p>
@@ -7037,7 +7037,7 @@
           <a:p>
             <a:fld id="{CE99F462-093F-4566-844B-4C71F2739DA5}" type="datetimeFigureOut">
               <a:rPr lang="en-US" dirty="0"/>
-              <a:t>12/11/21</a:t>
+              <a:t>12/12/21</a:t>
             </a:fld>
             <a:endParaRPr lang="en-US" dirty="0"/>
           </a:p>
@@ -7195,7 +7195,7 @@
           <a:p>
             <a:fld id="{3D24A7AC-904D-4781-85BA-7D10C17ED021}" type="datetimeFigureOut">
               <a:rPr lang="en-US" dirty="0"/>
-              <a:t>12/11/21</a:t>
+              <a:t>12/12/21</a:t>
             </a:fld>
             <a:endParaRPr lang="en-US" dirty="0"/>
           </a:p>
@@ -7580,7 +7580,7 @@
           <a:p>
             <a:fld id="{E331444B-B92B-4E27-8C94-BB93EAF5CB18}" type="datetimeFigureOut">
               <a:rPr lang="en-US" dirty="0"/>
-              <a:t>12/11/21</a:t>
+              <a:t>12/12/21</a:t>
             </a:fld>
             <a:endParaRPr lang="en-US" dirty="0"/>
           </a:p>
@@ -7984,7 +7984,7 @@
           <a:p>
             <a:fld id="{363EFA5E-FA76-400D-B3DC-F0BA90E6D107}" type="datetimeFigureOut">
               <a:rPr lang="en-US" dirty="0"/>
-              <a:t>12/11/21</a:t>
+              <a:t>12/12/21</a:t>
             </a:fld>
             <a:endParaRPr lang="en-US" dirty="0"/>
           </a:p>
@@ -8254,7 +8254,7 @@
           <a:p>
             <a:fld id="{9D6E9DEC-419B-4CC5-A080-3B06BD5A8291}" type="datetimeFigureOut">
               <a:rPr lang="en-US" dirty="0"/>
-              <a:t>12/11/21</a:t>
+              <a:t>12/12/21</a:t>
             </a:fld>
             <a:endParaRPr lang="en-US" dirty="0"/>
           </a:p>
@@ -10299,7 +10299,7 @@
         </p:nvGrpSpPr>
         <p:grpSpPr>
           <a:xfrm>
-            <a:off x="8387257" y="4907601"/>
+            <a:off x="657529" y="363969"/>
             <a:ext cx="9533725" cy="6130061"/>
             <a:chOff x="513101" y="363969"/>
             <a:chExt cx="9533725" cy="6130061"/>

</xml_diff>

<commit_message>
basic css for view appointments
</commit_message>
<xml_diff>
--- a/Presentation/Vet Managment.pptx
+++ b/Presentation/Vet Managment.pptx
@@ -132,7 +132,7 @@
   <pc:docChgLst>
     <pc:chgData name="Peter Mordaunt" userId="bb5abcbb151840ed" providerId="LiveId" clId="{A7FEC831-BDE6-4C4C-9C14-DA98583E0717}"/>
     <pc:docChg chg="undo custSel addSld delSld modSld modMainMaster">
-      <pc:chgData name="Peter Mordaunt" userId="bb5abcbb151840ed" providerId="LiveId" clId="{A7FEC831-BDE6-4C4C-9C14-DA98583E0717}" dt="2021-12-12T17:56:15.044" v="1720" actId="1076"/>
+      <pc:chgData name="Peter Mordaunt" userId="bb5abcbb151840ed" providerId="LiveId" clId="{A7FEC831-BDE6-4C4C-9C14-DA98583E0717}" dt="2021-12-13T10:28:58.746" v="1778" actId="20577"/>
       <pc:docMkLst>
         <pc:docMk/>
       </pc:docMkLst>
@@ -716,7 +716,7 @@
         </pc:spChg>
       </pc:sldChg>
       <pc:sldChg chg="addSp modSp new mod">
-        <pc:chgData name="Peter Mordaunt" userId="bb5abcbb151840ed" providerId="LiveId" clId="{A7FEC831-BDE6-4C4C-9C14-DA98583E0717}" dt="2021-12-11T15:05:17.661" v="1678" actId="20577"/>
+        <pc:chgData name="Peter Mordaunt" userId="bb5abcbb151840ed" providerId="LiveId" clId="{A7FEC831-BDE6-4C4C-9C14-DA98583E0717}" dt="2021-12-13T10:28:58.746" v="1778" actId="20577"/>
         <pc:sldMkLst>
           <pc:docMk/>
           <pc:sldMk cId="792151724" sldId="261"/>
@@ -730,7 +730,7 @@
           </ac:spMkLst>
         </pc:spChg>
         <pc:spChg chg="add mod">
-          <ac:chgData name="Peter Mordaunt" userId="bb5abcbb151840ed" providerId="LiveId" clId="{A7FEC831-BDE6-4C4C-9C14-DA98583E0717}" dt="2021-12-11T15:05:17.661" v="1678" actId="20577"/>
+          <ac:chgData name="Peter Mordaunt" userId="bb5abcbb151840ed" providerId="LiveId" clId="{A7FEC831-BDE6-4C4C-9C14-DA98583E0717}" dt="2021-12-13T10:28:58.746" v="1778" actId="20577"/>
           <ac:spMkLst>
             <pc:docMk/>
             <pc:sldMk cId="792151724" sldId="261"/>
@@ -10499,7 +10499,7 @@
         <p:spPr>
           <a:xfrm>
             <a:off x="833378" y="2210766"/>
-            <a:ext cx="10104698" cy="4247317"/>
+            <a:ext cx="10104698" cy="4524315"/>
           </a:xfrm>
           <a:prstGeom prst="rect">
             <a:avLst/>
@@ -10588,11 +10588,21 @@
             </a:pPr>
             <a:r>
               <a:rPr lang="en-US" dirty="0"/>
-              <a:t>Add submenu items – add</a:t>
+              <a:t>Add submenu items – add/edit/all (should)</a:t>
+            </a:r>
+          </a:p>
+          <a:p>
+            <a:pPr marL="285750" indent="-285750">
+              <a:buFont typeface="Arial" panose="020B0604020202020204" pitchFamily="34" charset="0"/>
+              <a:buChar char="•"/>
+            </a:pPr>
+            <a:r>
+              <a:rPr lang="en-US" dirty="0"/>
+              <a:t>Add short note with option to expand </a:t>
             </a:r>
             <a:r>
               <a:rPr lang="en-US"/>
-              <a:t>/edit/all</a:t>
+              <a:t>(could)</a:t>
             </a:r>
             <a:endParaRPr lang="en-US" dirty="0"/>
           </a:p>

</xml_diff>

<commit_message>
oops, better late than never - Added add new and delete functionality, plus some css
</commit_message>
<xml_diff>
--- a/Presentation/Vet Managment.pptx
+++ b/Presentation/Vet Managment.pptx
@@ -13,6 +13,7 @@
     <p:sldId id="262" r:id="rId7"/>
     <p:sldId id="264" r:id="rId8"/>
     <p:sldId id="261" r:id="rId9"/>
+    <p:sldId id="265" r:id="rId10"/>
   </p:sldIdLst>
   <p:sldSz cx="12192000" cy="6858000"/>
   <p:notesSz cx="6858000" cy="9144000"/>
@@ -122,7 +123,7 @@
 <file path=ppt/revisionInfo.xml><?xml version="1.0" encoding="utf-8"?>
 <p1510:revInfo xmlns:a="http://schemas.openxmlformats.org/drawingml/2006/main" xmlns:r="http://schemas.openxmlformats.org/officeDocument/2006/relationships" xmlns:p1510="http://schemas.microsoft.com/office/powerpoint/2015/10/main">
   <p1510:revLst>
-    <p1510:client id="{A7FEC831-BDE6-4C4C-9C14-DA98583E0717}" v="249" dt="2021-12-11T23:36:38.299"/>
+    <p1510:client id="{A7FEC831-BDE6-4C4C-9C14-DA98583E0717}" v="250" dt="2021-12-13T22:42:53.056"/>
   </p1510:revLst>
 </p1510:revInfo>
 </file>
@@ -132,7 +133,7 @@
   <pc:docChgLst>
     <pc:chgData name="Peter Mordaunt" userId="bb5abcbb151840ed" providerId="LiveId" clId="{A7FEC831-BDE6-4C4C-9C14-DA98583E0717}"/>
     <pc:docChg chg="undo custSel addSld delSld modSld modMainMaster">
-      <pc:chgData name="Peter Mordaunt" userId="bb5abcbb151840ed" providerId="LiveId" clId="{A7FEC831-BDE6-4C4C-9C14-DA98583E0717}" dt="2021-12-13T10:28:58.746" v="1778" actId="20577"/>
+      <pc:chgData name="Peter Mordaunt" userId="bb5abcbb151840ed" providerId="LiveId" clId="{A7FEC831-BDE6-4C4C-9C14-DA98583E0717}" dt="2021-12-13T22:45:28.991" v="2031" actId="20577"/>
       <pc:docMkLst>
         <pc:docMk/>
       </pc:docMkLst>
@@ -716,7 +717,7 @@
         </pc:spChg>
       </pc:sldChg>
       <pc:sldChg chg="addSp modSp new mod">
-        <pc:chgData name="Peter Mordaunt" userId="bb5abcbb151840ed" providerId="LiveId" clId="{A7FEC831-BDE6-4C4C-9C14-DA98583E0717}" dt="2021-12-13T10:28:58.746" v="1778" actId="20577"/>
+        <pc:chgData name="Peter Mordaunt" userId="bb5abcbb151840ed" providerId="LiveId" clId="{A7FEC831-BDE6-4C4C-9C14-DA98583E0717}" dt="2021-12-13T22:42:20.419" v="1848" actId="20577"/>
         <pc:sldMkLst>
           <pc:docMk/>
           <pc:sldMk cId="792151724" sldId="261"/>
@@ -730,7 +731,7 @@
           </ac:spMkLst>
         </pc:spChg>
         <pc:spChg chg="add mod">
-          <ac:chgData name="Peter Mordaunt" userId="bb5abcbb151840ed" providerId="LiveId" clId="{A7FEC831-BDE6-4C4C-9C14-DA98583E0717}" dt="2021-12-13T10:28:58.746" v="1778" actId="20577"/>
+          <ac:chgData name="Peter Mordaunt" userId="bb5abcbb151840ed" providerId="LiveId" clId="{A7FEC831-BDE6-4C4C-9C14-DA98583E0717}" dt="2021-12-13T22:42:20.419" v="1848" actId="20577"/>
           <ac:spMkLst>
             <pc:docMk/>
             <pc:sldMk cId="792151724" sldId="261"/>
@@ -933,6 +934,29 @@
             <ac:picMk id="13" creationId="{5E3FF3FE-C933-E344-BB60-9BC7A27FAD83}"/>
           </ac:picMkLst>
         </pc:picChg>
+      </pc:sldChg>
+      <pc:sldChg chg="addSp modSp new mod">
+        <pc:chgData name="Peter Mordaunt" userId="bb5abcbb151840ed" providerId="LiveId" clId="{A7FEC831-BDE6-4C4C-9C14-DA98583E0717}" dt="2021-12-13T22:45:28.991" v="2031" actId="20577"/>
+        <pc:sldMkLst>
+          <pc:docMk/>
+          <pc:sldMk cId="4199572944" sldId="265"/>
+        </pc:sldMkLst>
+        <pc:spChg chg="mod">
+          <ac:chgData name="Peter Mordaunt" userId="bb5abcbb151840ed" providerId="LiveId" clId="{A7FEC831-BDE6-4C4C-9C14-DA98583E0717}" dt="2021-12-13T22:42:50.645" v="1868" actId="20577"/>
+          <ac:spMkLst>
+            <pc:docMk/>
+            <pc:sldMk cId="4199572944" sldId="265"/>
+            <ac:spMk id="2" creationId="{65AC3A65-F441-5843-943F-878F3D1EB584}"/>
+          </ac:spMkLst>
+        </pc:spChg>
+        <pc:spChg chg="add mod">
+          <ac:chgData name="Peter Mordaunt" userId="bb5abcbb151840ed" providerId="LiveId" clId="{A7FEC831-BDE6-4C4C-9C14-DA98583E0717}" dt="2021-12-13T22:45:28.991" v="2031" actId="20577"/>
+          <ac:spMkLst>
+            <pc:docMk/>
+            <pc:sldMk cId="4199572944" sldId="265"/>
+            <ac:spMk id="3" creationId="{D7BA01C0-B575-C240-BFEE-EBB2C9DED4A3}"/>
+          </ac:spMkLst>
+        </pc:spChg>
       </pc:sldChg>
       <pc:sldMasterChg chg="setBg modSldLayout">
         <pc:chgData name="Peter Mordaunt" userId="bb5abcbb151840ed" providerId="LiveId" clId="{A7FEC831-BDE6-4C4C-9C14-DA98583E0717}" dt="2021-12-10T15:04:31.560" v="332"/>
@@ -10499,7 +10523,7 @@
         <p:spPr>
           <a:xfrm>
             <a:off x="833378" y="2210766"/>
-            <a:ext cx="10104698" cy="4524315"/>
+            <a:ext cx="10104698" cy="4801314"/>
           </a:xfrm>
           <a:prstGeom prst="rect">
             <a:avLst/>
@@ -10578,7 +10602,7 @@
             </a:pPr>
             <a:r>
               <a:rPr lang="en-US" dirty="0"/>
-              <a:t>Filter by date, animal, vet, owner (should)</a:t>
+              <a:t>Make all fields required when adding new entries(should)</a:t>
             </a:r>
           </a:p>
           <a:p>
@@ -10588,7 +10612,7 @@
             </a:pPr>
             <a:r>
               <a:rPr lang="en-US" dirty="0"/>
-              <a:t>Add submenu items – add/edit/all (should)</a:t>
+              <a:t>Filter by date, animal, vet, owner (should)</a:t>
             </a:r>
           </a:p>
           <a:p>
@@ -10598,13 +10622,18 @@
             </a:pPr>
             <a:r>
               <a:rPr lang="en-US" dirty="0"/>
-              <a:t>Add short note with option to expand </a:t>
-            </a:r>
-            <a:r>
-              <a:rPr lang="en-US"/>
-              <a:t>(could)</a:t>
-            </a:r>
-            <a:endParaRPr lang="en-US" dirty="0"/>
+              <a:t>Add submenu items – add/edit/all (should)</a:t>
+            </a:r>
+          </a:p>
+          <a:p>
+            <a:pPr marL="285750" indent="-285750">
+              <a:buFont typeface="Arial" panose="020B0604020202020204" pitchFamily="34" charset="0"/>
+              <a:buChar char="•"/>
+            </a:pPr>
+            <a:r>
+              <a:rPr lang="en-US" dirty="0"/>
+              <a:t>Add short note with option to expand (could)</a:t>
+            </a:r>
           </a:p>
           <a:p>
             <a:pPr marL="285750" indent="-285750">
@@ -10695,6 +10724,122 @@
     <p:extLst>
       <p:ext uri="{BB962C8B-B14F-4D97-AF65-F5344CB8AC3E}">
         <p14:creationId xmlns:p14="http://schemas.microsoft.com/office/powerpoint/2010/main" val="792151724"/>
+      </p:ext>
+    </p:extLst>
+  </p:cSld>
+  <p:clrMapOvr>
+    <a:masterClrMapping/>
+  </p:clrMapOvr>
+</p:sld>
+</file>
+
+<file path=ppt/slides/slide9.xml><?xml version="1.0" encoding="utf-8"?>
+<p:sld xmlns:a="http://schemas.openxmlformats.org/drawingml/2006/main" xmlns:r="http://schemas.openxmlformats.org/officeDocument/2006/relationships" xmlns:p="http://schemas.openxmlformats.org/presentationml/2006/main">
+  <p:cSld>
+    <p:spTree>
+      <p:nvGrpSpPr>
+        <p:cNvPr id="1" name=""/>
+        <p:cNvGrpSpPr/>
+        <p:nvPr/>
+      </p:nvGrpSpPr>
+      <p:grpSpPr>
+        <a:xfrm>
+          <a:off x="0" y="0"/>
+          <a:ext cx="0" cy="0"/>
+          <a:chOff x="0" y="0"/>
+          <a:chExt cx="0" cy="0"/>
+        </a:xfrm>
+      </p:grpSpPr>
+      <p:sp>
+        <p:nvSpPr>
+          <p:cNvPr id="2" name="Title 1">
+            <a:extLst>
+              <a:ext uri="{FF2B5EF4-FFF2-40B4-BE49-F238E27FC236}">
+                <a16:creationId xmlns:a16="http://schemas.microsoft.com/office/drawing/2014/main" id="{65AC3A65-F441-5843-943F-878F3D1EB584}"/>
+              </a:ext>
+            </a:extLst>
+          </p:cNvPr>
+          <p:cNvSpPr>
+            <a:spLocks noGrp="1"/>
+          </p:cNvSpPr>
+          <p:nvPr>
+            <p:ph type="title"/>
+          </p:nvPr>
+        </p:nvSpPr>
+        <p:spPr/>
+        <p:txBody>
+          <a:bodyPr/>
+          <a:lstStyle/>
+          <a:p>
+            <a:r>
+              <a:rPr lang="en-US" dirty="0"/>
+              <a:t>Learning Objectives</a:t>
+            </a:r>
+          </a:p>
+        </p:txBody>
+      </p:sp>
+      <p:sp>
+        <p:nvSpPr>
+          <p:cNvPr id="3" name="TextBox 2">
+            <a:extLst>
+              <a:ext uri="{FF2B5EF4-FFF2-40B4-BE49-F238E27FC236}">
+                <a16:creationId xmlns:a16="http://schemas.microsoft.com/office/drawing/2014/main" id="{D7BA01C0-B575-C240-BFEE-EBB2C9DED4A3}"/>
+              </a:ext>
+            </a:extLst>
+          </p:cNvPr>
+          <p:cNvSpPr txBox="1"/>
+          <p:nvPr/>
+        </p:nvSpPr>
+        <p:spPr>
+          <a:xfrm>
+            <a:off x="2121408" y="3060192"/>
+            <a:ext cx="7287572" cy="1200329"/>
+          </a:xfrm>
+          <a:prstGeom prst="rect">
+            <a:avLst/>
+          </a:prstGeom>
+          <a:noFill/>
+        </p:spPr>
+        <p:txBody>
+          <a:bodyPr wrap="none" rtlCol="0">
+            <a:spAutoFit/>
+          </a:bodyPr>
+          <a:lstStyle/>
+          <a:p>
+            <a:r>
+              <a:rPr lang="en-US" dirty="0"/>
+              <a:t>Using SQL</a:t>
+            </a:r>
+          </a:p>
+          <a:p>
+            <a:r>
+              <a:rPr lang="en-US" dirty="0"/>
+              <a:t>Working with Routes </a:t>
+            </a:r>
+          </a:p>
+          <a:p>
+            <a:r>
+              <a:rPr lang="en-US" dirty="0"/>
+              <a:t>Understanding how they integrate and getting it clearer in </a:t>
+            </a:r>
+            <a:r>
+              <a:rPr lang="en-US"/>
+              <a:t>my head!</a:t>
+            </a:r>
+            <a:endParaRPr lang="en-US" dirty="0"/>
+          </a:p>
+          <a:p>
+            <a:r>
+              <a:rPr lang="en-US" dirty="0"/>
+              <a:t>Experiment with CSS &amp; HTML </a:t>
+            </a:r>
+          </a:p>
+        </p:txBody>
+      </p:sp>
+    </p:spTree>
+    <p:extLst>
+      <p:ext uri="{BB962C8B-B14F-4D97-AF65-F5344CB8AC3E}">
+        <p14:creationId xmlns:p14="http://schemas.microsoft.com/office/powerpoint/2010/main" val="4199572944"/>
       </p:ext>
     </p:extLst>
   </p:cSld>

</xml_diff>

<commit_message>
Tested and fixed issues with empty list in view for animals and appointments
</commit_message>
<xml_diff>
--- a/Presentation/Vet Managment.pptx
+++ b/Presentation/Vet Managment.pptx
@@ -133,7 +133,7 @@
   <pc:docChgLst>
     <pc:chgData name="Peter Mordaunt" userId="bb5abcbb151840ed" providerId="LiveId" clId="{A7FEC831-BDE6-4C4C-9C14-DA98583E0717}"/>
     <pc:docChg chg="undo custSel addSld delSld modSld modMainMaster">
-      <pc:chgData name="Peter Mordaunt" userId="bb5abcbb151840ed" providerId="LiveId" clId="{A7FEC831-BDE6-4C4C-9C14-DA98583E0717}" dt="2021-12-13T22:45:28.991" v="2031" actId="20577"/>
+      <pc:chgData name="Peter Mordaunt" userId="bb5abcbb151840ed" providerId="LiveId" clId="{A7FEC831-BDE6-4C4C-9C14-DA98583E0717}" dt="2021-12-14T13:52:11.173" v="2092" actId="20577"/>
       <pc:docMkLst>
         <pc:docMk/>
       </pc:docMkLst>
@@ -717,7 +717,7 @@
         </pc:spChg>
       </pc:sldChg>
       <pc:sldChg chg="addSp modSp new mod">
-        <pc:chgData name="Peter Mordaunt" userId="bb5abcbb151840ed" providerId="LiveId" clId="{A7FEC831-BDE6-4C4C-9C14-DA98583E0717}" dt="2021-12-13T22:42:20.419" v="1848" actId="20577"/>
+        <pc:chgData name="Peter Mordaunt" userId="bb5abcbb151840ed" providerId="LiveId" clId="{A7FEC831-BDE6-4C4C-9C14-DA98583E0717}" dt="2021-12-14T13:52:11.173" v="2092" actId="20577"/>
         <pc:sldMkLst>
           <pc:docMk/>
           <pc:sldMk cId="792151724" sldId="261"/>
@@ -731,7 +731,7 @@
           </ac:spMkLst>
         </pc:spChg>
         <pc:spChg chg="add mod">
-          <ac:chgData name="Peter Mordaunt" userId="bb5abcbb151840ed" providerId="LiveId" clId="{A7FEC831-BDE6-4C4C-9C14-DA98583E0717}" dt="2021-12-13T22:42:20.419" v="1848" actId="20577"/>
+          <ac:chgData name="Peter Mordaunt" userId="bb5abcbb151840ed" providerId="LiveId" clId="{A7FEC831-BDE6-4C4C-9C14-DA98583E0717}" dt="2021-12-14T13:52:11.173" v="2092" actId="20577"/>
           <ac:spMkLst>
             <pc:docMk/>
             <pc:sldMk cId="792151724" sldId="261"/>
@@ -10522,8 +10522,8 @@
         </p:nvSpPr>
         <p:spPr>
           <a:xfrm>
-            <a:off x="833378" y="2210766"/>
-            <a:ext cx="10104698" cy="4801314"/>
+            <a:off x="680321" y="1502688"/>
+            <a:ext cx="10104698" cy="5355312"/>
           </a:xfrm>
           <a:prstGeom prst="rect">
             <a:avLst/>
@@ -10542,9 +10542,9 @@
             </a:r>
           </a:p>
           <a:p>
-            <a:pPr marL="285750" indent="-285750">
-              <a:buFont typeface="Arial" panose="020B0604020202020204" pitchFamily="34" charset="0"/>
-              <a:buChar char="•"/>
+            <a:pPr marL="342900" indent="-342900">
+              <a:buFont typeface="+mj-lt"/>
+              <a:buAutoNum type="arabicPeriod"/>
             </a:pPr>
             <a:r>
               <a:rPr lang="en-US" dirty="0"/>
@@ -10552,9 +10552,19 @@
             </a:r>
           </a:p>
           <a:p>
-            <a:pPr marL="285750" indent="-285750">
-              <a:buFont typeface="Arial" panose="020B0604020202020204" pitchFamily="34" charset="0"/>
-              <a:buChar char="•"/>
+            <a:pPr marL="342900" indent="-342900">
+              <a:buFont typeface="+mj-lt"/>
+              <a:buAutoNum type="arabicPeriod"/>
+            </a:pPr>
+            <a:r>
+              <a:rPr lang="en-US" dirty="0"/>
+              <a:t>Set vet for making appts so not editable(should)</a:t>
+            </a:r>
+          </a:p>
+          <a:p>
+            <a:pPr marL="342900" indent="-342900">
+              <a:buFont typeface="+mj-lt"/>
+              <a:buAutoNum type="arabicPeriod"/>
             </a:pPr>
             <a:r>
               <a:rPr lang="en-US" dirty="0"/>
@@ -10562,9 +10572,9 @@
             </a:r>
           </a:p>
           <a:p>
-            <a:pPr marL="285750" indent="-285750">
-              <a:buFont typeface="Arial" panose="020B0604020202020204" pitchFamily="34" charset="0"/>
-              <a:buChar char="•"/>
+            <a:pPr marL="342900" indent="-342900">
+              <a:buFont typeface="+mj-lt"/>
+              <a:buAutoNum type="arabicPeriod"/>
             </a:pPr>
             <a:r>
               <a:rPr lang="en-US" dirty="0" err="1"/>
@@ -10576,9 +10586,9 @@
             </a:r>
           </a:p>
           <a:p>
-            <a:pPr marL="285750" indent="-285750">
-              <a:buFont typeface="Arial" panose="020B0604020202020204" pitchFamily="34" charset="0"/>
-              <a:buChar char="•"/>
+            <a:pPr marL="342900" indent="-342900">
+              <a:buFont typeface="+mj-lt"/>
+              <a:buAutoNum type="arabicPeriod"/>
             </a:pPr>
             <a:r>
               <a:rPr lang="en-US" dirty="0"/>
@@ -10586,9 +10596,9 @@
             </a:r>
           </a:p>
           <a:p>
-            <a:pPr marL="285750" indent="-285750">
-              <a:buFont typeface="Arial" panose="020B0604020202020204" pitchFamily="34" charset="0"/>
-              <a:buChar char="•"/>
+            <a:pPr marL="342900" indent="-342900">
+              <a:buFont typeface="+mj-lt"/>
+              <a:buAutoNum type="arabicPeriod"/>
             </a:pPr>
             <a:r>
               <a:rPr lang="en-US" dirty="0"/>
@@ -10596,9 +10606,9 @@
             </a:r>
           </a:p>
           <a:p>
-            <a:pPr marL="285750" indent="-285750">
-              <a:buFont typeface="Arial" panose="020B0604020202020204" pitchFamily="34" charset="0"/>
-              <a:buChar char="•"/>
+            <a:pPr marL="342900" indent="-342900">
+              <a:buFont typeface="+mj-lt"/>
+              <a:buAutoNum type="arabicPeriod"/>
             </a:pPr>
             <a:r>
               <a:rPr lang="en-US" dirty="0"/>
@@ -10606,9 +10616,9 @@
             </a:r>
           </a:p>
           <a:p>
-            <a:pPr marL="285750" indent="-285750">
-              <a:buFont typeface="Arial" panose="020B0604020202020204" pitchFamily="34" charset="0"/>
-              <a:buChar char="•"/>
+            <a:pPr marL="342900" indent="-342900">
+              <a:buFont typeface="+mj-lt"/>
+              <a:buAutoNum type="arabicPeriod"/>
             </a:pPr>
             <a:r>
               <a:rPr lang="en-US" dirty="0"/>
@@ -10616,9 +10626,9 @@
             </a:r>
           </a:p>
           <a:p>
-            <a:pPr marL="285750" indent="-285750">
-              <a:buFont typeface="Arial" panose="020B0604020202020204" pitchFamily="34" charset="0"/>
-              <a:buChar char="•"/>
+            <a:pPr marL="342900" indent="-342900">
+              <a:buFont typeface="+mj-lt"/>
+              <a:buAutoNum type="arabicPeriod"/>
             </a:pPr>
             <a:r>
               <a:rPr lang="en-US" dirty="0"/>
@@ -10626,9 +10636,9 @@
             </a:r>
           </a:p>
           <a:p>
-            <a:pPr marL="285750" indent="-285750">
-              <a:buFont typeface="Arial" panose="020B0604020202020204" pitchFamily="34" charset="0"/>
-              <a:buChar char="•"/>
+            <a:pPr marL="342900" indent="-342900">
+              <a:buFont typeface="+mj-lt"/>
+              <a:buAutoNum type="arabicPeriod"/>
             </a:pPr>
             <a:r>
               <a:rPr lang="en-US" dirty="0"/>
@@ -10636,9 +10646,9 @@
             </a:r>
           </a:p>
           <a:p>
-            <a:pPr marL="285750" indent="-285750">
-              <a:buFont typeface="Arial" panose="020B0604020202020204" pitchFamily="34" charset="0"/>
-              <a:buChar char="•"/>
+            <a:pPr marL="342900" indent="-342900">
+              <a:buFont typeface="+mj-lt"/>
+              <a:buAutoNum type="arabicPeriod"/>
             </a:pPr>
             <a:r>
               <a:rPr lang="en-US" dirty="0"/>
@@ -10646,9 +10656,9 @@
             </a:r>
           </a:p>
           <a:p>
-            <a:pPr marL="285750" indent="-285750">
-              <a:buFont typeface="Arial" panose="020B0604020202020204" pitchFamily="34" charset="0"/>
-              <a:buChar char="•"/>
+            <a:pPr marL="342900" indent="-342900">
+              <a:buFont typeface="+mj-lt"/>
+              <a:buAutoNum type="arabicPeriod"/>
             </a:pPr>
             <a:r>
               <a:rPr lang="en-US" dirty="0"/>
@@ -10656,9 +10666,9 @@
             </a:r>
           </a:p>
           <a:p>
-            <a:pPr marL="285750" indent="-285750">
-              <a:buFont typeface="Arial" panose="020B0604020202020204" pitchFamily="34" charset="0"/>
-              <a:buChar char="•"/>
+            <a:pPr marL="342900" indent="-342900">
+              <a:buFont typeface="+mj-lt"/>
+              <a:buAutoNum type="arabicPeriod"/>
             </a:pPr>
             <a:r>
               <a:rPr lang="en-US" dirty="0"/>
@@ -10674,9 +10684,9 @@
             </a:r>
           </a:p>
           <a:p>
-            <a:pPr marL="285750" indent="-285750">
-              <a:buFont typeface="Arial" panose="020B0604020202020204" pitchFamily="34" charset="0"/>
-              <a:buChar char="•"/>
+            <a:pPr marL="342900" indent="-342900">
+              <a:buFont typeface="+mj-lt"/>
+              <a:buAutoNum type="arabicPeriod"/>
             </a:pPr>
             <a:r>
               <a:rPr lang="en-US" dirty="0"/>
@@ -10692,9 +10702,9 @@
             </a:r>
           </a:p>
           <a:p>
-            <a:pPr marL="285750" indent="-285750">
-              <a:buFont typeface="Arial" panose="020B0604020202020204" pitchFamily="34" charset="0"/>
-              <a:buChar char="•"/>
+            <a:pPr marL="342900" indent="-342900">
+              <a:buFont typeface="+mj-lt"/>
+              <a:buAutoNum type="arabicPeriod"/>
             </a:pPr>
             <a:r>
               <a:rPr lang="en-US" dirty="0"/>
@@ -10702,9 +10712,9 @@
             </a:r>
           </a:p>
           <a:p>
-            <a:pPr marL="285750" indent="-285750">
-              <a:buFont typeface="Arial" panose="020B0604020202020204" pitchFamily="34" charset="0"/>
-              <a:buChar char="•"/>
+            <a:pPr marL="342900" indent="-342900">
+              <a:buFont typeface="+mj-lt"/>
+              <a:buAutoNum type="arabicPeriod"/>
             </a:pPr>
             <a:r>
               <a:rPr lang="en-US" dirty="0"/>
@@ -10820,13 +10830,8 @@
           <a:p>
             <a:r>
               <a:rPr lang="en-US" dirty="0"/>
-              <a:t>Understanding how they integrate and getting it clearer in </a:t>
-            </a:r>
-            <a:r>
-              <a:rPr lang="en-US"/>
-              <a:t>my head!</a:t>
-            </a:r>
-            <a:endParaRPr lang="en-US" dirty="0"/>
+              <a:t>Understanding how they integrate and getting it clearer in my head!</a:t>
+            </a:r>
           </a:p>
           <a:p>
             <a:r>

</xml_diff>

<commit_message>
Implemented secondary view boxes for veiw: vet, owner & animal
</commit_message>
<xml_diff>
--- a/Presentation/Vet Managment.pptx
+++ b/Presentation/Vet Managment.pptx
@@ -14,6 +14,7 @@
     <p:sldId id="264" r:id="rId8"/>
     <p:sldId id="261" r:id="rId9"/>
     <p:sldId id="265" r:id="rId10"/>
+    <p:sldId id="266" r:id="rId11"/>
   </p:sldIdLst>
   <p:sldSz cx="12192000" cy="6858000"/>
   <p:notesSz cx="6858000" cy="9144000"/>
@@ -123,7 +124,7 @@
 <file path=ppt/revisionInfo.xml><?xml version="1.0" encoding="utf-8"?>
 <p1510:revInfo xmlns:a="http://schemas.openxmlformats.org/drawingml/2006/main" xmlns:r="http://schemas.openxmlformats.org/officeDocument/2006/relationships" xmlns:p1510="http://schemas.microsoft.com/office/powerpoint/2015/10/main">
   <p1510:revLst>
-    <p1510:client id="{A7FEC831-BDE6-4C4C-9C14-DA98583E0717}" v="250" dt="2021-12-13T22:42:53.056"/>
+    <p1510:client id="{A7FEC831-BDE6-4C4C-9C14-DA98583E0717}" v="255" dt="2021-12-14T17:21:55.640"/>
   </p1510:revLst>
 </p1510:revInfo>
 </file>
@@ -133,7 +134,7 @@
   <pc:docChgLst>
     <pc:chgData name="Peter Mordaunt" userId="bb5abcbb151840ed" providerId="LiveId" clId="{A7FEC831-BDE6-4C4C-9C14-DA98583E0717}"/>
     <pc:docChg chg="undo custSel addSld delSld modSld modMainMaster">
-      <pc:chgData name="Peter Mordaunt" userId="bb5abcbb151840ed" providerId="LiveId" clId="{A7FEC831-BDE6-4C4C-9C14-DA98583E0717}" dt="2021-12-14T13:52:11.173" v="2092" actId="20577"/>
+      <pc:chgData name="Peter Mordaunt" userId="bb5abcbb151840ed" providerId="LiveId" clId="{A7FEC831-BDE6-4C4C-9C14-DA98583E0717}" dt="2021-12-14T21:54:11.740" v="2208" actId="15"/>
       <pc:docMkLst>
         <pc:docMk/>
       </pc:docMkLst>
@@ -958,6 +959,37 @@
           </ac:spMkLst>
         </pc:spChg>
       </pc:sldChg>
+      <pc:sldChg chg="addSp delSp modSp new mod">
+        <pc:chgData name="Peter Mordaunt" userId="bb5abcbb151840ed" providerId="LiveId" clId="{A7FEC831-BDE6-4C4C-9C14-DA98583E0717}" dt="2021-12-14T21:54:11.740" v="2208" actId="15"/>
+        <pc:sldMkLst>
+          <pc:docMk/>
+          <pc:sldMk cId="2057088241" sldId="266"/>
+        </pc:sldMkLst>
+        <pc:spChg chg="add mod">
+          <ac:chgData name="Peter Mordaunt" userId="bb5abcbb151840ed" providerId="LiveId" clId="{A7FEC831-BDE6-4C4C-9C14-DA98583E0717}" dt="2021-12-14T21:54:11.740" v="2208" actId="15"/>
+          <ac:spMkLst>
+            <pc:docMk/>
+            <pc:sldMk cId="2057088241" sldId="266"/>
+            <ac:spMk id="3" creationId="{FBB2F0A7-9ECB-954C-8C70-0E900B3D9F77}"/>
+          </ac:spMkLst>
+        </pc:spChg>
+        <pc:spChg chg="add mod">
+          <ac:chgData name="Peter Mordaunt" userId="bb5abcbb151840ed" providerId="LiveId" clId="{A7FEC831-BDE6-4C4C-9C14-DA98583E0717}" dt="2021-12-14T17:19:35.120" v="2165" actId="1076"/>
+          <ac:spMkLst>
+            <pc:docMk/>
+            <pc:sldMk cId="2057088241" sldId="266"/>
+            <ac:spMk id="4" creationId="{B42B7A2D-2948-B043-BEC9-F54AD870892A}"/>
+          </ac:spMkLst>
+        </pc:spChg>
+        <pc:spChg chg="add del mod">
+          <ac:chgData name="Peter Mordaunt" userId="bb5abcbb151840ed" providerId="LiveId" clId="{A7FEC831-BDE6-4C4C-9C14-DA98583E0717}" dt="2021-12-14T17:21:39.564" v="2167" actId="478"/>
+          <ac:spMkLst>
+            <pc:docMk/>
+            <pc:sldMk cId="2057088241" sldId="266"/>
+            <ac:spMk id="5" creationId="{0474B1AC-1C3C-F641-98F5-110915472327}"/>
+          </ac:spMkLst>
+        </pc:spChg>
+      </pc:sldChg>
       <pc:sldMasterChg chg="setBg modSldLayout">
         <pc:chgData name="Peter Mordaunt" userId="bb5abcbb151840ed" providerId="LiveId" clId="{A7FEC831-BDE6-4C4C-9C14-DA98583E0717}" dt="2021-12-10T15:04:31.560" v="332"/>
         <pc:sldMasterMkLst>
@@ -8755,6 +8787,263 @@
 </p:sld>
 </file>
 
+<file path=ppt/slides/slide10.xml><?xml version="1.0" encoding="utf-8"?>
+<p:sld xmlns:a="http://schemas.openxmlformats.org/drawingml/2006/main" xmlns:r="http://schemas.openxmlformats.org/officeDocument/2006/relationships" xmlns:p="http://schemas.openxmlformats.org/presentationml/2006/main">
+  <p:cSld>
+    <p:spTree>
+      <p:nvGrpSpPr>
+        <p:cNvPr id="1" name=""/>
+        <p:cNvGrpSpPr/>
+        <p:nvPr/>
+      </p:nvGrpSpPr>
+      <p:grpSpPr>
+        <a:xfrm>
+          <a:off x="0" y="0"/>
+          <a:ext cx="0" cy="0"/>
+          <a:chOff x="0" y="0"/>
+          <a:chExt cx="0" cy="0"/>
+        </a:xfrm>
+      </p:grpSpPr>
+      <p:sp>
+        <p:nvSpPr>
+          <p:cNvPr id="2" name="Title 1">
+            <a:extLst>
+              <a:ext uri="{FF2B5EF4-FFF2-40B4-BE49-F238E27FC236}">
+                <a16:creationId xmlns:a16="http://schemas.microsoft.com/office/drawing/2014/main" id="{0019945D-331A-094D-AFA4-B1B30B8929AA}"/>
+              </a:ext>
+            </a:extLst>
+          </p:cNvPr>
+          <p:cNvSpPr>
+            <a:spLocks noGrp="1"/>
+          </p:cNvSpPr>
+          <p:nvPr>
+            <p:ph type="title"/>
+          </p:nvPr>
+        </p:nvSpPr>
+        <p:spPr/>
+        <p:txBody>
+          <a:bodyPr/>
+          <a:lstStyle/>
+          <a:p>
+            <a:endParaRPr lang="en-US"/>
+          </a:p>
+        </p:txBody>
+      </p:sp>
+      <p:sp>
+        <p:nvSpPr>
+          <p:cNvPr id="3" name="TextBox 2">
+            <a:extLst>
+              <a:ext uri="{FF2B5EF4-FFF2-40B4-BE49-F238E27FC236}">
+                <a16:creationId xmlns:a16="http://schemas.microsoft.com/office/drawing/2014/main" id="{FBB2F0A7-9ECB-954C-8C70-0E900B3D9F77}"/>
+              </a:ext>
+            </a:extLst>
+          </p:cNvPr>
+          <p:cNvSpPr txBox="1"/>
+          <p:nvPr/>
+        </p:nvSpPr>
+        <p:spPr>
+          <a:xfrm>
+            <a:off x="573975" y="2987040"/>
+            <a:ext cx="11505714" cy="2585323"/>
+          </a:xfrm>
+          <a:prstGeom prst="rect">
+            <a:avLst/>
+          </a:prstGeom>
+          <a:noFill/>
+        </p:spPr>
+        <p:txBody>
+          <a:bodyPr wrap="none" rtlCol="0">
+            <a:spAutoFit/>
+          </a:bodyPr>
+          <a:lstStyle/>
+          <a:p>
+            <a:pPr lvl="1"/>
+            <a:r>
+              <a:rPr lang="en-GB" dirty="0"/>
+              <a:t>"SELECT </a:t>
+            </a:r>
+            <a:r>
+              <a:rPr lang="en-GB" dirty="0" err="1"/>
+              <a:t>appointments.appt_date</a:t>
+            </a:r>
+            <a:r>
+              <a:rPr lang="en-GB" dirty="0"/>
+              <a:t>, </a:t>
+            </a:r>
+            <a:r>
+              <a:rPr lang="en-GB" dirty="0" err="1"/>
+              <a:t>appointments.note_text</a:t>
+            </a:r>
+            <a:r>
+              <a:rPr lang="en-GB" dirty="0"/>
+              <a:t>, </a:t>
+            </a:r>
+            <a:r>
+              <a:rPr lang="en-GB" dirty="0" err="1"/>
+              <a:t>animals.name</a:t>
+            </a:r>
+            <a:r>
+              <a:rPr lang="en-GB" dirty="0"/>
+              <a:t>, </a:t>
+            </a:r>
+            <a:r>
+              <a:rPr lang="en-GB" dirty="0" err="1"/>
+              <a:t>vets.name</a:t>
+            </a:r>
+            <a:r>
+              <a:rPr lang="en-GB" dirty="0"/>
+              <a:t>, </a:t>
+            </a:r>
+            <a:r>
+              <a:rPr lang="en-GB" dirty="0" err="1"/>
+              <a:t>appointments.id</a:t>
+            </a:r>
+            <a:r>
+              <a:rPr lang="en-GB" dirty="0"/>
+              <a:t> </a:t>
+            </a:r>
+          </a:p>
+          <a:p>
+            <a:pPr lvl="1"/>
+            <a:r>
+              <a:rPr lang="en-GB" dirty="0"/>
+              <a:t>FROM appointments </a:t>
+            </a:r>
+          </a:p>
+          <a:p>
+            <a:pPr lvl="1"/>
+            <a:r>
+              <a:rPr lang="en-GB" dirty="0"/>
+              <a:t>INNER JOIN animals ON </a:t>
+            </a:r>
+            <a:r>
+              <a:rPr lang="en-GB" dirty="0" err="1"/>
+              <a:t>animals.id</a:t>
+            </a:r>
+            <a:r>
+              <a:rPr lang="en-GB" dirty="0"/>
+              <a:t> = </a:t>
+            </a:r>
+            <a:r>
+              <a:rPr lang="en-GB" dirty="0" err="1"/>
+              <a:t>appointments.animal_id</a:t>
+            </a:r>
+            <a:r>
+              <a:rPr lang="en-GB" dirty="0"/>
+              <a:t> </a:t>
+            </a:r>
+          </a:p>
+          <a:p>
+            <a:pPr lvl="1"/>
+            <a:r>
+              <a:rPr lang="en-GB" dirty="0"/>
+              <a:t>INNER JOIN vets ON </a:t>
+            </a:r>
+            <a:r>
+              <a:rPr lang="en-GB" dirty="0" err="1"/>
+              <a:t>vets.id</a:t>
+            </a:r>
+            <a:r>
+              <a:rPr lang="en-GB" dirty="0"/>
+              <a:t> = </a:t>
+            </a:r>
+            <a:r>
+              <a:rPr lang="en-GB" dirty="0" err="1"/>
+              <a:t>appointments.vet_id</a:t>
+            </a:r>
+            <a:r>
+              <a:rPr lang="en-GB" dirty="0"/>
+              <a:t> WHERE </a:t>
+            </a:r>
+            <a:r>
+              <a:rPr lang="en-GB" dirty="0" err="1"/>
+              <a:t>vets.id</a:t>
+            </a:r>
+            <a:r>
+              <a:rPr lang="en-GB" dirty="0"/>
+              <a:t> = %s”</a:t>
+            </a:r>
+          </a:p>
+          <a:p>
+            <a:endParaRPr lang="en-GB" dirty="0"/>
+          </a:p>
+          <a:p>
+            <a:pPr algn="ctr"/>
+            <a:r>
+              <a:rPr lang="en-GB" dirty="0"/>
+              <a:t>OR</a:t>
+            </a:r>
+          </a:p>
+          <a:p>
+            <a:endParaRPr lang="en-GB" dirty="0"/>
+          </a:p>
+          <a:p>
+            <a:r>
+              <a:rPr lang="en-GB" dirty="0"/>
+              <a:t>SELECT * FROM appointments WHERE </a:t>
+            </a:r>
+            <a:r>
+              <a:rPr lang="en-GB" dirty="0" err="1"/>
+              <a:t>vet_id</a:t>
+            </a:r>
+            <a:r>
+              <a:rPr lang="en-GB" dirty="0"/>
+              <a:t> = 9	+ a bit of python</a:t>
+            </a:r>
+          </a:p>
+          <a:p>
+            <a:endParaRPr lang="en-US" dirty="0"/>
+          </a:p>
+        </p:txBody>
+      </p:sp>
+      <p:sp>
+        <p:nvSpPr>
+          <p:cNvPr id="4" name="TextBox 3">
+            <a:extLst>
+              <a:ext uri="{FF2B5EF4-FFF2-40B4-BE49-F238E27FC236}">
+                <a16:creationId xmlns:a16="http://schemas.microsoft.com/office/drawing/2014/main" id="{B42B7A2D-2948-B043-BEC9-F54AD870892A}"/>
+              </a:ext>
+            </a:extLst>
+          </p:cNvPr>
+          <p:cNvSpPr txBox="1"/>
+          <p:nvPr/>
+        </p:nvSpPr>
+        <p:spPr>
+          <a:xfrm>
+            <a:off x="680321" y="2340864"/>
+            <a:ext cx="3817071" cy="369332"/>
+          </a:xfrm>
+          <a:prstGeom prst="rect">
+            <a:avLst/>
+          </a:prstGeom>
+          <a:noFill/>
+        </p:spPr>
+        <p:txBody>
+          <a:bodyPr wrap="none" rtlCol="0">
+            <a:spAutoFit/>
+          </a:bodyPr>
+          <a:lstStyle/>
+          <a:p>
+            <a:r>
+              <a:rPr lang="en-US" dirty="0"/>
+              <a:t>Many to Many Inner Join statement</a:t>
+            </a:r>
+          </a:p>
+        </p:txBody>
+      </p:sp>
+    </p:spTree>
+    <p:extLst>
+      <p:ext uri="{BB962C8B-B14F-4D97-AF65-F5344CB8AC3E}">
+        <p14:creationId xmlns:p14="http://schemas.microsoft.com/office/powerpoint/2010/main" val="2057088241"/>
+      </p:ext>
+    </p:extLst>
+  </p:cSld>
+  <p:clrMapOvr>
+    <a:masterClrMapping/>
+  </p:clrMapOvr>
+</p:sld>
+</file>
+
 <file path=ppt/slides/slide2.xml><?xml version="1.0" encoding="utf-8"?>
 <p:sld xmlns:a="http://schemas.openxmlformats.org/drawingml/2006/main" xmlns:r="http://schemas.openxmlformats.org/officeDocument/2006/relationships" xmlns:p="http://schemas.openxmlformats.org/presentationml/2006/main">
   <p:cSld>

</xml_diff>

<commit_message>
added alternating color between rows to make reading easier on anaimals
</commit_message>
<xml_diff>
--- a/Presentation/Vet Managment.pptx
+++ b/Presentation/Vet Managment.pptx
@@ -134,7 +134,7 @@
   <pc:docChgLst>
     <pc:chgData name="Peter Mordaunt" userId="bb5abcbb151840ed" providerId="LiveId" clId="{A7FEC831-BDE6-4C4C-9C14-DA98583E0717}"/>
     <pc:docChg chg="undo custSel addSld delSld modSld modMainMaster">
-      <pc:chgData name="Peter Mordaunt" userId="bb5abcbb151840ed" providerId="LiveId" clId="{A7FEC831-BDE6-4C4C-9C14-DA98583E0717}" dt="2021-12-14T21:54:11.740" v="2208" actId="15"/>
+      <pc:chgData name="Peter Mordaunt" userId="bb5abcbb151840ed" providerId="LiveId" clId="{A7FEC831-BDE6-4C4C-9C14-DA98583E0717}" dt="2021-12-15T14:30:43.065" v="2223" actId="20577"/>
       <pc:docMkLst>
         <pc:docMk/>
       </pc:docMkLst>
@@ -937,7 +937,7 @@
         </pc:picChg>
       </pc:sldChg>
       <pc:sldChg chg="addSp modSp new mod">
-        <pc:chgData name="Peter Mordaunt" userId="bb5abcbb151840ed" providerId="LiveId" clId="{A7FEC831-BDE6-4C4C-9C14-DA98583E0717}" dt="2021-12-13T22:45:28.991" v="2031" actId="20577"/>
+        <pc:chgData name="Peter Mordaunt" userId="bb5abcbb151840ed" providerId="LiveId" clId="{A7FEC831-BDE6-4C4C-9C14-DA98583E0717}" dt="2021-12-15T14:30:43.065" v="2223" actId="20577"/>
         <pc:sldMkLst>
           <pc:docMk/>
           <pc:sldMk cId="4199572944" sldId="265"/>
@@ -951,7 +951,7 @@
           </ac:spMkLst>
         </pc:spChg>
         <pc:spChg chg="add mod">
-          <ac:chgData name="Peter Mordaunt" userId="bb5abcbb151840ed" providerId="LiveId" clId="{A7FEC831-BDE6-4C4C-9C14-DA98583E0717}" dt="2021-12-13T22:45:28.991" v="2031" actId="20577"/>
+          <ac:chgData name="Peter Mordaunt" userId="bb5abcbb151840ed" providerId="LiveId" clId="{A7FEC831-BDE6-4C4C-9C14-DA98583E0717}" dt="2021-12-15T14:30:43.065" v="2223" actId="20577"/>
           <ac:spMkLst>
             <pc:docMk/>
             <pc:sldMk cId="4199572944" sldId="265"/>
@@ -1412,7 +1412,7 @@
           <a:p>
             <a:fld id="{78ABE3C1-DBE1-495D-B57B-2849774B866A}" type="datetimeFigureOut">
               <a:rPr lang="en-US" dirty="0"/>
-              <a:t>12/12/21</a:t>
+              <a:t>12/15/21</a:t>
             </a:fld>
             <a:endParaRPr lang="en-US" dirty="0"/>
           </a:p>
@@ -1821,7 +1821,7 @@
           <a:p>
             <a:fld id="{446C117F-5CCF-4837-BE5F-2B92066CAFAF}" type="datetimeFigureOut">
               <a:rPr lang="en-US" dirty="0"/>
-              <a:t>12/12/21</a:t>
+              <a:t>12/15/21</a:t>
             </a:fld>
             <a:endParaRPr lang="en-US" dirty="0"/>
           </a:p>
@@ -2152,7 +2152,7 @@
           <a:p>
             <a:fld id="{84EB90BD-B6CE-46B7-997F-7313B992CCDC}" type="datetimeFigureOut">
               <a:rPr lang="en-US" dirty="0"/>
-              <a:t>12/12/21</a:t>
+              <a:t>12/15/21</a:t>
             </a:fld>
             <a:endParaRPr lang="en-US" dirty="0"/>
           </a:p>
@@ -2552,7 +2552,7 @@
           <a:p>
             <a:fld id="{CDB9D11F-B188-461D-B23F-39381795C052}" type="datetimeFigureOut">
               <a:rPr lang="en-US" dirty="0"/>
-              <a:t>12/12/21</a:t>
+              <a:t>12/15/21</a:t>
             </a:fld>
             <a:endParaRPr lang="en-US" dirty="0"/>
           </a:p>
@@ -3115,7 +3115,7 @@
           <a:p>
             <a:fld id="{52E6D8D9-55A2-4063-B0F3-121F44549695}" type="datetimeFigureOut">
               <a:rPr lang="en-US" dirty="0"/>
-              <a:t>12/12/21</a:t>
+              <a:t>12/15/21</a:t>
             </a:fld>
             <a:endParaRPr lang="en-US" dirty="0"/>
           </a:p>
@@ -3791,7 +3791,7 @@
           <a:p>
             <a:fld id="{D4B24536-994D-4021-A283-9F449C0DB509}" type="datetimeFigureOut">
               <a:rPr lang="en-US" dirty="0"/>
-              <a:t>12/12/21</a:t>
+              <a:t>12/15/21</a:t>
             </a:fld>
             <a:endParaRPr lang="en-US" dirty="0"/>
           </a:p>
@@ -4699,7 +4699,7 @@
           <a:p>
             <a:fld id="{3CBBBB78-C96F-47B7-AB17-D852CA960AC9}" type="datetimeFigureOut">
               <a:rPr lang="en-US" dirty="0"/>
-              <a:t>12/12/21</a:t>
+              <a:t>12/15/21</a:t>
             </a:fld>
             <a:endParaRPr lang="en-US" dirty="0"/>
           </a:p>
@@ -5007,7 +5007,7 @@
           <a:p>
             <a:fld id="{1FA3F48C-C7C6-4055-9F49-3777875E72AE}" type="datetimeFigureOut">
               <a:rPr lang="en-US" dirty="0"/>
-              <a:t>12/12/21</a:t>
+              <a:t>12/15/21</a:t>
             </a:fld>
             <a:endParaRPr lang="en-US" dirty="0"/>
           </a:p>
@@ -5266,7 +5266,7 @@
           <a:p>
             <a:fld id="{6178E61D-D431-422C-9764-11DAFE33AB63}" type="datetimeFigureOut">
               <a:rPr lang="en-US" dirty="0"/>
-              <a:t>12/12/21</a:t>
+              <a:t>12/15/21</a:t>
             </a:fld>
             <a:endParaRPr lang="en-US" dirty="0"/>
           </a:p>
@@ -5585,7 +5585,7 @@
           <a:p>
             <a:fld id="{12DE42F4-6EEF-4EF7-8ED4-2208F0F89A08}" type="datetimeFigureOut">
               <a:rPr lang="en-US" dirty="0"/>
-              <a:t>12/12/21</a:t>
+              <a:t>12/15/21</a:t>
             </a:fld>
             <a:endParaRPr lang="en-US" dirty="0"/>
           </a:p>
@@ -5969,7 +5969,7 @@
           <a:p>
             <a:fld id="{30578ACC-22D6-47C1-A373-4FD133E34F3C}" type="datetimeFigureOut">
               <a:rPr lang="en-US" dirty="0"/>
-              <a:t>12/12/21</a:t>
+              <a:t>12/15/21</a:t>
             </a:fld>
             <a:endParaRPr lang="en-US" dirty="0"/>
           </a:p>
@@ -6340,7 +6340,7 @@
           <a:p>
             <a:fld id="{4E5A6C69-6797-4E8A-BF37-F2C3751466E9}" type="datetimeFigureOut">
               <a:rPr lang="en-US" dirty="0"/>
-              <a:t>12/12/21</a:t>
+              <a:t>12/15/21</a:t>
             </a:fld>
             <a:endParaRPr lang="en-US" dirty="0"/>
           </a:p>
@@ -6841,7 +6841,7 @@
           <a:p>
             <a:fld id="{D82014A1-A632-4878-A0D3-F52BA7563730}" type="datetimeFigureOut">
               <a:rPr lang="en-US" dirty="0"/>
-              <a:t>12/12/21</a:t>
+              <a:t>12/15/21</a:t>
             </a:fld>
             <a:endParaRPr lang="en-US" dirty="0"/>
           </a:p>
@@ -7093,7 +7093,7 @@
           <a:p>
             <a:fld id="{CE99F462-093F-4566-844B-4C71F2739DA5}" type="datetimeFigureOut">
               <a:rPr lang="en-US" dirty="0"/>
-              <a:t>12/12/21</a:t>
+              <a:t>12/15/21</a:t>
             </a:fld>
             <a:endParaRPr lang="en-US" dirty="0"/>
           </a:p>
@@ -7251,7 +7251,7 @@
           <a:p>
             <a:fld id="{3D24A7AC-904D-4781-85BA-7D10C17ED021}" type="datetimeFigureOut">
               <a:rPr lang="en-US" dirty="0"/>
-              <a:t>12/12/21</a:t>
+              <a:t>12/15/21</a:t>
             </a:fld>
             <a:endParaRPr lang="en-US" dirty="0"/>
           </a:p>
@@ -7636,7 +7636,7 @@
           <a:p>
             <a:fld id="{E331444B-B92B-4E27-8C94-BB93EAF5CB18}" type="datetimeFigureOut">
               <a:rPr lang="en-US" dirty="0"/>
-              <a:t>12/12/21</a:t>
+              <a:t>12/15/21</a:t>
             </a:fld>
             <a:endParaRPr lang="en-US" dirty="0"/>
           </a:p>
@@ -8040,7 +8040,7 @@
           <a:p>
             <a:fld id="{363EFA5E-FA76-400D-B3DC-F0BA90E6D107}" type="datetimeFigureOut">
               <a:rPr lang="en-US" dirty="0"/>
-              <a:t>12/12/21</a:t>
+              <a:t>12/15/21</a:t>
             </a:fld>
             <a:endParaRPr lang="en-US" dirty="0"/>
           </a:p>
@@ -8310,7 +8310,7 @@
           <a:p>
             <a:fld id="{9D6E9DEC-419B-4CC5-A080-3B06BD5A8291}" type="datetimeFigureOut">
               <a:rPr lang="en-US" dirty="0"/>
-              <a:t>12/12/21</a:t>
+              <a:t>12/15/21</a:t>
             </a:fld>
             <a:endParaRPr lang="en-US" dirty="0"/>
           </a:p>
@@ -11092,7 +11092,7 @@
         <p:spPr>
           <a:xfrm>
             <a:off x="2121408" y="3060192"/>
-            <a:ext cx="7287572" cy="1200329"/>
+            <a:ext cx="3250633" cy="923330"/>
           </a:xfrm>
           <a:prstGeom prst="rect">
             <a:avLst/>
@@ -11113,14 +11113,13 @@
           <a:p>
             <a:r>
               <a:rPr lang="en-US" dirty="0"/>
-              <a:t>Working with Routes </a:t>
-            </a:r>
-          </a:p>
-          <a:p>
-            <a:r>
-              <a:rPr lang="en-US" dirty="0"/>
-              <a:t>Understanding how they integrate and getting it clearer in my head!</a:t>
-            </a:r>
+              <a:t>Working </a:t>
+            </a:r>
+            <a:r>
+              <a:rPr lang="en-US"/>
+              <a:t>with Routes</a:t>
+            </a:r>
+            <a:endParaRPr lang="en-US" dirty="0"/>
           </a:p>
           <a:p>
             <a:r>

</xml_diff>

<commit_message>
added alternating color between rows to make reading easier on owner & vet
</commit_message>
<xml_diff>
--- a/Presentation/Vet Managment.pptx
+++ b/Presentation/Vet Managment.pptx
@@ -134,7 +134,7 @@
   <pc:docChgLst>
     <pc:chgData name="Peter Mordaunt" userId="bb5abcbb151840ed" providerId="LiveId" clId="{A7FEC831-BDE6-4C4C-9C14-DA98583E0717}"/>
     <pc:docChg chg="undo custSel addSld delSld modSld modMainMaster">
-      <pc:chgData name="Peter Mordaunt" userId="bb5abcbb151840ed" providerId="LiveId" clId="{A7FEC831-BDE6-4C4C-9C14-DA98583E0717}" dt="2021-12-15T14:30:43.065" v="2223" actId="20577"/>
+      <pc:chgData name="Peter Mordaunt" userId="bb5abcbb151840ed" providerId="LiveId" clId="{A7FEC831-BDE6-4C4C-9C14-DA98583E0717}" dt="2021-12-15T15:13:29.649" v="2383" actId="20577"/>
       <pc:docMkLst>
         <pc:docMk/>
       </pc:docMkLst>
@@ -718,7 +718,7 @@
         </pc:spChg>
       </pc:sldChg>
       <pc:sldChg chg="addSp modSp new mod">
-        <pc:chgData name="Peter Mordaunt" userId="bb5abcbb151840ed" providerId="LiveId" clId="{A7FEC831-BDE6-4C4C-9C14-DA98583E0717}" dt="2021-12-14T13:52:11.173" v="2092" actId="20577"/>
+        <pc:chgData name="Peter Mordaunt" userId="bb5abcbb151840ed" providerId="LiveId" clId="{A7FEC831-BDE6-4C4C-9C14-DA98583E0717}" dt="2021-12-15T15:13:29.649" v="2383" actId="20577"/>
         <pc:sldMkLst>
           <pc:docMk/>
           <pc:sldMk cId="792151724" sldId="261"/>
@@ -732,7 +732,7 @@
           </ac:spMkLst>
         </pc:spChg>
         <pc:spChg chg="add mod">
-          <ac:chgData name="Peter Mordaunt" userId="bb5abcbb151840ed" providerId="LiveId" clId="{A7FEC831-BDE6-4C4C-9C14-DA98583E0717}" dt="2021-12-14T13:52:11.173" v="2092" actId="20577"/>
+          <ac:chgData name="Peter Mordaunt" userId="bb5abcbb151840ed" providerId="LiveId" clId="{A7FEC831-BDE6-4C4C-9C14-DA98583E0717}" dt="2021-12-15T15:13:29.649" v="2383" actId="20577"/>
           <ac:spMkLst>
             <pc:docMk/>
             <pc:sldMk cId="792151724" sldId="261"/>
@@ -10837,8 +10837,13 @@
             </a:pPr>
             <a:r>
               <a:rPr lang="en-US" dirty="0"/>
-              <a:t>Add warning message for deleting (should)</a:t>
-            </a:r>
+              <a:t>Add warning message for deleting (should) -&gt;</a:t>
+            </a:r>
+            <a:r>
+              <a:rPr lang="en-US" dirty="0" err="1"/>
+              <a:t>Javascript</a:t>
+            </a:r>
+            <a:endParaRPr lang="en-US" dirty="0"/>
           </a:p>
           <a:p>
             <a:pPr marL="342900" indent="-342900">
@@ -10846,7 +10851,7 @@
               <a:buAutoNum type="arabicPeriod"/>
             </a:pPr>
             <a:r>
-              <a:rPr lang="en-US" dirty="0"/>
+              <a:rPr lang="en-US" strike="sngStrike" dirty="0"/>
               <a:t>Set vet for making appts so not editable(should)</a:t>
             </a:r>
           </a:p>
@@ -10857,8 +10862,13 @@
             </a:pPr>
             <a:r>
               <a:rPr lang="en-US" dirty="0"/>
-              <a:t>Add confirm message for updates (Should)</a:t>
-            </a:r>
+              <a:t>Add confirm message for updates (Should) -&gt; </a:t>
+            </a:r>
+            <a:r>
+              <a:rPr lang="en-US" dirty="0" err="1"/>
+              <a:t>Javascript</a:t>
+            </a:r>
+            <a:endParaRPr lang="en-US" dirty="0"/>
           </a:p>
           <a:p>
             <a:pPr marL="342900" indent="-342900">
@@ -10866,12 +10876,8 @@
               <a:buAutoNum type="arabicPeriod"/>
             </a:pPr>
             <a:r>
-              <a:rPr lang="en-US" dirty="0" err="1"/>
-              <a:t>animal.get_all_appointments</a:t>
-            </a:r>
-            <a:r>
               <a:rPr lang="en-US" dirty="0"/>
-              <a:t>() (for vet too, maybe even owners for all animals) (should)</a:t>
+              <a:t>Age or dob option? (should) could solve with dummy dob based on reg date &amp; dob known bool</a:t>
             </a:r>
           </a:p>
           <a:p>
@@ -10880,8 +10886,8 @@
               <a:buAutoNum type="arabicPeriod"/>
             </a:pPr>
             <a:r>
-              <a:rPr lang="en-US" dirty="0"/>
-              <a:t>Age or dob option? (should) could solve with dummy dob based on reg date &amp; dob known bool</a:t>
+              <a:rPr lang="en-US" strike="sngStrike" dirty="0"/>
+              <a:t>Add all appointments in aside on view selected page (should)</a:t>
             </a:r>
           </a:p>
           <a:p>
@@ -10890,8 +10896,8 @@
               <a:buAutoNum type="arabicPeriod"/>
             </a:pPr>
             <a:r>
-              <a:rPr lang="en-US" dirty="0"/>
-              <a:t>Add all appointments in aside on view animal page (should)</a:t>
+              <a:rPr lang="en-US" strike="sngStrike" dirty="0"/>
+              <a:t>Add animals/owners/vet in second aside (should)</a:t>
             </a:r>
           </a:p>
           <a:p>
@@ -10900,7 +10906,7 @@
               <a:buAutoNum type="arabicPeriod"/>
             </a:pPr>
             <a:r>
-              <a:rPr lang="en-US" dirty="0"/>
+              <a:rPr lang="en-US" strike="sngStrike" dirty="0"/>
               <a:t>Make all fields required when adding new entries(should)</a:t>
             </a:r>
           </a:p>
@@ -10911,7 +10917,15 @@
             </a:pPr>
             <a:r>
               <a:rPr lang="en-US" dirty="0"/>
-              <a:t>Filter by date, animal, vet, owner (should)</a:t>
+              <a:t>sort appointments by date</a:t>
+            </a:r>
+            <a:r>
+              <a:rPr lang="en-US"/>
+              <a:t>, alpha, </a:t>
+            </a:r>
+            <a:r>
+              <a:rPr lang="en-US" dirty="0"/>
+              <a:t>vet, owner (should)</a:t>
             </a:r>
           </a:p>
           <a:p>
@@ -11113,13 +11127,8 @@
           <a:p>
             <a:r>
               <a:rPr lang="en-US" dirty="0"/>
-              <a:t>Working </a:t>
-            </a:r>
-            <a:r>
-              <a:rPr lang="en-US"/>
-              <a:t>with Routes</a:t>
-            </a:r>
-            <a:endParaRPr lang="en-US" dirty="0"/>
+              <a:t>Working with Routes</a:t>
+            </a:r>
           </a:p>
           <a:p>
             <a:r>

</xml_diff>

<commit_message>
Added sort by date asc or desc for appointments
</commit_message>
<xml_diff>
--- a/Presentation/Vet Managment.pptx
+++ b/Presentation/Vet Managment.pptx
@@ -134,7 +134,7 @@
   <pc:docChgLst>
     <pc:chgData name="Peter Mordaunt" userId="bb5abcbb151840ed" providerId="LiveId" clId="{A7FEC831-BDE6-4C4C-9C14-DA98583E0717}"/>
     <pc:docChg chg="undo custSel addSld delSld modSld modMainMaster">
-      <pc:chgData name="Peter Mordaunt" userId="bb5abcbb151840ed" providerId="LiveId" clId="{A7FEC831-BDE6-4C4C-9C14-DA98583E0717}" dt="2021-12-15T15:13:29.649" v="2383" actId="20577"/>
+      <pc:chgData name="Peter Mordaunt" userId="bb5abcbb151840ed" providerId="LiveId" clId="{A7FEC831-BDE6-4C4C-9C14-DA98583E0717}" dt="2021-12-15T15:31:54.098" v="2420" actId="20577"/>
       <pc:docMkLst>
         <pc:docMk/>
       </pc:docMkLst>
@@ -718,7 +718,7 @@
         </pc:spChg>
       </pc:sldChg>
       <pc:sldChg chg="addSp modSp new mod">
-        <pc:chgData name="Peter Mordaunt" userId="bb5abcbb151840ed" providerId="LiveId" clId="{A7FEC831-BDE6-4C4C-9C14-DA98583E0717}" dt="2021-12-15T15:13:29.649" v="2383" actId="20577"/>
+        <pc:chgData name="Peter Mordaunt" userId="bb5abcbb151840ed" providerId="LiveId" clId="{A7FEC831-BDE6-4C4C-9C14-DA98583E0717}" dt="2021-12-15T15:31:54.098" v="2420" actId="20577"/>
         <pc:sldMkLst>
           <pc:docMk/>
           <pc:sldMk cId="792151724" sldId="261"/>
@@ -732,7 +732,7 @@
           </ac:spMkLst>
         </pc:spChg>
         <pc:spChg chg="add mod">
-          <ac:chgData name="Peter Mordaunt" userId="bb5abcbb151840ed" providerId="LiveId" clId="{A7FEC831-BDE6-4C4C-9C14-DA98583E0717}" dt="2021-12-15T15:13:29.649" v="2383" actId="20577"/>
+          <ac:chgData name="Peter Mordaunt" userId="bb5abcbb151840ed" providerId="LiveId" clId="{A7FEC831-BDE6-4C4C-9C14-DA98583E0717}" dt="2021-12-15T15:31:54.098" v="2420" actId="20577"/>
           <ac:spMkLst>
             <pc:docMk/>
             <pc:sldMk cId="792151724" sldId="261"/>
@@ -10812,7 +10812,7 @@
         <p:spPr>
           <a:xfrm>
             <a:off x="680321" y="1502688"/>
-            <a:ext cx="10104698" cy="5355312"/>
+            <a:ext cx="10104698" cy="5632311"/>
           </a:xfrm>
           <a:prstGeom prst="rect">
             <a:avLst/>
@@ -10917,15 +10917,7 @@
             </a:pPr>
             <a:r>
               <a:rPr lang="en-US" dirty="0"/>
-              <a:t>sort appointments by date</a:t>
-            </a:r>
-            <a:r>
-              <a:rPr lang="en-US"/>
-              <a:t>, alpha, </a:t>
-            </a:r>
-            <a:r>
-              <a:rPr lang="en-US" dirty="0"/>
-              <a:t>vet, owner (should)</a:t>
+              <a:t>sort appointments by date, alpha, vet, owner (should)</a:t>
             </a:r>
           </a:p>
           <a:p>
@@ -10937,6 +10929,21 @@
               <a:rPr lang="en-US" dirty="0"/>
               <a:t>Add submenu items – add/edit/all (should)</a:t>
             </a:r>
+          </a:p>
+          <a:p>
+            <a:pPr marL="342900" indent="-342900">
+              <a:buFont typeface="+mj-lt"/>
+              <a:buAutoNum type="arabicPeriod"/>
+            </a:pPr>
+            <a:r>
+              <a:rPr lang="en-US" dirty="0"/>
+              <a:t>Add pages to list results </a:t>
+            </a:r>
+            <a:r>
+              <a:rPr lang="en-US"/>
+              <a:t>(could)</a:t>
+            </a:r>
+            <a:endParaRPr lang="en-US" dirty="0"/>
           </a:p>
           <a:p>
             <a:pPr marL="342900" indent="-342900">

</xml_diff>

<commit_message>
fixed header img display issue tha was due to a relative instaed of absolute path
</commit_message>
<xml_diff>
--- a/Presentation/Vet Managment.pptx
+++ b/Presentation/Vet Managment.pptx
@@ -12,9 +12,10 @@
     <p:sldId id="263" r:id="rId6"/>
     <p:sldId id="262" r:id="rId7"/>
     <p:sldId id="264" r:id="rId8"/>
-    <p:sldId id="261" r:id="rId9"/>
-    <p:sldId id="265" r:id="rId10"/>
+    <p:sldId id="268" r:id="rId9"/>
+    <p:sldId id="267" r:id="rId10"/>
     <p:sldId id="266" r:id="rId11"/>
+    <p:sldId id="265" r:id="rId12"/>
   </p:sldIdLst>
   <p:sldSz cx="12192000" cy="6858000"/>
   <p:notesSz cx="6858000" cy="9144000"/>
@@ -124,7 +125,7 @@
 <file path=ppt/revisionInfo.xml><?xml version="1.0" encoding="utf-8"?>
 <p1510:revInfo xmlns:a="http://schemas.openxmlformats.org/drawingml/2006/main" xmlns:r="http://schemas.openxmlformats.org/officeDocument/2006/relationships" xmlns:p1510="http://schemas.microsoft.com/office/powerpoint/2015/10/main">
   <p1510:revLst>
-    <p1510:client id="{A7FEC831-BDE6-4C4C-9C14-DA98583E0717}" v="255" dt="2021-12-14T17:21:55.640"/>
+    <p1510:client id="{A7FEC831-BDE6-4C4C-9C14-DA98583E0717}" v="264" dt="2021-12-16T00:16:01.083"/>
   </p1510:revLst>
 </p1510:revInfo>
 </file>
@@ -133,8 +134,8 @@
 <pc:chgInfo xmlns:a="http://schemas.openxmlformats.org/drawingml/2006/main" xmlns:r="http://schemas.openxmlformats.org/officeDocument/2006/relationships" xmlns:ac="http://schemas.microsoft.com/office/drawing/2013/main/command" xmlns:pc="http://schemas.microsoft.com/office/powerpoint/2013/main/command">
   <pc:docChgLst>
     <pc:chgData name="Peter Mordaunt" userId="bb5abcbb151840ed" providerId="LiveId" clId="{A7FEC831-BDE6-4C4C-9C14-DA98583E0717}"/>
-    <pc:docChg chg="undo custSel addSld delSld modSld modMainMaster">
-      <pc:chgData name="Peter Mordaunt" userId="bb5abcbb151840ed" providerId="LiveId" clId="{A7FEC831-BDE6-4C4C-9C14-DA98583E0717}" dt="2021-12-15T15:31:54.098" v="2420" actId="20577"/>
+    <pc:docChg chg="undo custSel addSld delSld modSld sldOrd modMainMaster">
+      <pc:chgData name="Peter Mordaunt" userId="bb5abcbb151840ed" providerId="LiveId" clId="{A7FEC831-BDE6-4C4C-9C14-DA98583E0717}" dt="2021-12-16T00:23:15.551" v="2640" actId="1076"/>
       <pc:docMkLst>
         <pc:docMk/>
       </pc:docMkLst>
@@ -717,8 +718,8 @@
           </ac:spMkLst>
         </pc:spChg>
       </pc:sldChg>
-      <pc:sldChg chg="addSp modSp new mod">
-        <pc:chgData name="Peter Mordaunt" userId="bb5abcbb151840ed" providerId="LiveId" clId="{A7FEC831-BDE6-4C4C-9C14-DA98583E0717}" dt="2021-12-15T15:31:54.098" v="2420" actId="20577"/>
+      <pc:sldChg chg="addSp delSp modSp new del mod">
+        <pc:chgData name="Peter Mordaunt" userId="bb5abcbb151840ed" providerId="LiveId" clId="{A7FEC831-BDE6-4C4C-9C14-DA98583E0717}" dt="2021-12-15T23:01:02.735" v="2430" actId="2696"/>
         <pc:sldMkLst>
           <pc:docMk/>
           <pc:sldMk cId="792151724" sldId="261"/>
@@ -731,8 +732,8 @@
             <ac:spMk id="2" creationId="{5654D0C1-A048-A24F-810D-C6A91D612E50}"/>
           </ac:spMkLst>
         </pc:spChg>
-        <pc:spChg chg="add mod">
-          <ac:chgData name="Peter Mordaunt" userId="bb5abcbb151840ed" providerId="LiveId" clId="{A7FEC831-BDE6-4C4C-9C14-DA98583E0717}" dt="2021-12-15T15:31:54.098" v="2420" actId="20577"/>
+        <pc:spChg chg="add del mod">
+          <ac:chgData name="Peter Mordaunt" userId="bb5abcbb151840ed" providerId="LiveId" clId="{A7FEC831-BDE6-4C4C-9C14-DA98583E0717}" dt="2021-12-15T23:00:42.709" v="2427" actId="21"/>
           <ac:spMkLst>
             <pc:docMk/>
             <pc:sldMk cId="792151724" sldId="261"/>
@@ -748,13 +749,13 @@
         </pc:sldMkLst>
       </pc:sldChg>
       <pc:sldChg chg="addSp delSp modSp new mod setBg">
-        <pc:chgData name="Peter Mordaunt" userId="bb5abcbb151840ed" providerId="LiveId" clId="{A7FEC831-BDE6-4C4C-9C14-DA98583E0717}" dt="2021-12-11T23:37:35.309" v="1719" actId="1076"/>
+        <pc:chgData name="Peter Mordaunt" userId="bb5abcbb151840ed" providerId="LiveId" clId="{A7FEC831-BDE6-4C4C-9C14-DA98583E0717}" dt="2021-12-16T00:16:01.083" v="2639" actId="164"/>
         <pc:sldMkLst>
           <pc:docMk/>
           <pc:sldMk cId="1762480478" sldId="262"/>
         </pc:sldMkLst>
         <pc:spChg chg="add mod topLvl">
-          <ac:chgData name="Peter Mordaunt" userId="bb5abcbb151840ed" providerId="LiveId" clId="{A7FEC831-BDE6-4C4C-9C14-DA98583E0717}" dt="2021-12-11T23:35:30.856" v="1707" actId="14100"/>
+          <ac:chgData name="Peter Mordaunt" userId="bb5abcbb151840ed" providerId="LiveId" clId="{A7FEC831-BDE6-4C4C-9C14-DA98583E0717}" dt="2021-12-16T00:16:01.083" v="2639" actId="164"/>
           <ac:spMkLst>
             <pc:docMk/>
             <pc:sldMk cId="1762480478" sldId="262"/>
@@ -762,7 +763,7 @@
           </ac:spMkLst>
         </pc:spChg>
         <pc:spChg chg="add mod topLvl">
-          <ac:chgData name="Peter Mordaunt" userId="bb5abcbb151840ed" providerId="LiveId" clId="{A7FEC831-BDE6-4C4C-9C14-DA98583E0717}" dt="2021-12-11T23:34:28.943" v="1695" actId="165"/>
+          <ac:chgData name="Peter Mordaunt" userId="bb5abcbb151840ed" providerId="LiveId" clId="{A7FEC831-BDE6-4C4C-9C14-DA98583E0717}" dt="2021-12-16T00:16:01.083" v="2639" actId="164"/>
           <ac:spMkLst>
             <pc:docMk/>
             <pc:sldMk cId="1762480478" sldId="262"/>
@@ -770,13 +771,21 @@
           </ac:spMkLst>
         </pc:spChg>
         <pc:spChg chg="add mod">
-          <ac:chgData name="Peter Mordaunt" userId="bb5abcbb151840ed" providerId="LiveId" clId="{A7FEC831-BDE6-4C4C-9C14-DA98583E0717}" dt="2021-12-11T23:37:25.501" v="1718" actId="207"/>
+          <ac:chgData name="Peter Mordaunt" userId="bb5abcbb151840ed" providerId="LiveId" clId="{A7FEC831-BDE6-4C4C-9C14-DA98583E0717}" dt="2021-12-16T00:16:01.083" v="2639" actId="164"/>
           <ac:spMkLst>
             <pc:docMk/>
             <pc:sldMk cId="1762480478" sldId="262"/>
             <ac:spMk id="12" creationId="{AA07F3FA-CAA7-FF47-B8A0-04447ADFA204}"/>
           </ac:spMkLst>
         </pc:spChg>
+        <pc:grpChg chg="add mod">
+          <ac:chgData name="Peter Mordaunt" userId="bb5abcbb151840ed" providerId="LiveId" clId="{A7FEC831-BDE6-4C4C-9C14-DA98583E0717}" dt="2021-12-16T00:16:01.083" v="2639" actId="164"/>
+          <ac:grpSpMkLst>
+            <pc:docMk/>
+            <pc:sldMk cId="1762480478" sldId="262"/>
+            <ac:grpSpMk id="2" creationId="{AB4F13F5-8DD4-DC41-A603-226B33771499}"/>
+          </ac:grpSpMkLst>
+        </pc:grpChg>
         <pc:grpChg chg="add del mod">
           <ac:chgData name="Peter Mordaunt" userId="bb5abcbb151840ed" providerId="LiveId" clId="{A7FEC831-BDE6-4C4C-9C14-DA98583E0717}" dt="2021-12-11T23:34:28.943" v="1695" actId="165"/>
           <ac:grpSpMkLst>
@@ -826,7 +835,7 @@
           </ac:picMkLst>
         </pc:picChg>
         <pc:picChg chg="add mod">
-          <ac:chgData name="Peter Mordaunt" userId="bb5abcbb151840ed" providerId="LiveId" clId="{A7FEC831-BDE6-4C4C-9C14-DA98583E0717}" dt="2021-12-11T23:37:35.309" v="1719" actId="1076"/>
+          <ac:chgData name="Peter Mordaunt" userId="bb5abcbb151840ed" providerId="LiveId" clId="{A7FEC831-BDE6-4C4C-9C14-DA98583E0717}" dt="2021-12-16T00:16:01.083" v="2639" actId="164"/>
           <ac:picMkLst>
             <pc:docMk/>
             <pc:sldMk cId="1762480478" sldId="262"/>
@@ -866,7 +875,7 @@
         </pc:picChg>
       </pc:sldChg>
       <pc:sldChg chg="addSp delSp modSp new mod">
-        <pc:chgData name="Peter Mordaunt" userId="bb5abcbb151840ed" providerId="LiveId" clId="{A7FEC831-BDE6-4C4C-9C14-DA98583E0717}" dt="2021-12-12T17:56:15.044" v="1720" actId="1076"/>
+        <pc:chgData name="Peter Mordaunt" userId="bb5abcbb151840ed" providerId="LiveId" clId="{A7FEC831-BDE6-4C4C-9C14-DA98583E0717}" dt="2021-12-16T00:23:15.551" v="2640" actId="1076"/>
         <pc:sldMkLst>
           <pc:docMk/>
           <pc:sldMk cId="3361190902" sldId="264"/>
@@ -888,7 +897,7 @@
           </ac:grpSpMkLst>
         </pc:grpChg>
         <pc:grpChg chg="add mod">
-          <ac:chgData name="Peter Mordaunt" userId="bb5abcbb151840ed" providerId="LiveId" clId="{A7FEC831-BDE6-4C4C-9C14-DA98583E0717}" dt="2021-12-12T17:56:15.044" v="1720" actId="1076"/>
+          <ac:chgData name="Peter Mordaunt" userId="bb5abcbb151840ed" providerId="LiveId" clId="{A7FEC831-BDE6-4C4C-9C14-DA98583E0717}" dt="2021-12-16T00:23:15.551" v="2640" actId="1076"/>
           <ac:grpSpMkLst>
             <pc:docMk/>
             <pc:sldMk cId="3361190902" sldId="264"/>
@@ -936,8 +945,8 @@
           </ac:picMkLst>
         </pc:picChg>
       </pc:sldChg>
-      <pc:sldChg chg="addSp modSp new mod">
-        <pc:chgData name="Peter Mordaunt" userId="bb5abcbb151840ed" providerId="LiveId" clId="{A7FEC831-BDE6-4C4C-9C14-DA98583E0717}" dt="2021-12-15T14:30:43.065" v="2223" actId="20577"/>
+      <pc:sldChg chg="addSp modSp new mod ord">
+        <pc:chgData name="Peter Mordaunt" userId="bb5abcbb151840ed" providerId="LiveId" clId="{A7FEC831-BDE6-4C4C-9C14-DA98583E0717}" dt="2021-12-15T23:26:28.907" v="2636" actId="207"/>
         <pc:sldMkLst>
           <pc:docMk/>
           <pc:sldMk cId="4199572944" sldId="265"/>
@@ -951,7 +960,7 @@
           </ac:spMkLst>
         </pc:spChg>
         <pc:spChg chg="add mod">
-          <ac:chgData name="Peter Mordaunt" userId="bb5abcbb151840ed" providerId="LiveId" clId="{A7FEC831-BDE6-4C4C-9C14-DA98583E0717}" dt="2021-12-15T14:30:43.065" v="2223" actId="20577"/>
+          <ac:chgData name="Peter Mordaunt" userId="bb5abcbb151840ed" providerId="LiveId" clId="{A7FEC831-BDE6-4C4C-9C14-DA98583E0717}" dt="2021-12-15T23:26:28.907" v="2636" actId="207"/>
           <ac:spMkLst>
             <pc:docMk/>
             <pc:sldMk cId="4199572944" sldId="265"/>
@@ -959,22 +968,30 @@
           </ac:spMkLst>
         </pc:spChg>
       </pc:sldChg>
-      <pc:sldChg chg="addSp delSp modSp new mod">
-        <pc:chgData name="Peter Mordaunt" userId="bb5abcbb151840ed" providerId="LiveId" clId="{A7FEC831-BDE6-4C4C-9C14-DA98583E0717}" dt="2021-12-14T21:54:11.740" v="2208" actId="15"/>
+      <pc:sldChg chg="addSp delSp modSp new mod ord setBg">
+        <pc:chgData name="Peter Mordaunt" userId="bb5abcbb151840ed" providerId="LiveId" clId="{A7FEC831-BDE6-4C4C-9C14-DA98583E0717}" dt="2021-12-15T23:24:45.634" v="2580" actId="26606"/>
         <pc:sldMkLst>
           <pc:docMk/>
           <pc:sldMk cId="2057088241" sldId="266"/>
         </pc:sldMkLst>
-        <pc:spChg chg="add mod">
-          <ac:chgData name="Peter Mordaunt" userId="bb5abcbb151840ed" providerId="LiveId" clId="{A7FEC831-BDE6-4C4C-9C14-DA98583E0717}" dt="2021-12-14T21:54:11.740" v="2208" actId="15"/>
+        <pc:spChg chg="mod">
+          <ac:chgData name="Peter Mordaunt" userId="bb5abcbb151840ed" providerId="LiveId" clId="{A7FEC831-BDE6-4C4C-9C14-DA98583E0717}" dt="2021-12-15T23:24:45.634" v="2580" actId="26606"/>
+          <ac:spMkLst>
+            <pc:docMk/>
+            <pc:sldMk cId="2057088241" sldId="266"/>
+            <ac:spMk id="2" creationId="{0019945D-331A-094D-AFA4-B1B30B8929AA}"/>
+          </ac:spMkLst>
+        </pc:spChg>
+        <pc:spChg chg="add del mod">
+          <ac:chgData name="Peter Mordaunt" userId="bb5abcbb151840ed" providerId="LiveId" clId="{A7FEC831-BDE6-4C4C-9C14-DA98583E0717}" dt="2021-12-15T23:09:45.103" v="2547"/>
           <ac:spMkLst>
             <pc:docMk/>
             <pc:sldMk cId="2057088241" sldId="266"/>
             <ac:spMk id="3" creationId="{FBB2F0A7-9ECB-954C-8C70-0E900B3D9F77}"/>
           </ac:spMkLst>
         </pc:spChg>
-        <pc:spChg chg="add mod">
-          <ac:chgData name="Peter Mordaunt" userId="bb5abcbb151840ed" providerId="LiveId" clId="{A7FEC831-BDE6-4C4C-9C14-DA98583E0717}" dt="2021-12-14T17:19:35.120" v="2165" actId="1076"/>
+        <pc:spChg chg="add del mod">
+          <ac:chgData name="Peter Mordaunt" userId="bb5abcbb151840ed" providerId="LiveId" clId="{A7FEC831-BDE6-4C4C-9C14-DA98583E0717}" dt="2021-12-15T23:09:44.579" v="2545" actId="478"/>
           <ac:spMkLst>
             <pc:docMk/>
             <pc:sldMk cId="2057088241" sldId="266"/>
@@ -987,6 +1004,171 @@
             <pc:docMk/>
             <pc:sldMk cId="2057088241" sldId="266"/>
             <ac:spMk id="5" creationId="{0474B1AC-1C3C-F641-98F5-110915472327}"/>
+          </ac:spMkLst>
+        </pc:spChg>
+        <pc:spChg chg="add del mod">
+          <ac:chgData name="Peter Mordaunt" userId="bb5abcbb151840ed" providerId="LiveId" clId="{A7FEC831-BDE6-4C4C-9C14-DA98583E0717}" dt="2021-12-15T23:21:35.868" v="2565" actId="478"/>
+          <ac:spMkLst>
+            <pc:docMk/>
+            <pc:sldMk cId="2057088241" sldId="266"/>
+            <ac:spMk id="5" creationId="{D5779ADD-B9F8-EA4A-B282-19B2DE38C311}"/>
+          </ac:spMkLst>
+        </pc:spChg>
+        <pc:spChg chg="add del mod">
+          <ac:chgData name="Peter Mordaunt" userId="bb5abcbb151840ed" providerId="LiveId" clId="{A7FEC831-BDE6-4C4C-9C14-DA98583E0717}" dt="2021-12-15T23:17:03.969" v="2563" actId="478"/>
+          <ac:spMkLst>
+            <pc:docMk/>
+            <pc:sldMk cId="2057088241" sldId="266"/>
+            <ac:spMk id="6" creationId="{A76FF228-372B-A94F-A5AC-127B06CD8F9C}"/>
+          </ac:spMkLst>
+        </pc:spChg>
+        <pc:spChg chg="add del">
+          <ac:chgData name="Peter Mordaunt" userId="bb5abcbb151840ed" providerId="LiveId" clId="{A7FEC831-BDE6-4C4C-9C14-DA98583E0717}" dt="2021-12-15T23:24:45.634" v="2580" actId="26606"/>
+          <ac:spMkLst>
+            <pc:docMk/>
+            <pc:sldMk cId="2057088241" sldId="266"/>
+            <ac:spMk id="23" creationId="{3717E301-9A1C-441F-BCE3-A7978A1C31F2}"/>
+          </ac:spMkLst>
+        </pc:spChg>
+        <pc:spChg chg="add del">
+          <ac:chgData name="Peter Mordaunt" userId="bb5abcbb151840ed" providerId="LiveId" clId="{A7FEC831-BDE6-4C4C-9C14-DA98583E0717}" dt="2021-12-15T23:24:45.634" v="2580" actId="26606"/>
+          <ac:spMkLst>
+            <pc:docMk/>
+            <pc:sldMk cId="2057088241" sldId="266"/>
+            <ac:spMk id="25" creationId="{4C92FBE1-7876-42B4-BB11-46FF68221E5C}"/>
+          </ac:spMkLst>
+        </pc:spChg>
+        <pc:spChg chg="add del">
+          <ac:chgData name="Peter Mordaunt" userId="bb5abcbb151840ed" providerId="LiveId" clId="{A7FEC831-BDE6-4C4C-9C14-DA98583E0717}" dt="2021-12-15T23:24:45.634" v="2580" actId="26606"/>
+          <ac:spMkLst>
+            <pc:docMk/>
+            <pc:sldMk cId="2057088241" sldId="266"/>
+            <ac:spMk id="27" creationId="{86B5BE23-43BC-4102-A20C-F4ACF61B9683}"/>
+          </ac:spMkLst>
+        </pc:spChg>
+        <pc:spChg chg="add del">
+          <ac:chgData name="Peter Mordaunt" userId="bb5abcbb151840ed" providerId="LiveId" clId="{A7FEC831-BDE6-4C4C-9C14-DA98583E0717}" dt="2021-12-15T23:24:45.634" v="2580" actId="26606"/>
+          <ac:spMkLst>
+            <pc:docMk/>
+            <pc:sldMk cId="2057088241" sldId="266"/>
+            <ac:spMk id="31" creationId="{BC74B2E0-C1FD-4AD7-A14C-28341D0D8977}"/>
+          </ac:spMkLst>
+        </pc:spChg>
+        <pc:spChg chg="add del">
+          <ac:chgData name="Peter Mordaunt" userId="bb5abcbb151840ed" providerId="LiveId" clId="{A7FEC831-BDE6-4C4C-9C14-DA98583E0717}" dt="2021-12-15T23:24:45.634" v="2580" actId="26606"/>
+          <ac:spMkLst>
+            <pc:docMk/>
+            <pc:sldMk cId="2057088241" sldId="266"/>
+            <ac:spMk id="35" creationId="{2933D720-9FAE-440B-82CD-48ED809705ED}"/>
+          </ac:spMkLst>
+        </pc:spChg>
+        <pc:spChg chg="add del">
+          <ac:chgData name="Peter Mordaunt" userId="bb5abcbb151840ed" providerId="LiveId" clId="{A7FEC831-BDE6-4C4C-9C14-DA98583E0717}" dt="2021-12-15T23:24:45.634" v="2580" actId="26606"/>
+          <ac:spMkLst>
+            <pc:docMk/>
+            <pc:sldMk cId="2057088241" sldId="266"/>
+            <ac:spMk id="37" creationId="{EF695075-78BE-4317-9CC5-B2ADC2D99DE9}"/>
+          </ac:spMkLst>
+        </pc:spChg>
+        <pc:picChg chg="add mod ord">
+          <ac:chgData name="Peter Mordaunt" userId="bb5abcbb151840ed" providerId="LiveId" clId="{A7FEC831-BDE6-4C4C-9C14-DA98583E0717}" dt="2021-12-15T23:24:45.634" v="2580" actId="26606"/>
+          <ac:picMkLst>
+            <pc:docMk/>
+            <pc:sldMk cId="2057088241" sldId="266"/>
+            <ac:picMk id="8" creationId="{B2562ACC-D4AC-8841-9DC9-407B6913DE7D}"/>
+          </ac:picMkLst>
+        </pc:picChg>
+        <pc:picChg chg="add del mod">
+          <ac:chgData name="Peter Mordaunt" userId="bb5abcbb151840ed" providerId="LiveId" clId="{A7FEC831-BDE6-4C4C-9C14-DA98583E0717}" dt="2021-12-15T23:23:50.407" v="2574" actId="478"/>
+          <ac:picMkLst>
+            <pc:docMk/>
+            <pc:sldMk cId="2057088241" sldId="266"/>
+            <ac:picMk id="10" creationId="{635AC14B-49EC-354D-8B00-ACF11BA9B4A4}"/>
+          </ac:picMkLst>
+        </pc:picChg>
+        <pc:picChg chg="add mod">
+          <ac:chgData name="Peter Mordaunt" userId="bb5abcbb151840ed" providerId="LiveId" clId="{A7FEC831-BDE6-4C4C-9C14-DA98583E0717}" dt="2021-12-15T23:24:45.634" v="2580" actId="26606"/>
+          <ac:picMkLst>
+            <pc:docMk/>
+            <pc:sldMk cId="2057088241" sldId="266"/>
+            <ac:picMk id="12" creationId="{3C25C66B-FA98-9147-A5D8-D33B9CAB54AD}"/>
+          </ac:picMkLst>
+        </pc:picChg>
+        <pc:picChg chg="add del">
+          <ac:chgData name="Peter Mordaunt" userId="bb5abcbb151840ed" providerId="LiveId" clId="{A7FEC831-BDE6-4C4C-9C14-DA98583E0717}" dt="2021-12-15T23:24:45.634" v="2580" actId="26606"/>
+          <ac:picMkLst>
+            <pc:docMk/>
+            <pc:sldMk cId="2057088241" sldId="266"/>
+            <ac:picMk id="17" creationId="{01A3CA1B-1530-4046-A299-90F41FE7FBFA}"/>
+          </ac:picMkLst>
+        </pc:picChg>
+        <pc:picChg chg="add del">
+          <ac:chgData name="Peter Mordaunt" userId="bb5abcbb151840ed" providerId="LiveId" clId="{A7FEC831-BDE6-4C4C-9C14-DA98583E0717}" dt="2021-12-15T23:24:45.634" v="2580" actId="26606"/>
+          <ac:picMkLst>
+            <pc:docMk/>
+            <pc:sldMk cId="2057088241" sldId="266"/>
+            <ac:picMk id="19" creationId="{785DE991-651A-4067-9345-354591453204}"/>
+          </ac:picMkLst>
+        </pc:picChg>
+        <pc:picChg chg="add del">
+          <ac:chgData name="Peter Mordaunt" userId="bb5abcbb151840ed" providerId="LiveId" clId="{A7FEC831-BDE6-4C4C-9C14-DA98583E0717}" dt="2021-12-15T23:24:45.634" v="2580" actId="26606"/>
+          <ac:picMkLst>
+            <pc:docMk/>
+            <pc:sldMk cId="2057088241" sldId="266"/>
+            <ac:picMk id="21" creationId="{B1A7D09E-FC38-41AC-AD2B-A9DCCFCBE681}"/>
+          </ac:picMkLst>
+        </pc:picChg>
+        <pc:picChg chg="add del">
+          <ac:chgData name="Peter Mordaunt" userId="bb5abcbb151840ed" providerId="LiveId" clId="{A7FEC831-BDE6-4C4C-9C14-DA98583E0717}" dt="2021-12-15T23:24:45.634" v="2580" actId="26606"/>
+          <ac:picMkLst>
+            <pc:docMk/>
+            <pc:sldMk cId="2057088241" sldId="266"/>
+            <ac:picMk id="29" creationId="{6B3E0EB5-236F-4CF9-A4DE-18C67F5832F4}"/>
+          </ac:picMkLst>
+        </pc:picChg>
+        <pc:picChg chg="add del">
+          <ac:chgData name="Peter Mordaunt" userId="bb5abcbb151840ed" providerId="LiveId" clId="{A7FEC831-BDE6-4C4C-9C14-DA98583E0717}" dt="2021-12-15T23:24:45.634" v="2580" actId="26606"/>
+          <ac:picMkLst>
+            <pc:docMk/>
+            <pc:sldMk cId="2057088241" sldId="266"/>
+            <ac:picMk id="33" creationId="{FA07D031-EDFA-4306-A17D-646DC5B6CABB}"/>
+          </ac:picMkLst>
+        </pc:picChg>
+      </pc:sldChg>
+      <pc:sldChg chg="new del">
+        <pc:chgData name="Peter Mordaunt" userId="bb5abcbb151840ed" providerId="LiveId" clId="{A7FEC831-BDE6-4C4C-9C14-DA98583E0717}" dt="2021-12-15T23:00:54.630" v="2429" actId="2696"/>
+        <pc:sldMkLst>
+          <pc:docMk/>
+          <pc:sldMk cId="620254483" sldId="267"/>
+        </pc:sldMkLst>
+      </pc:sldChg>
+      <pc:sldChg chg="addSp modSp new mod ord">
+        <pc:chgData name="Peter Mordaunt" userId="bb5abcbb151840ed" providerId="LiveId" clId="{A7FEC831-BDE6-4C4C-9C14-DA98583E0717}" dt="2021-12-15T23:06:11.493" v="2477" actId="20578"/>
+        <pc:sldMkLst>
+          <pc:docMk/>
+          <pc:sldMk cId="1427734406" sldId="267"/>
+        </pc:sldMkLst>
+        <pc:spChg chg="add mod">
+          <ac:chgData name="Peter Mordaunt" userId="bb5abcbb151840ed" providerId="LiveId" clId="{A7FEC831-BDE6-4C4C-9C14-DA98583E0717}" dt="2021-12-15T23:02:14.010" v="2475" actId="1076"/>
+          <ac:spMkLst>
+            <pc:docMk/>
+            <pc:sldMk cId="1427734406" sldId="267"/>
+            <ac:spMk id="2" creationId="{66AEC7B2-F294-1E48-9DF4-89195A8CA92D}"/>
+          </ac:spMkLst>
+        </pc:spChg>
+      </pc:sldChg>
+      <pc:sldChg chg="addSp modSp new mod">
+        <pc:chgData name="Peter Mordaunt" userId="bb5abcbb151840ed" providerId="LiveId" clId="{A7FEC831-BDE6-4C4C-9C14-DA98583E0717}" dt="2021-12-15T23:08:08.277" v="2517" actId="14100"/>
+        <pc:sldMkLst>
+          <pc:docMk/>
+          <pc:sldMk cId="4259051189" sldId="268"/>
+        </pc:sldMkLst>
+        <pc:spChg chg="add mod">
+          <ac:chgData name="Peter Mordaunt" userId="bb5abcbb151840ed" providerId="LiveId" clId="{A7FEC831-BDE6-4C4C-9C14-DA98583E0717}" dt="2021-12-15T23:08:08.277" v="2517" actId="14100"/>
+          <ac:spMkLst>
+            <pc:docMk/>
+            <pc:sldMk cId="4259051189" sldId="268"/>
+            <ac:spMk id="2" creationId="{8775CF6E-283F-2D4B-B82F-D05317852521}"/>
           </ac:spMkLst>
         </pc:spChg>
       </pc:sldChg>
@@ -8825,7 +9007,129 @@
           <a:bodyPr/>
           <a:lstStyle/>
           <a:p>
-            <a:endParaRPr lang="en-US"/>
+            <a:r>
+              <a:rPr lang="en-US"/>
+              <a:t>Favorite bit of code?</a:t>
+            </a:r>
+            <a:endParaRPr lang="en-US" dirty="0"/>
+          </a:p>
+        </p:txBody>
+      </p:sp>
+      <p:pic>
+        <p:nvPicPr>
+          <p:cNvPr id="8" name="Picture 7" descr="Text&#10;&#10;Description automatically generated">
+            <a:extLst>
+              <a:ext uri="{FF2B5EF4-FFF2-40B4-BE49-F238E27FC236}">
+                <a16:creationId xmlns:a16="http://schemas.microsoft.com/office/drawing/2014/main" id="{B2562ACC-D4AC-8841-9DC9-407B6913DE7D}"/>
+              </a:ext>
+            </a:extLst>
+          </p:cNvPr>
+          <p:cNvPicPr>
+            <a:picLocks noChangeAspect="1"/>
+          </p:cNvPicPr>
+          <p:nvPr/>
+        </p:nvPicPr>
+        <p:blipFill>
+          <a:blip r:embed="rId2"/>
+          <a:stretch>
+            <a:fillRect/>
+          </a:stretch>
+        </p:blipFill>
+        <p:spPr>
+          <a:xfrm>
+            <a:off x="927951" y="2397125"/>
+            <a:ext cx="6896100" cy="1244600"/>
+          </a:xfrm>
+          <a:prstGeom prst="rect">
+            <a:avLst/>
+          </a:prstGeom>
+        </p:spPr>
+      </p:pic>
+      <p:pic>
+        <p:nvPicPr>
+          <p:cNvPr id="12" name="Picture 11" descr="Text&#10;&#10;Description automatically generated">
+            <a:extLst>
+              <a:ext uri="{FF2B5EF4-FFF2-40B4-BE49-F238E27FC236}">
+                <a16:creationId xmlns:a16="http://schemas.microsoft.com/office/drawing/2014/main" id="{3C25C66B-FA98-9147-A5D8-D33B9CAB54AD}"/>
+              </a:ext>
+            </a:extLst>
+          </p:cNvPr>
+          <p:cNvPicPr>
+            <a:picLocks noChangeAspect="1"/>
+          </p:cNvPicPr>
+          <p:nvPr/>
+        </p:nvPicPr>
+        <p:blipFill>
+          <a:blip r:embed="rId3"/>
+          <a:stretch>
+            <a:fillRect/>
+          </a:stretch>
+        </p:blipFill>
+        <p:spPr>
+          <a:xfrm>
+            <a:off x="927951" y="3957035"/>
+            <a:ext cx="9118600" cy="2133600"/>
+          </a:xfrm>
+          <a:prstGeom prst="rect">
+            <a:avLst/>
+          </a:prstGeom>
+        </p:spPr>
+      </p:pic>
+    </p:spTree>
+    <p:extLst>
+      <p:ext uri="{BB962C8B-B14F-4D97-AF65-F5344CB8AC3E}">
+        <p14:creationId xmlns:p14="http://schemas.microsoft.com/office/powerpoint/2010/main" val="2057088241"/>
+      </p:ext>
+    </p:extLst>
+  </p:cSld>
+  <p:clrMapOvr>
+    <a:masterClrMapping/>
+  </p:clrMapOvr>
+</p:sld>
+</file>
+
+<file path=ppt/slides/slide11.xml><?xml version="1.0" encoding="utf-8"?>
+<p:sld xmlns:a="http://schemas.openxmlformats.org/drawingml/2006/main" xmlns:r="http://schemas.openxmlformats.org/officeDocument/2006/relationships" xmlns:p="http://schemas.openxmlformats.org/presentationml/2006/main">
+  <p:cSld>
+    <p:spTree>
+      <p:nvGrpSpPr>
+        <p:cNvPr id="1" name=""/>
+        <p:cNvGrpSpPr/>
+        <p:nvPr/>
+      </p:nvGrpSpPr>
+      <p:grpSpPr>
+        <a:xfrm>
+          <a:off x="0" y="0"/>
+          <a:ext cx="0" cy="0"/>
+          <a:chOff x="0" y="0"/>
+          <a:chExt cx="0" cy="0"/>
+        </a:xfrm>
+      </p:grpSpPr>
+      <p:sp>
+        <p:nvSpPr>
+          <p:cNvPr id="2" name="Title 1">
+            <a:extLst>
+              <a:ext uri="{FF2B5EF4-FFF2-40B4-BE49-F238E27FC236}">
+                <a16:creationId xmlns:a16="http://schemas.microsoft.com/office/drawing/2014/main" id="{65AC3A65-F441-5843-943F-878F3D1EB584}"/>
+              </a:ext>
+            </a:extLst>
+          </p:cNvPr>
+          <p:cNvSpPr>
+            <a:spLocks noGrp="1"/>
+          </p:cNvSpPr>
+          <p:nvPr>
+            <p:ph type="title"/>
+          </p:nvPr>
+        </p:nvSpPr>
+        <p:spPr/>
+        <p:txBody>
+          <a:bodyPr/>
+          <a:lstStyle/>
+          <a:p>
+            <a:r>
+              <a:rPr lang="en-US" dirty="0"/>
+              <a:t>Learning Objectives</a:t>
+            </a:r>
           </a:p>
         </p:txBody>
       </p:sp>
@@ -8834,7 +9138,7 @@
           <p:cNvPr id="3" name="TextBox 2">
             <a:extLst>
               <a:ext uri="{FF2B5EF4-FFF2-40B4-BE49-F238E27FC236}">
-                <a16:creationId xmlns:a16="http://schemas.microsoft.com/office/drawing/2014/main" id="{FBB2F0A7-9ECB-954C-8C70-0E900B3D9F77}"/>
+                <a16:creationId xmlns:a16="http://schemas.microsoft.com/office/drawing/2014/main" id="{D7BA01C0-B575-C240-BFEE-EBB2C9DED4A3}"/>
               </a:ext>
             </a:extLst>
           </p:cNvPr>
@@ -8843,8 +9147,8 @@
         </p:nvSpPr>
         <p:spPr>
           <a:xfrm>
-            <a:off x="573975" y="2987040"/>
-            <a:ext cx="11505714" cy="2585323"/>
+            <a:off x="1104230" y="2671001"/>
+            <a:ext cx="9189952" cy="3046988"/>
           </a:xfrm>
           <a:prstGeom prst="rect">
             <a:avLst/>
@@ -8857,176 +9161,45 @@
           </a:bodyPr>
           <a:lstStyle/>
           <a:p>
-            <a:pPr lvl="1"/>
-            <a:r>
-              <a:rPr lang="en-GB" dirty="0"/>
-              <a:t>"SELECT </a:t>
-            </a:r>
-            <a:r>
-              <a:rPr lang="en-GB" dirty="0" err="1"/>
-              <a:t>appointments.appt_date</a:t>
-            </a:r>
-            <a:r>
-              <a:rPr lang="en-GB" dirty="0"/>
-              <a:t>, </a:t>
-            </a:r>
-            <a:r>
-              <a:rPr lang="en-GB" dirty="0" err="1"/>
-              <a:t>appointments.note_text</a:t>
-            </a:r>
-            <a:r>
-              <a:rPr lang="en-GB" dirty="0"/>
-              <a:t>, </a:t>
-            </a:r>
-            <a:r>
-              <a:rPr lang="en-GB" dirty="0" err="1"/>
-              <a:t>animals.name</a:t>
-            </a:r>
-            <a:r>
-              <a:rPr lang="en-GB" dirty="0"/>
-              <a:t>, </a:t>
-            </a:r>
-            <a:r>
-              <a:rPr lang="en-GB" dirty="0" err="1"/>
-              <a:t>vets.name</a:t>
-            </a:r>
-            <a:r>
-              <a:rPr lang="en-GB" dirty="0"/>
-              <a:t>, </a:t>
-            </a:r>
-            <a:r>
-              <a:rPr lang="en-GB" dirty="0" err="1"/>
-              <a:t>appointments.id</a:t>
-            </a:r>
-            <a:r>
-              <a:rPr lang="en-GB" dirty="0"/>
-              <a:t> </a:t>
-            </a:r>
-          </a:p>
-          <a:p>
-            <a:pPr lvl="1"/>
-            <a:r>
-              <a:rPr lang="en-GB" dirty="0"/>
-              <a:t>FROM appointments </a:t>
-            </a:r>
-          </a:p>
-          <a:p>
-            <a:pPr lvl="1"/>
-            <a:r>
-              <a:rPr lang="en-GB" dirty="0"/>
-              <a:t>INNER JOIN animals ON </a:t>
-            </a:r>
-            <a:r>
-              <a:rPr lang="en-GB" dirty="0" err="1"/>
-              <a:t>animals.id</a:t>
-            </a:r>
-            <a:r>
-              <a:rPr lang="en-GB" dirty="0"/>
-              <a:t> = </a:t>
-            </a:r>
-            <a:r>
-              <a:rPr lang="en-GB" dirty="0" err="1"/>
-              <a:t>appointments.animal_id</a:t>
-            </a:r>
-            <a:r>
-              <a:rPr lang="en-GB" dirty="0"/>
-              <a:t> </a:t>
-            </a:r>
-          </a:p>
-          <a:p>
-            <a:pPr lvl="1"/>
-            <a:r>
-              <a:rPr lang="en-GB" dirty="0"/>
-              <a:t>INNER JOIN vets ON </a:t>
-            </a:r>
-            <a:r>
-              <a:rPr lang="en-GB" dirty="0" err="1"/>
-              <a:t>vets.id</a:t>
-            </a:r>
-            <a:r>
-              <a:rPr lang="en-GB" dirty="0"/>
-              <a:t> = </a:t>
-            </a:r>
-            <a:r>
-              <a:rPr lang="en-GB" dirty="0" err="1"/>
-              <a:t>appointments.vet_id</a:t>
-            </a:r>
-            <a:r>
-              <a:rPr lang="en-GB" dirty="0"/>
-              <a:t> WHERE </a:t>
-            </a:r>
-            <a:r>
-              <a:rPr lang="en-GB" dirty="0" err="1"/>
-              <a:t>vets.id</a:t>
-            </a:r>
-            <a:r>
-              <a:rPr lang="en-GB" dirty="0"/>
-              <a:t> = %s”</a:t>
-            </a:r>
-          </a:p>
-          <a:p>
-            <a:endParaRPr lang="en-GB" dirty="0"/>
-          </a:p>
-          <a:p>
-            <a:pPr algn="ctr"/>
-            <a:r>
-              <a:rPr lang="en-GB" dirty="0"/>
-              <a:t>OR</a:t>
-            </a:r>
-          </a:p>
-          <a:p>
-            <a:endParaRPr lang="en-GB" dirty="0"/>
-          </a:p>
-          <a:p>
-            <a:r>
-              <a:rPr lang="en-GB" dirty="0"/>
-              <a:t>SELECT * FROM appointments WHERE </a:t>
-            </a:r>
-            <a:r>
-              <a:rPr lang="en-GB" dirty="0" err="1"/>
-              <a:t>vet_id</a:t>
-            </a:r>
-            <a:r>
-              <a:rPr lang="en-GB" dirty="0"/>
-              <a:t> = 9	+ a bit of python</a:t>
-            </a:r>
-          </a:p>
-          <a:p>
-            <a:endParaRPr lang="en-US" dirty="0"/>
-          </a:p>
-        </p:txBody>
-      </p:sp>
-      <p:sp>
-        <p:nvSpPr>
-          <p:cNvPr id="4" name="TextBox 3">
-            <a:extLst>
-              <a:ext uri="{FF2B5EF4-FFF2-40B4-BE49-F238E27FC236}">
-                <a16:creationId xmlns:a16="http://schemas.microsoft.com/office/drawing/2014/main" id="{B42B7A2D-2948-B043-BEC9-F54AD870892A}"/>
-              </a:ext>
-            </a:extLst>
-          </p:cNvPr>
-          <p:cNvSpPr txBox="1"/>
-          <p:nvPr/>
-        </p:nvSpPr>
-        <p:spPr>
-          <a:xfrm>
-            <a:off x="680321" y="2340864"/>
-            <a:ext cx="3817071" cy="369332"/>
-          </a:xfrm>
-          <a:prstGeom prst="rect">
-            <a:avLst/>
-          </a:prstGeom>
-          <a:noFill/>
-        </p:spPr>
-        <p:txBody>
-          <a:bodyPr wrap="none" rtlCol="0">
-            <a:spAutoFit/>
-          </a:bodyPr>
-          <a:lstStyle/>
-          <a:p>
-            <a:r>
-              <a:rPr lang="en-US" dirty="0"/>
-              <a:t>Many to Many Inner Join statement</a:t>
+            <a:r>
+              <a:rPr lang="en-US" sz="4800" dirty="0"/>
+              <a:t>Get more comfortable:</a:t>
+            </a:r>
+          </a:p>
+          <a:p>
+            <a:r>
+              <a:rPr lang="en-US" sz="4800" dirty="0">
+                <a:solidFill>
+                  <a:schemeClr val="tx1">
+                    <a:lumMod val="65000"/>
+                  </a:schemeClr>
+                </a:solidFill>
+              </a:rPr>
+              <a:t>Using SQL</a:t>
+            </a:r>
+          </a:p>
+          <a:p>
+            <a:r>
+              <a:rPr lang="en-US" sz="4800" dirty="0">
+                <a:solidFill>
+                  <a:schemeClr val="tx1">
+                    <a:lumMod val="65000"/>
+                  </a:schemeClr>
+                </a:solidFill>
+              </a:rPr>
+              <a:t>Working with Routes</a:t>
+            </a:r>
+          </a:p>
+          <a:p>
+            <a:r>
+              <a:rPr lang="en-US" sz="4800" dirty="0">
+                <a:solidFill>
+                  <a:schemeClr val="tx1">
+                    <a:lumMod val="65000"/>
+                  </a:schemeClr>
+                </a:solidFill>
+              </a:rPr>
+              <a:t>Experimenting with CSS &amp; HTML </a:t>
             </a:r>
           </a:p>
         </p:txBody>
@@ -9034,7 +9207,7 @@
     </p:spTree>
     <p:extLst>
       <p:ext uri="{BB962C8B-B14F-4D97-AF65-F5344CB8AC3E}">
-        <p14:creationId xmlns:p14="http://schemas.microsoft.com/office/powerpoint/2010/main" val="2057088241"/>
+        <p14:creationId xmlns:p14="http://schemas.microsoft.com/office/powerpoint/2010/main" val="4199572944"/>
       </p:ext>
     </p:extLst>
   </p:cSld>
@@ -10343,196 +10516,217 @@
           <a:chExt cx="0" cy="0"/>
         </a:xfrm>
       </p:grpSpPr>
-      <p:sp>
-        <p:nvSpPr>
-          <p:cNvPr id="12" name="Rounded Rectangle 11">
+      <p:grpSp>
+        <p:nvGrpSpPr>
+          <p:cNvPr id="2" name="Group 1">
             <a:extLst>
               <a:ext uri="{FF2B5EF4-FFF2-40B4-BE49-F238E27FC236}">
-                <a16:creationId xmlns:a16="http://schemas.microsoft.com/office/drawing/2014/main" id="{AA07F3FA-CAA7-FF47-B8A0-04447ADFA204}"/>
+                <a16:creationId xmlns:a16="http://schemas.microsoft.com/office/drawing/2014/main" id="{AB4F13F5-8DD4-DC41-A603-226B33771499}"/>
               </a:ext>
             </a:extLst>
           </p:cNvPr>
-          <p:cNvSpPr/>
+          <p:cNvGrpSpPr/>
           <p:nvPr/>
-        </p:nvSpPr>
-        <p:spPr>
-          <a:xfrm>
-            <a:off x="1262226" y="1311593"/>
-            <a:ext cx="309399" cy="646331"/>
-          </a:xfrm>
-          <a:prstGeom prst="roundRect">
-            <a:avLst/>
-          </a:prstGeom>
-          <a:gradFill>
-            <a:gsLst>
-              <a:gs pos="34000">
-                <a:schemeClr val="accent1"/>
-              </a:gs>
-              <a:gs pos="96000">
-                <a:schemeClr val="accent1"/>
-              </a:gs>
-            </a:gsLst>
-            <a:lin ang="2520000" scaled="0"/>
-          </a:gradFill>
-        </p:spPr>
-        <p:style>
-          <a:lnRef idx="2">
-            <a:schemeClr val="accent1">
-              <a:shade val="50000"/>
-            </a:schemeClr>
-          </a:lnRef>
-          <a:fillRef idx="1">
-            <a:schemeClr val="accent1"/>
-          </a:fillRef>
-          <a:effectRef idx="0">
-            <a:schemeClr val="accent1"/>
-          </a:effectRef>
-          <a:fontRef idx="minor">
-            <a:schemeClr val="lt1"/>
-          </a:fontRef>
-        </p:style>
-        <p:txBody>
-          <a:bodyPr rtlCol="0" anchor="ctr"/>
-          <a:lstStyle/>
-          <a:p>
-            <a:pPr algn="ctr"/>
-            <a:endParaRPr lang="en-US"/>
-          </a:p>
-        </p:txBody>
-      </p:sp>
-      <p:sp>
-        <p:nvSpPr>
-          <p:cNvPr id="7" name="TextBox 6">
-            <a:extLst>
-              <a:ext uri="{FF2B5EF4-FFF2-40B4-BE49-F238E27FC236}">
-                <a16:creationId xmlns:a16="http://schemas.microsoft.com/office/drawing/2014/main" id="{2A696870-896C-2D40-A31B-D07E640CEB0C}"/>
-              </a:ext>
-            </a:extLst>
-          </p:cNvPr>
-          <p:cNvSpPr txBox="1"/>
-          <p:nvPr/>
-        </p:nvSpPr>
-        <p:spPr>
-          <a:xfrm>
-            <a:off x="10815638" y="842963"/>
-            <a:ext cx="1128712" cy="646331"/>
-          </a:xfrm>
-          <a:prstGeom prst="rect">
-            <a:avLst/>
-          </a:prstGeom>
-          <a:noFill/>
-        </p:spPr>
-        <p:txBody>
-          <a:bodyPr wrap="square" rtlCol="0">
-            <a:spAutoFit/>
-          </a:bodyPr>
-          <a:lstStyle/>
-          <a:p>
-            <a:r>
-              <a:rPr lang="en-US" dirty="0"/>
-              <a:t>Site</a:t>
-            </a:r>
-          </a:p>
-          <a:p>
-            <a:r>
-              <a:rPr lang="en-US" dirty="0"/>
-              <a:t>Map</a:t>
-            </a:r>
-          </a:p>
-        </p:txBody>
-      </p:sp>
-      <p:sp>
-        <p:nvSpPr>
-          <p:cNvPr id="6" name="Rounded Rectangle 5">
-            <a:extLst>
-              <a:ext uri="{FF2B5EF4-FFF2-40B4-BE49-F238E27FC236}">
-                <a16:creationId xmlns:a16="http://schemas.microsoft.com/office/drawing/2014/main" id="{49916AD9-BEE6-8347-BDDD-359E9D503429}"/>
-              </a:ext>
-            </a:extLst>
-          </p:cNvPr>
-          <p:cNvSpPr/>
-          <p:nvPr/>
-        </p:nvSpPr>
-        <p:spPr>
-          <a:xfrm>
-            <a:off x="1262226" y="2583180"/>
-            <a:ext cx="309399" cy="3824764"/>
-          </a:xfrm>
-          <a:prstGeom prst="roundRect">
-            <a:avLst/>
-          </a:prstGeom>
-          <a:gradFill>
-            <a:gsLst>
-              <a:gs pos="0">
-                <a:schemeClr val="accent3"/>
-              </a:gs>
-              <a:gs pos="34000">
-                <a:schemeClr val="accent1"/>
-              </a:gs>
-              <a:gs pos="96000">
-                <a:schemeClr val="accent6">
-                  <a:lumMod val="75000"/>
-                </a:schemeClr>
-              </a:gs>
-            </a:gsLst>
-            <a:lin ang="2520000" scaled="0"/>
-          </a:gradFill>
-        </p:spPr>
-        <p:style>
-          <a:lnRef idx="2">
-            <a:schemeClr val="accent1">
-              <a:shade val="50000"/>
-            </a:schemeClr>
-          </a:lnRef>
-          <a:fillRef idx="1">
-            <a:schemeClr val="accent1"/>
-          </a:fillRef>
-          <a:effectRef idx="0">
-            <a:schemeClr val="accent1"/>
-          </a:effectRef>
-          <a:fontRef idx="minor">
-            <a:schemeClr val="lt1"/>
-          </a:fontRef>
-        </p:style>
-        <p:txBody>
-          <a:bodyPr rtlCol="0" anchor="ctr"/>
-          <a:lstStyle/>
-          <a:p>
-            <a:pPr algn="ctr"/>
-            <a:endParaRPr lang="en-US"/>
-          </a:p>
-        </p:txBody>
-      </p:sp>
-      <p:pic>
-        <p:nvPicPr>
-          <p:cNvPr id="8" name="Picture 7" descr="Diagram&#10;&#10;Description automatically generated">
-            <a:extLst>
-              <a:ext uri="{FF2B5EF4-FFF2-40B4-BE49-F238E27FC236}">
-                <a16:creationId xmlns:a16="http://schemas.microsoft.com/office/drawing/2014/main" id="{0AE36178-44E3-D647-91B7-FBEC33C81E10}"/>
-              </a:ext>
-            </a:extLst>
-          </p:cNvPr>
-          <p:cNvPicPr>
-            <a:picLocks noChangeAspect="1"/>
-          </p:cNvPicPr>
-          <p:nvPr/>
-        </p:nvPicPr>
-        <p:blipFill>
-          <a:blip r:embed="rId2"/>
-          <a:stretch>
-            <a:fillRect/>
-          </a:stretch>
-        </p:blipFill>
-        <p:spPr>
+        </p:nvGrpSpPr>
+        <p:grpSpPr>
           <a:xfrm>
             <a:off x="1262226" y="175766"/>
-            <a:ext cx="10256412" cy="6506468"/>
-          </a:xfrm>
-          <a:prstGeom prst="rect">
-            <a:avLst/>
-          </a:prstGeom>
-        </p:spPr>
-      </p:pic>
+            <a:ext cx="10682124" cy="6506468"/>
+            <a:chOff x="1262226" y="175766"/>
+            <a:chExt cx="10682124" cy="6506468"/>
+          </a:xfrm>
+        </p:grpSpPr>
+        <p:sp>
+          <p:nvSpPr>
+            <p:cNvPr id="12" name="Rounded Rectangle 11">
+              <a:extLst>
+                <a:ext uri="{FF2B5EF4-FFF2-40B4-BE49-F238E27FC236}">
+                  <a16:creationId xmlns:a16="http://schemas.microsoft.com/office/drawing/2014/main" id="{AA07F3FA-CAA7-FF47-B8A0-04447ADFA204}"/>
+                </a:ext>
+              </a:extLst>
+            </p:cNvPr>
+            <p:cNvSpPr/>
+            <p:nvPr/>
+          </p:nvSpPr>
+          <p:spPr>
+            <a:xfrm>
+              <a:off x="1262226" y="1311593"/>
+              <a:ext cx="309399" cy="646331"/>
+            </a:xfrm>
+            <a:prstGeom prst="roundRect">
+              <a:avLst/>
+            </a:prstGeom>
+            <a:gradFill>
+              <a:gsLst>
+                <a:gs pos="34000">
+                  <a:schemeClr val="accent1"/>
+                </a:gs>
+                <a:gs pos="96000">
+                  <a:schemeClr val="accent1"/>
+                </a:gs>
+              </a:gsLst>
+              <a:lin ang="2520000" scaled="0"/>
+            </a:gradFill>
+          </p:spPr>
+          <p:style>
+            <a:lnRef idx="2">
+              <a:schemeClr val="accent1">
+                <a:shade val="50000"/>
+              </a:schemeClr>
+            </a:lnRef>
+            <a:fillRef idx="1">
+              <a:schemeClr val="accent1"/>
+            </a:fillRef>
+            <a:effectRef idx="0">
+              <a:schemeClr val="accent1"/>
+            </a:effectRef>
+            <a:fontRef idx="minor">
+              <a:schemeClr val="lt1"/>
+            </a:fontRef>
+          </p:style>
+          <p:txBody>
+            <a:bodyPr rtlCol="0" anchor="ctr"/>
+            <a:lstStyle/>
+            <a:p>
+              <a:pPr algn="ctr"/>
+              <a:endParaRPr lang="en-US"/>
+            </a:p>
+          </p:txBody>
+        </p:sp>
+        <p:sp>
+          <p:nvSpPr>
+            <p:cNvPr id="7" name="TextBox 6">
+              <a:extLst>
+                <a:ext uri="{FF2B5EF4-FFF2-40B4-BE49-F238E27FC236}">
+                  <a16:creationId xmlns:a16="http://schemas.microsoft.com/office/drawing/2014/main" id="{2A696870-896C-2D40-A31B-D07E640CEB0C}"/>
+                </a:ext>
+              </a:extLst>
+            </p:cNvPr>
+            <p:cNvSpPr txBox="1"/>
+            <p:nvPr/>
+          </p:nvSpPr>
+          <p:spPr>
+            <a:xfrm>
+              <a:off x="10815638" y="842963"/>
+              <a:ext cx="1128712" cy="646331"/>
+            </a:xfrm>
+            <a:prstGeom prst="rect">
+              <a:avLst/>
+            </a:prstGeom>
+            <a:noFill/>
+          </p:spPr>
+          <p:txBody>
+            <a:bodyPr wrap="square" rtlCol="0">
+              <a:spAutoFit/>
+            </a:bodyPr>
+            <a:lstStyle/>
+            <a:p>
+              <a:r>
+                <a:rPr lang="en-US" dirty="0"/>
+                <a:t>Site</a:t>
+              </a:r>
+            </a:p>
+            <a:p>
+              <a:r>
+                <a:rPr lang="en-US" dirty="0"/>
+                <a:t>Map</a:t>
+              </a:r>
+            </a:p>
+          </p:txBody>
+        </p:sp>
+        <p:sp>
+          <p:nvSpPr>
+            <p:cNvPr id="6" name="Rounded Rectangle 5">
+              <a:extLst>
+                <a:ext uri="{FF2B5EF4-FFF2-40B4-BE49-F238E27FC236}">
+                  <a16:creationId xmlns:a16="http://schemas.microsoft.com/office/drawing/2014/main" id="{49916AD9-BEE6-8347-BDDD-359E9D503429}"/>
+                </a:ext>
+              </a:extLst>
+            </p:cNvPr>
+            <p:cNvSpPr/>
+            <p:nvPr/>
+          </p:nvSpPr>
+          <p:spPr>
+            <a:xfrm>
+              <a:off x="1262226" y="2583180"/>
+              <a:ext cx="309399" cy="3824764"/>
+            </a:xfrm>
+            <a:prstGeom prst="roundRect">
+              <a:avLst/>
+            </a:prstGeom>
+            <a:gradFill>
+              <a:gsLst>
+                <a:gs pos="0">
+                  <a:schemeClr val="accent3"/>
+                </a:gs>
+                <a:gs pos="34000">
+                  <a:schemeClr val="accent1"/>
+                </a:gs>
+                <a:gs pos="96000">
+                  <a:schemeClr val="accent6">
+                    <a:lumMod val="75000"/>
+                  </a:schemeClr>
+                </a:gs>
+              </a:gsLst>
+              <a:lin ang="2520000" scaled="0"/>
+            </a:gradFill>
+          </p:spPr>
+          <p:style>
+            <a:lnRef idx="2">
+              <a:schemeClr val="accent1">
+                <a:shade val="50000"/>
+              </a:schemeClr>
+            </a:lnRef>
+            <a:fillRef idx="1">
+              <a:schemeClr val="accent1"/>
+            </a:fillRef>
+            <a:effectRef idx="0">
+              <a:schemeClr val="accent1"/>
+            </a:effectRef>
+            <a:fontRef idx="minor">
+              <a:schemeClr val="lt1"/>
+            </a:fontRef>
+          </p:style>
+          <p:txBody>
+            <a:bodyPr rtlCol="0" anchor="ctr"/>
+            <a:lstStyle/>
+            <a:p>
+              <a:pPr algn="ctr"/>
+              <a:endParaRPr lang="en-US"/>
+            </a:p>
+          </p:txBody>
+        </p:sp>
+        <p:pic>
+          <p:nvPicPr>
+            <p:cNvPr id="8" name="Picture 7" descr="Diagram&#10;&#10;Description automatically generated">
+              <a:extLst>
+                <a:ext uri="{FF2B5EF4-FFF2-40B4-BE49-F238E27FC236}">
+                  <a16:creationId xmlns:a16="http://schemas.microsoft.com/office/drawing/2014/main" id="{0AE36178-44E3-D647-91B7-FBEC33C81E10}"/>
+                </a:ext>
+              </a:extLst>
+            </p:cNvPr>
+            <p:cNvPicPr>
+              <a:picLocks noChangeAspect="1"/>
+            </p:cNvPicPr>
+            <p:nvPr/>
+          </p:nvPicPr>
+          <p:blipFill>
+            <a:blip r:embed="rId2"/>
+            <a:stretch>
+              <a:fillRect/>
+            </a:stretch>
+          </p:blipFill>
+          <p:spPr>
+            <a:xfrm>
+              <a:off x="1262226" y="175766"/>
+              <a:ext cx="10256412" cy="6506468"/>
+            </a:xfrm>
+            <a:prstGeom prst="rect">
+              <a:avLst/>
+            </a:prstGeom>
+          </p:spPr>
+        </p:pic>
+      </p:grpSp>
     </p:spTree>
     <p:extLst>
       <p:ext uri="{BB962C8B-B14F-4D97-AF65-F5344CB8AC3E}">
@@ -10612,7 +10806,7 @@
         </p:nvGrpSpPr>
         <p:grpSpPr>
           <a:xfrm>
-            <a:off x="657529" y="363969"/>
+            <a:off x="669721" y="205473"/>
             <a:ext cx="9533725" cy="6130061"/>
             <a:chOff x="513101" y="363969"/>
             <a:chExt cx="9533725" cy="6130061"/>
@@ -10771,38 +10965,10 @@
       </p:grpSpPr>
       <p:sp>
         <p:nvSpPr>
-          <p:cNvPr id="2" name="Title 1">
+          <p:cNvPr id="2" name="TextBox 1">
             <a:extLst>
               <a:ext uri="{FF2B5EF4-FFF2-40B4-BE49-F238E27FC236}">
-                <a16:creationId xmlns:a16="http://schemas.microsoft.com/office/drawing/2014/main" id="{5654D0C1-A048-A24F-810D-C6A91D612E50}"/>
-              </a:ext>
-            </a:extLst>
-          </p:cNvPr>
-          <p:cNvSpPr>
-            <a:spLocks noGrp="1"/>
-          </p:cNvSpPr>
-          <p:nvPr>
-            <p:ph type="title"/>
-          </p:nvPr>
-        </p:nvSpPr>
-        <p:spPr/>
-        <p:txBody>
-          <a:bodyPr/>
-          <a:lstStyle/>
-          <a:p>
-            <a:r>
-              <a:rPr lang="en-US" dirty="0"/>
-              <a:t>Extension Ideas</a:t>
-            </a:r>
-          </a:p>
-        </p:txBody>
-      </p:sp>
-      <p:sp>
-        <p:nvSpPr>
-          <p:cNvPr id="3" name="TextBox 2">
-            <a:extLst>
-              <a:ext uri="{FF2B5EF4-FFF2-40B4-BE49-F238E27FC236}">
-                <a16:creationId xmlns:a16="http://schemas.microsoft.com/office/drawing/2014/main" id="{08CDB14F-2060-964E-90EE-B634BC32D7A8}"/>
+                <a16:creationId xmlns:a16="http://schemas.microsoft.com/office/drawing/2014/main" id="{8775CF6E-283F-2D4B-B82F-D05317852521}"/>
               </a:ext>
             </a:extLst>
           </p:cNvPr>
@@ -10811,8 +10977,8 @@
         </p:nvSpPr>
         <p:spPr>
           <a:xfrm>
-            <a:off x="680321" y="1502688"/>
-            <a:ext cx="10104698" cy="5632311"/>
+            <a:off x="3255264" y="3059668"/>
+            <a:ext cx="4901184" cy="1107996"/>
           </a:xfrm>
           <a:prstGeom prst="rect">
             <a:avLst/>
@@ -10826,224 +10992,16 @@
           <a:lstStyle/>
           <a:p>
             <a:r>
-              <a:rPr lang="en-US" dirty="0"/>
-              <a:t>Must, should, could, won’t</a:t>
-            </a:r>
-          </a:p>
-          <a:p>
-            <a:pPr marL="342900" indent="-342900">
-              <a:buFont typeface="+mj-lt"/>
-              <a:buAutoNum type="arabicPeriod"/>
-            </a:pPr>
-            <a:r>
-              <a:rPr lang="en-US" dirty="0"/>
-              <a:t>Add warning message for deleting (should) -&gt;</a:t>
-            </a:r>
-            <a:r>
-              <a:rPr lang="en-US" dirty="0" err="1"/>
-              <a:t>Javascript</a:t>
-            </a:r>
-            <a:endParaRPr lang="en-US" dirty="0"/>
-          </a:p>
-          <a:p>
-            <a:pPr marL="342900" indent="-342900">
-              <a:buFont typeface="+mj-lt"/>
-              <a:buAutoNum type="arabicPeriod"/>
-            </a:pPr>
-            <a:r>
-              <a:rPr lang="en-US" strike="sngStrike" dirty="0"/>
-              <a:t>Set vet for making appts so not editable(should)</a:t>
-            </a:r>
-          </a:p>
-          <a:p>
-            <a:pPr marL="342900" indent="-342900">
-              <a:buFont typeface="+mj-lt"/>
-              <a:buAutoNum type="arabicPeriod"/>
-            </a:pPr>
-            <a:r>
-              <a:rPr lang="en-US" dirty="0"/>
-              <a:t>Add confirm message for updates (Should) -&gt; </a:t>
-            </a:r>
-            <a:r>
-              <a:rPr lang="en-US" dirty="0" err="1"/>
-              <a:t>Javascript</a:t>
-            </a:r>
-            <a:endParaRPr lang="en-US" dirty="0"/>
-          </a:p>
-          <a:p>
-            <a:pPr marL="342900" indent="-342900">
-              <a:buFont typeface="+mj-lt"/>
-              <a:buAutoNum type="arabicPeriod"/>
-            </a:pPr>
-            <a:r>
-              <a:rPr lang="en-US" dirty="0"/>
-              <a:t>Age or dob option? (should) could solve with dummy dob based on reg date &amp; dob known bool</a:t>
-            </a:r>
-          </a:p>
-          <a:p>
-            <a:pPr marL="342900" indent="-342900">
-              <a:buFont typeface="+mj-lt"/>
-              <a:buAutoNum type="arabicPeriod"/>
-            </a:pPr>
-            <a:r>
-              <a:rPr lang="en-US" strike="sngStrike" dirty="0"/>
-              <a:t>Add all appointments in aside on view selected page (should)</a:t>
-            </a:r>
-          </a:p>
-          <a:p>
-            <a:pPr marL="342900" indent="-342900">
-              <a:buFont typeface="+mj-lt"/>
-              <a:buAutoNum type="arabicPeriod"/>
-            </a:pPr>
-            <a:r>
-              <a:rPr lang="en-US" strike="sngStrike" dirty="0"/>
-              <a:t>Add animals/owners/vet in second aside (should)</a:t>
-            </a:r>
-          </a:p>
-          <a:p>
-            <a:pPr marL="342900" indent="-342900">
-              <a:buFont typeface="+mj-lt"/>
-              <a:buAutoNum type="arabicPeriod"/>
-            </a:pPr>
-            <a:r>
-              <a:rPr lang="en-US" strike="sngStrike" dirty="0"/>
-              <a:t>Make all fields required when adding new entries(should)</a:t>
-            </a:r>
-          </a:p>
-          <a:p>
-            <a:pPr marL="342900" indent="-342900">
-              <a:buFont typeface="+mj-lt"/>
-              <a:buAutoNum type="arabicPeriod"/>
-            </a:pPr>
-            <a:r>
-              <a:rPr lang="en-US" dirty="0"/>
-              <a:t>sort appointments by date, alpha, vet, owner (should)</a:t>
-            </a:r>
-          </a:p>
-          <a:p>
-            <a:pPr marL="342900" indent="-342900">
-              <a:buFont typeface="+mj-lt"/>
-              <a:buAutoNum type="arabicPeriod"/>
-            </a:pPr>
-            <a:r>
-              <a:rPr lang="en-US" dirty="0"/>
-              <a:t>Add submenu items – add/edit/all (should)</a:t>
-            </a:r>
-          </a:p>
-          <a:p>
-            <a:pPr marL="342900" indent="-342900">
-              <a:buFont typeface="+mj-lt"/>
-              <a:buAutoNum type="arabicPeriod"/>
-            </a:pPr>
-            <a:r>
-              <a:rPr lang="en-US" dirty="0"/>
-              <a:t>Add pages to list results </a:t>
-            </a:r>
-            <a:r>
-              <a:rPr lang="en-US"/>
-              <a:t>(could)</a:t>
-            </a:r>
-            <a:endParaRPr lang="en-US" dirty="0"/>
-          </a:p>
-          <a:p>
-            <a:pPr marL="342900" indent="-342900">
-              <a:buFont typeface="+mj-lt"/>
-              <a:buAutoNum type="arabicPeriod"/>
-            </a:pPr>
-            <a:r>
-              <a:rPr lang="en-US" dirty="0"/>
-              <a:t>Add short note with option to expand (could)</a:t>
-            </a:r>
-          </a:p>
-          <a:p>
-            <a:pPr marL="342900" indent="-342900">
-              <a:buFont typeface="+mj-lt"/>
-              <a:buAutoNum type="arabicPeriod"/>
-            </a:pPr>
-            <a:r>
-              <a:rPr lang="en-US" dirty="0"/>
-              <a:t>Filter by in clinic – handle check in/out (could)</a:t>
-            </a:r>
-          </a:p>
-          <a:p>
-            <a:pPr marL="342900" indent="-342900">
-              <a:buFont typeface="+mj-lt"/>
-              <a:buAutoNum type="arabicPeriod"/>
-            </a:pPr>
-            <a:r>
-              <a:rPr lang="en-US" dirty="0"/>
-              <a:t>Check if owner exists when add new owner (could)</a:t>
-            </a:r>
-          </a:p>
-          <a:p>
-            <a:pPr marL="342900" indent="-342900">
-              <a:buFont typeface="+mj-lt"/>
-              <a:buAutoNum type="arabicPeriod"/>
-            </a:pPr>
-            <a:r>
-              <a:rPr lang="en-US" dirty="0"/>
-              <a:t>Media queries – collapsible menus </a:t>
-            </a:r>
-            <a:r>
-              <a:rPr lang="en-US" dirty="0" err="1"/>
-              <a:t>etc</a:t>
-            </a:r>
-            <a:r>
-              <a:rPr lang="en-US" dirty="0"/>
-              <a:t> (could)</a:t>
-            </a:r>
-          </a:p>
-          <a:p>
-            <a:pPr marL="342900" indent="-342900">
-              <a:buFont typeface="+mj-lt"/>
-              <a:buAutoNum type="arabicPeriod"/>
-            </a:pPr>
-            <a:r>
-              <a:rPr lang="en-US" dirty="0"/>
-              <a:t>Login page – different views for user type, </a:t>
-            </a:r>
-            <a:r>
-              <a:rPr lang="en-US" dirty="0" err="1"/>
-              <a:t>ie</a:t>
-            </a:r>
-            <a:r>
-              <a:rPr lang="en-US" dirty="0"/>
-              <a:t> Vet or Reception (could)</a:t>
-            </a:r>
-          </a:p>
-          <a:p>
-            <a:pPr marL="342900" indent="-342900">
-              <a:buFont typeface="+mj-lt"/>
-              <a:buAutoNum type="arabicPeriod"/>
-            </a:pPr>
-            <a:r>
-              <a:rPr lang="en-US" dirty="0"/>
-              <a:t>Billing? (Could)</a:t>
-            </a:r>
-          </a:p>
-          <a:p>
-            <a:pPr marL="342900" indent="-342900">
-              <a:buFont typeface="+mj-lt"/>
-              <a:buAutoNum type="arabicPeriod"/>
-            </a:pPr>
-            <a:r>
-              <a:rPr lang="en-US" dirty="0"/>
-              <a:t>Online booking (won’t)</a:t>
-            </a:r>
-          </a:p>
-          <a:p>
-            <a:pPr marL="285750" indent="-285750">
-              <a:buFont typeface="Arial" panose="020B0604020202020204" pitchFamily="34" charset="0"/>
-              <a:buChar char="•"/>
-            </a:pPr>
-            <a:endParaRPr lang="en-US" dirty="0"/>
+              <a:rPr lang="en-US" sz="6600" dirty="0"/>
+              <a:t>Demo time</a:t>
+            </a:r>
           </a:p>
         </p:txBody>
       </p:sp>
     </p:spTree>
     <p:extLst>
       <p:ext uri="{BB962C8B-B14F-4D97-AF65-F5344CB8AC3E}">
-        <p14:creationId xmlns:p14="http://schemas.microsoft.com/office/powerpoint/2010/main" val="792151724"/>
+        <p14:creationId xmlns:p14="http://schemas.microsoft.com/office/powerpoint/2010/main" val="4259051189"/>
       </p:ext>
     </p:extLst>
   </p:cSld>
@@ -11072,38 +11030,10 @@
       </p:grpSpPr>
       <p:sp>
         <p:nvSpPr>
-          <p:cNvPr id="2" name="Title 1">
+          <p:cNvPr id="2" name="TextBox 1">
             <a:extLst>
               <a:ext uri="{FF2B5EF4-FFF2-40B4-BE49-F238E27FC236}">
-                <a16:creationId xmlns:a16="http://schemas.microsoft.com/office/drawing/2014/main" id="{65AC3A65-F441-5843-943F-878F3D1EB584}"/>
-              </a:ext>
-            </a:extLst>
-          </p:cNvPr>
-          <p:cNvSpPr>
-            <a:spLocks noGrp="1"/>
-          </p:cNvSpPr>
-          <p:nvPr>
-            <p:ph type="title"/>
-          </p:nvPr>
-        </p:nvSpPr>
-        <p:spPr/>
-        <p:txBody>
-          <a:bodyPr/>
-          <a:lstStyle/>
-          <a:p>
-            <a:r>
-              <a:rPr lang="en-US" dirty="0"/>
-              <a:t>Learning Objectives</a:t>
-            </a:r>
-          </a:p>
-        </p:txBody>
-      </p:sp>
-      <p:sp>
-        <p:nvSpPr>
-          <p:cNvPr id="3" name="TextBox 2">
-            <a:extLst>
-              <a:ext uri="{FF2B5EF4-FFF2-40B4-BE49-F238E27FC236}">
-                <a16:creationId xmlns:a16="http://schemas.microsoft.com/office/drawing/2014/main" id="{D7BA01C0-B575-C240-BFEE-EBB2C9DED4A3}"/>
+                <a16:creationId xmlns:a16="http://schemas.microsoft.com/office/drawing/2014/main" id="{66AEC7B2-F294-1E48-9DF4-89195A8CA92D}"/>
               </a:ext>
             </a:extLst>
           </p:cNvPr>
@@ -11112,8 +11042,8 @@
         </p:nvSpPr>
         <p:spPr>
           <a:xfrm>
-            <a:off x="2121408" y="3060192"/>
-            <a:ext cx="3250633" cy="923330"/>
+            <a:off x="802241" y="360057"/>
+            <a:ext cx="10104698" cy="6340197"/>
           </a:xfrm>
           <a:prstGeom prst="rect">
             <a:avLst/>
@@ -11121,34 +11051,232 @@
           <a:noFill/>
         </p:spPr>
         <p:txBody>
-          <a:bodyPr wrap="none" rtlCol="0">
+          <a:bodyPr wrap="square" rtlCol="0">
             <a:spAutoFit/>
           </a:bodyPr>
           <a:lstStyle/>
           <a:p>
             <a:r>
+              <a:rPr lang="en-US" sz="3200" dirty="0"/>
+              <a:t>Extension Ideas- Must, should, could, won’t</a:t>
+            </a:r>
+          </a:p>
+          <a:p>
+            <a:endParaRPr lang="en-US" sz="3200" dirty="0"/>
+          </a:p>
+          <a:p>
+            <a:pPr marL="342900" indent="-342900">
+              <a:buFont typeface="+mj-lt"/>
+              <a:buAutoNum type="arabicPeriod"/>
+            </a:pPr>
+            <a:r>
               <a:rPr lang="en-US" dirty="0"/>
-              <a:t>Using SQL</a:t>
-            </a:r>
-          </a:p>
-          <a:p>
+              <a:t>Add warning message for deleting (should) -&gt;</a:t>
+            </a:r>
+            <a:r>
+              <a:rPr lang="en-US" dirty="0" err="1"/>
+              <a:t>Javascript</a:t>
+            </a:r>
+            <a:endParaRPr lang="en-US" dirty="0"/>
+          </a:p>
+          <a:p>
+            <a:pPr marL="342900" indent="-342900">
+              <a:buFont typeface="+mj-lt"/>
+              <a:buAutoNum type="arabicPeriod"/>
+            </a:pPr>
+            <a:r>
+              <a:rPr lang="en-US" strike="sngStrike" dirty="0"/>
+              <a:t>Set vet for making appts so not editable(should)</a:t>
+            </a:r>
+          </a:p>
+          <a:p>
+            <a:pPr marL="342900" indent="-342900">
+              <a:buFont typeface="+mj-lt"/>
+              <a:buAutoNum type="arabicPeriod"/>
+            </a:pPr>
             <a:r>
               <a:rPr lang="en-US" dirty="0"/>
-              <a:t>Working with Routes</a:t>
-            </a:r>
-          </a:p>
-          <a:p>
+              <a:t>Add confirm message for updates (Should) -&gt; </a:t>
+            </a:r>
+            <a:r>
+              <a:rPr lang="en-US" dirty="0" err="1"/>
+              <a:t>Javascript</a:t>
+            </a:r>
+            <a:endParaRPr lang="en-US" dirty="0"/>
+          </a:p>
+          <a:p>
+            <a:pPr marL="342900" indent="-342900">
+              <a:buFont typeface="+mj-lt"/>
+              <a:buAutoNum type="arabicPeriod"/>
+            </a:pPr>
             <a:r>
               <a:rPr lang="en-US" dirty="0"/>
-              <a:t>Experiment with CSS &amp; HTML </a:t>
-            </a:r>
+              <a:t>Age or dob option? (should) could solve with dummy dob based on reg date &amp; dob known bool</a:t>
+            </a:r>
+          </a:p>
+          <a:p>
+            <a:pPr marL="342900" indent="-342900">
+              <a:buFont typeface="+mj-lt"/>
+              <a:buAutoNum type="arabicPeriod"/>
+            </a:pPr>
+            <a:r>
+              <a:rPr lang="en-US" strike="sngStrike" dirty="0"/>
+              <a:t>Add all appointments in aside on view selected page (should)</a:t>
+            </a:r>
+          </a:p>
+          <a:p>
+            <a:pPr marL="342900" indent="-342900">
+              <a:buFont typeface="+mj-lt"/>
+              <a:buAutoNum type="arabicPeriod"/>
+            </a:pPr>
+            <a:r>
+              <a:rPr lang="en-US" strike="sngStrike" dirty="0"/>
+              <a:t>Add animals/owners/vet in second aside (should)</a:t>
+            </a:r>
+          </a:p>
+          <a:p>
+            <a:pPr marL="342900" indent="-342900">
+              <a:buFont typeface="+mj-lt"/>
+              <a:buAutoNum type="arabicPeriod"/>
+            </a:pPr>
+            <a:r>
+              <a:rPr lang="en-US" strike="sngStrike" dirty="0"/>
+              <a:t>Make all fields required when adding new entries(should)</a:t>
+            </a:r>
+          </a:p>
+          <a:p>
+            <a:pPr marL="342900" indent="-342900">
+              <a:buFont typeface="+mj-lt"/>
+              <a:buAutoNum type="arabicPeriod"/>
+            </a:pPr>
+            <a:r>
+              <a:rPr lang="en-US" strike="sngStrike" dirty="0"/>
+              <a:t>sort appointments by date</a:t>
+            </a:r>
+            <a:r>
+              <a:rPr lang="en-US" dirty="0"/>
+              <a:t>, animal, vet, owner (should)</a:t>
+            </a:r>
+          </a:p>
+          <a:p>
+            <a:pPr marL="342900" indent="-342900">
+              <a:buFont typeface="+mj-lt"/>
+              <a:buAutoNum type="arabicPeriod"/>
+            </a:pPr>
+            <a:r>
+              <a:rPr lang="en-US" dirty="0"/>
+              <a:t>Add submenu items – add/edit/all (should)</a:t>
+            </a:r>
+          </a:p>
+          <a:p>
+            <a:pPr marL="342900" indent="-342900">
+              <a:buFont typeface="+mj-lt"/>
+              <a:buAutoNum type="arabicPeriod"/>
+            </a:pPr>
+            <a:r>
+              <a:rPr lang="en-US" dirty="0"/>
+              <a:t>Add pages to list results (could)</a:t>
+            </a:r>
+          </a:p>
+          <a:p>
+            <a:pPr marL="342900" indent="-342900">
+              <a:buFont typeface="+mj-lt"/>
+              <a:buAutoNum type="arabicPeriod"/>
+            </a:pPr>
+            <a:r>
+              <a:rPr lang="en-US" dirty="0"/>
+              <a:t>Add short note with option to expand (could)</a:t>
+            </a:r>
+          </a:p>
+          <a:p>
+            <a:pPr marL="342900" indent="-342900">
+              <a:buFont typeface="+mj-lt"/>
+              <a:buAutoNum type="arabicPeriod"/>
+            </a:pPr>
+            <a:r>
+              <a:rPr lang="en-US" dirty="0"/>
+              <a:t>Filter by in clinic – handle check in/out (could)</a:t>
+            </a:r>
+          </a:p>
+          <a:p>
+            <a:pPr marL="342900" indent="-342900">
+              <a:buFont typeface="+mj-lt"/>
+              <a:buAutoNum type="arabicPeriod"/>
+            </a:pPr>
+            <a:r>
+              <a:rPr lang="en-US" dirty="0"/>
+              <a:t>Check if owner exists when add new owner (could)</a:t>
+            </a:r>
+          </a:p>
+          <a:p>
+            <a:pPr marL="342900" indent="-342900">
+              <a:buFont typeface="+mj-lt"/>
+              <a:buAutoNum type="arabicPeriod"/>
+            </a:pPr>
+            <a:r>
+              <a:rPr lang="en-US" dirty="0"/>
+              <a:t>Media queries – collapsible menus </a:t>
+            </a:r>
+            <a:r>
+              <a:rPr lang="en-US" dirty="0" err="1"/>
+              <a:t>etc</a:t>
+            </a:r>
+            <a:r>
+              <a:rPr lang="en-US" dirty="0"/>
+              <a:t> (could)</a:t>
+            </a:r>
+          </a:p>
+          <a:p>
+            <a:pPr marL="342900" indent="-342900">
+              <a:buFont typeface="+mj-lt"/>
+              <a:buAutoNum type="arabicPeriod"/>
+            </a:pPr>
+            <a:r>
+              <a:rPr lang="en-US" dirty="0"/>
+              <a:t>Login page – different views for user type, </a:t>
+            </a:r>
+            <a:r>
+              <a:rPr lang="en-US" dirty="0" err="1"/>
+              <a:t>ie</a:t>
+            </a:r>
+            <a:r>
+              <a:rPr lang="en-US" dirty="0"/>
+              <a:t> Vet or Reception (could)</a:t>
+            </a:r>
+          </a:p>
+          <a:p>
+            <a:pPr marL="342900" indent="-342900">
+              <a:buFont typeface="+mj-lt"/>
+              <a:buAutoNum type="arabicPeriod"/>
+            </a:pPr>
+            <a:r>
+              <a:rPr lang="en-US" dirty="0"/>
+              <a:t>Billing? (Could)</a:t>
+            </a:r>
+          </a:p>
+          <a:p>
+            <a:pPr marL="342900" indent="-342900">
+              <a:buFont typeface="+mj-lt"/>
+              <a:buAutoNum type="arabicPeriod"/>
+            </a:pPr>
+            <a:r>
+              <a:rPr lang="en-US" dirty="0"/>
+              <a:t>Online booking (won’t)</a:t>
+            </a:r>
+          </a:p>
+          <a:p>
+            <a:pPr marL="285750" indent="-285750">
+              <a:buFont typeface="Arial" panose="020B0604020202020204" pitchFamily="34" charset="0"/>
+              <a:buChar char="•"/>
+            </a:pPr>
+            <a:endParaRPr lang="en-US" dirty="0"/>
           </a:p>
         </p:txBody>
       </p:sp>
     </p:spTree>
     <p:extLst>
       <p:ext uri="{BB962C8B-B14F-4D97-AF65-F5344CB8AC3E}">
-        <p14:creationId xmlns:p14="http://schemas.microsoft.com/office/powerpoint/2010/main" val="4199572944"/>
+        <p14:creationId xmlns:p14="http://schemas.microsoft.com/office/powerpoint/2010/main" val="1427734406"/>
       </p:ext>
     </p:extLst>
   </p:cSld>

</xml_diff>